<commit_message>
updated week 6 notes
</commit_message>
<xml_diff>
--- a/notes/week5/week5.pptx
+++ b/notes/week5/week5.pptx
@@ -211,6 +211,7 @@
 <file path=ppt/revisionInfo.xml><?xml version="1.0" encoding="utf-8"?>
 <p1510:revInfo xmlns:a="http://schemas.openxmlformats.org/drawingml/2006/main" xmlns:r="http://schemas.openxmlformats.org/officeDocument/2006/relationships" xmlns:p1510="http://schemas.microsoft.com/office/powerpoint/2015/10/main">
   <p1510:revLst>
+    <p1510:client id="{33A2B773-C530-684B-BED7-41E44C36EABE}" v="1" dt="2026-02-04T21:13:19.500"/>
     <p1510:client id="{ED909D2C-6CEE-DF41-A2B1-994876E71ACE}" v="92" dt="2026-02-04T00:17:50.610"/>
   </p1510:revLst>
 </p1510:revInfo>
@@ -221,7 +222,7 @@
   <pc:docChgLst>
     <pc:chgData name="Toby Donaldson" userId="2e6e5431-bb17-4c41-9985-d39c50d83c73" providerId="ADAL" clId="{F31BC264-820E-54C4-A6D1-F92AF9CC222E}"/>
     <pc:docChg chg="undo redo custSel addSld delSld modSld sldOrd delSection modSection">
-      <pc:chgData name="Toby Donaldson" userId="2e6e5431-bb17-4c41-9985-d39c50d83c73" providerId="ADAL" clId="{F31BC264-820E-54C4-A6D1-F92AF9CC222E}" dt="2026-02-02T20:59:59.566" v="10077"/>
+      <pc:chgData name="Toby Donaldson" userId="2e6e5431-bb17-4c41-9985-d39c50d83c73" providerId="ADAL" clId="{F31BC264-820E-54C4-A6D1-F92AF9CC222E}" dt="2026-02-04T21:13:19.497" v="10078"/>
       <pc:docMkLst>
         <pc:docMk/>
       </pc:docMkLst>
@@ -577,6 +578,291 @@
             <ac:spMk id="4" creationId="{1A47DFCA-26CF-FE52-752D-3BCBFC7613DD}"/>
           </ac:spMkLst>
         </pc:spChg>
+      </pc:sldChg>
+      <pc:sldChg chg="addSp">
+        <pc:chgData name="Toby Donaldson" userId="2e6e5431-bb17-4c41-9985-d39c50d83c73" providerId="ADAL" clId="{F31BC264-820E-54C4-A6D1-F92AF9CC222E}" dt="2026-02-04T21:13:19.497" v="10078"/>
+        <pc:sldMkLst>
+          <pc:docMk/>
+          <pc:sldMk cId="1523822758" sldId="362"/>
+        </pc:sldMkLst>
+        <pc:inkChg chg="add">
+          <ac:chgData name="Toby Donaldson" userId="2e6e5431-bb17-4c41-9985-d39c50d83c73" providerId="ADAL" clId="{F31BC264-820E-54C4-A6D1-F92AF9CC222E}" dt="2026-02-04T21:13:19.497" v="10078"/>
+          <ac:inkMkLst>
+            <pc:docMk/>
+            <pc:sldMk cId="1523822758" sldId="362"/>
+            <ac:inkMk id="3" creationId="{12AADC8E-3DF0-6125-A515-2D5617E39751}"/>
+          </ac:inkMkLst>
+        </pc:inkChg>
+      </pc:sldChg>
+      <pc:sldChg chg="addSp">
+        <pc:chgData name="Toby Donaldson" userId="2e6e5431-bb17-4c41-9985-d39c50d83c73" providerId="ADAL" clId="{F31BC264-820E-54C4-A6D1-F92AF9CC222E}" dt="2026-02-04T21:13:19.497" v="10078"/>
+        <pc:sldMkLst>
+          <pc:docMk/>
+          <pc:sldMk cId="3940455267" sldId="363"/>
+        </pc:sldMkLst>
+        <pc:inkChg chg="add">
+          <ac:chgData name="Toby Donaldson" userId="2e6e5431-bb17-4c41-9985-d39c50d83c73" providerId="ADAL" clId="{F31BC264-820E-54C4-A6D1-F92AF9CC222E}" dt="2026-02-04T21:13:19.497" v="10078"/>
+          <ac:inkMkLst>
+            <pc:docMk/>
+            <pc:sldMk cId="3940455267" sldId="363"/>
+            <ac:inkMk id="5" creationId="{03DF54A1-2B8B-1B4C-84F7-284C95E49959}"/>
+          </ac:inkMkLst>
+        </pc:inkChg>
+      </pc:sldChg>
+      <pc:sldChg chg="addSp">
+        <pc:chgData name="Toby Donaldson" userId="2e6e5431-bb17-4c41-9985-d39c50d83c73" providerId="ADAL" clId="{F31BC264-820E-54C4-A6D1-F92AF9CC222E}" dt="2026-02-04T21:13:19.497" v="10078"/>
+        <pc:sldMkLst>
+          <pc:docMk/>
+          <pc:sldMk cId="737404355" sldId="364"/>
+        </pc:sldMkLst>
+        <pc:inkChg chg="add">
+          <ac:chgData name="Toby Donaldson" userId="2e6e5431-bb17-4c41-9985-d39c50d83c73" providerId="ADAL" clId="{F31BC264-820E-54C4-A6D1-F92AF9CC222E}" dt="2026-02-04T21:13:19.497" v="10078"/>
+          <ac:inkMkLst>
+            <pc:docMk/>
+            <pc:sldMk cId="737404355" sldId="364"/>
+            <ac:inkMk id="3" creationId="{0681E530-8710-BE1A-89B9-9288F11D287F}"/>
+          </ac:inkMkLst>
+        </pc:inkChg>
+      </pc:sldChg>
+      <pc:sldChg chg="addSp">
+        <pc:chgData name="Toby Donaldson" userId="2e6e5431-bb17-4c41-9985-d39c50d83c73" providerId="ADAL" clId="{F31BC264-820E-54C4-A6D1-F92AF9CC222E}" dt="2026-02-04T21:13:19.497" v="10078"/>
+        <pc:sldMkLst>
+          <pc:docMk/>
+          <pc:sldMk cId="4031457995" sldId="365"/>
+        </pc:sldMkLst>
+        <pc:inkChg chg="add">
+          <ac:chgData name="Toby Donaldson" userId="2e6e5431-bb17-4c41-9985-d39c50d83c73" providerId="ADAL" clId="{F31BC264-820E-54C4-A6D1-F92AF9CC222E}" dt="2026-02-04T21:13:19.497" v="10078"/>
+          <ac:inkMkLst>
+            <pc:docMk/>
+            <pc:sldMk cId="4031457995" sldId="365"/>
+            <ac:inkMk id="8" creationId="{BE710084-D6F4-3090-B3BB-C57BC20DE4B2}"/>
+          </ac:inkMkLst>
+        </pc:inkChg>
+      </pc:sldChg>
+      <pc:sldChg chg="addSp">
+        <pc:chgData name="Toby Donaldson" userId="2e6e5431-bb17-4c41-9985-d39c50d83c73" providerId="ADAL" clId="{F31BC264-820E-54C4-A6D1-F92AF9CC222E}" dt="2026-02-04T21:13:19.497" v="10078"/>
+        <pc:sldMkLst>
+          <pc:docMk/>
+          <pc:sldMk cId="1120003227" sldId="366"/>
+        </pc:sldMkLst>
+        <pc:inkChg chg="add">
+          <ac:chgData name="Toby Donaldson" userId="2e6e5431-bb17-4c41-9985-d39c50d83c73" providerId="ADAL" clId="{F31BC264-820E-54C4-A6D1-F92AF9CC222E}" dt="2026-02-04T21:13:19.497" v="10078"/>
+          <ac:inkMkLst>
+            <pc:docMk/>
+            <pc:sldMk cId="1120003227" sldId="366"/>
+            <ac:inkMk id="3" creationId="{6E29C5E8-2A21-AC3E-6FB3-66A65E266211}"/>
+          </ac:inkMkLst>
+        </pc:inkChg>
+      </pc:sldChg>
+      <pc:sldChg chg="addSp">
+        <pc:chgData name="Toby Donaldson" userId="2e6e5431-bb17-4c41-9985-d39c50d83c73" providerId="ADAL" clId="{F31BC264-820E-54C4-A6D1-F92AF9CC222E}" dt="2026-02-04T21:13:19.497" v="10078"/>
+        <pc:sldMkLst>
+          <pc:docMk/>
+          <pc:sldMk cId="3459343660" sldId="367"/>
+        </pc:sldMkLst>
+        <pc:inkChg chg="add">
+          <ac:chgData name="Toby Donaldson" userId="2e6e5431-bb17-4c41-9985-d39c50d83c73" providerId="ADAL" clId="{F31BC264-820E-54C4-A6D1-F92AF9CC222E}" dt="2026-02-04T21:13:19.497" v="10078"/>
+          <ac:inkMkLst>
+            <pc:docMk/>
+            <pc:sldMk cId="3459343660" sldId="367"/>
+            <ac:inkMk id="7" creationId="{45A3617A-F215-CDD3-AADF-606A20D23C4D}"/>
+          </ac:inkMkLst>
+        </pc:inkChg>
+      </pc:sldChg>
+      <pc:sldChg chg="addSp">
+        <pc:chgData name="Toby Donaldson" userId="2e6e5431-bb17-4c41-9985-d39c50d83c73" providerId="ADAL" clId="{F31BC264-820E-54C4-A6D1-F92AF9CC222E}" dt="2026-02-04T21:13:19.497" v="10078"/>
+        <pc:sldMkLst>
+          <pc:docMk/>
+          <pc:sldMk cId="2821027809" sldId="368"/>
+        </pc:sldMkLst>
+        <pc:inkChg chg="add">
+          <ac:chgData name="Toby Donaldson" userId="2e6e5431-bb17-4c41-9985-d39c50d83c73" providerId="ADAL" clId="{F31BC264-820E-54C4-A6D1-F92AF9CC222E}" dt="2026-02-04T21:13:19.497" v="10078"/>
+          <ac:inkMkLst>
+            <pc:docMk/>
+            <pc:sldMk cId="2821027809" sldId="368"/>
+            <ac:inkMk id="3" creationId="{D94A51CC-44BB-AA6D-35BB-8FDACD07F3D3}"/>
+          </ac:inkMkLst>
+        </pc:inkChg>
+      </pc:sldChg>
+      <pc:sldChg chg="addSp">
+        <pc:chgData name="Toby Donaldson" userId="2e6e5431-bb17-4c41-9985-d39c50d83c73" providerId="ADAL" clId="{F31BC264-820E-54C4-A6D1-F92AF9CC222E}" dt="2026-02-04T21:13:19.497" v="10078"/>
+        <pc:sldMkLst>
+          <pc:docMk/>
+          <pc:sldMk cId="2149757194" sldId="369"/>
+        </pc:sldMkLst>
+        <pc:inkChg chg="add">
+          <ac:chgData name="Toby Donaldson" userId="2e6e5431-bb17-4c41-9985-d39c50d83c73" providerId="ADAL" clId="{F31BC264-820E-54C4-A6D1-F92AF9CC222E}" dt="2026-02-04T21:13:19.497" v="10078"/>
+          <ac:inkMkLst>
+            <pc:docMk/>
+            <pc:sldMk cId="2149757194" sldId="369"/>
+            <ac:inkMk id="5" creationId="{504AF155-F49E-69CC-9C50-5955E8C51A18}"/>
+          </ac:inkMkLst>
+        </pc:inkChg>
+      </pc:sldChg>
+      <pc:sldChg chg="addSp">
+        <pc:chgData name="Toby Donaldson" userId="2e6e5431-bb17-4c41-9985-d39c50d83c73" providerId="ADAL" clId="{F31BC264-820E-54C4-A6D1-F92AF9CC222E}" dt="2026-02-04T21:13:19.497" v="10078"/>
+        <pc:sldMkLst>
+          <pc:docMk/>
+          <pc:sldMk cId="748760252" sldId="371"/>
+        </pc:sldMkLst>
+        <pc:inkChg chg="add">
+          <ac:chgData name="Toby Donaldson" userId="2e6e5431-bb17-4c41-9985-d39c50d83c73" providerId="ADAL" clId="{F31BC264-820E-54C4-A6D1-F92AF9CC222E}" dt="2026-02-04T21:13:19.497" v="10078"/>
+          <ac:inkMkLst>
+            <pc:docMk/>
+            <pc:sldMk cId="748760252" sldId="371"/>
+            <ac:inkMk id="4" creationId="{9566BD26-D264-8870-E85F-08AC902A0931}"/>
+          </ac:inkMkLst>
+        </pc:inkChg>
+      </pc:sldChg>
+      <pc:sldChg chg="addSp">
+        <pc:chgData name="Toby Donaldson" userId="2e6e5431-bb17-4c41-9985-d39c50d83c73" providerId="ADAL" clId="{F31BC264-820E-54C4-A6D1-F92AF9CC222E}" dt="2026-02-04T21:13:19.497" v="10078"/>
+        <pc:sldMkLst>
+          <pc:docMk/>
+          <pc:sldMk cId="865974016" sldId="372"/>
+        </pc:sldMkLst>
+        <pc:inkChg chg="add">
+          <ac:chgData name="Toby Donaldson" userId="2e6e5431-bb17-4c41-9985-d39c50d83c73" providerId="ADAL" clId="{F31BC264-820E-54C4-A6D1-F92AF9CC222E}" dt="2026-02-04T21:13:19.497" v="10078"/>
+          <ac:inkMkLst>
+            <pc:docMk/>
+            <pc:sldMk cId="865974016" sldId="372"/>
+            <ac:inkMk id="7" creationId="{598873EE-33C1-6D05-3D84-6EDED3CE2C18}"/>
+          </ac:inkMkLst>
+        </pc:inkChg>
+      </pc:sldChg>
+      <pc:sldChg chg="addSp">
+        <pc:chgData name="Toby Donaldson" userId="2e6e5431-bb17-4c41-9985-d39c50d83c73" providerId="ADAL" clId="{F31BC264-820E-54C4-A6D1-F92AF9CC222E}" dt="2026-02-04T21:13:19.497" v="10078"/>
+        <pc:sldMkLst>
+          <pc:docMk/>
+          <pc:sldMk cId="338792272" sldId="373"/>
+        </pc:sldMkLst>
+        <pc:inkChg chg="add">
+          <ac:chgData name="Toby Donaldson" userId="2e6e5431-bb17-4c41-9985-d39c50d83c73" providerId="ADAL" clId="{F31BC264-820E-54C4-A6D1-F92AF9CC222E}" dt="2026-02-04T21:13:19.497" v="10078"/>
+          <ac:inkMkLst>
+            <pc:docMk/>
+            <pc:sldMk cId="338792272" sldId="373"/>
+            <ac:inkMk id="3" creationId="{981A9EA2-C2B0-F1F4-3A13-3AAF6487CBDE}"/>
+          </ac:inkMkLst>
+        </pc:inkChg>
+      </pc:sldChg>
+      <pc:sldChg chg="addSp">
+        <pc:chgData name="Toby Donaldson" userId="2e6e5431-bb17-4c41-9985-d39c50d83c73" providerId="ADAL" clId="{F31BC264-820E-54C4-A6D1-F92AF9CC222E}" dt="2026-02-04T21:13:19.497" v="10078"/>
+        <pc:sldMkLst>
+          <pc:docMk/>
+          <pc:sldMk cId="1552982968" sldId="374"/>
+        </pc:sldMkLst>
+        <pc:inkChg chg="add">
+          <ac:chgData name="Toby Donaldson" userId="2e6e5431-bb17-4c41-9985-d39c50d83c73" providerId="ADAL" clId="{F31BC264-820E-54C4-A6D1-F92AF9CC222E}" dt="2026-02-04T21:13:19.497" v="10078"/>
+          <ac:inkMkLst>
+            <pc:docMk/>
+            <pc:sldMk cId="1552982968" sldId="374"/>
+            <ac:inkMk id="3" creationId="{B396B79E-FD57-9CEE-9579-1056674AF0D7}"/>
+          </ac:inkMkLst>
+        </pc:inkChg>
+      </pc:sldChg>
+      <pc:sldChg chg="addSp">
+        <pc:chgData name="Toby Donaldson" userId="2e6e5431-bb17-4c41-9985-d39c50d83c73" providerId="ADAL" clId="{F31BC264-820E-54C4-A6D1-F92AF9CC222E}" dt="2026-02-04T21:13:19.497" v="10078"/>
+        <pc:sldMkLst>
+          <pc:docMk/>
+          <pc:sldMk cId="519182463" sldId="376"/>
+        </pc:sldMkLst>
+        <pc:inkChg chg="add">
+          <ac:chgData name="Toby Donaldson" userId="2e6e5431-bb17-4c41-9985-d39c50d83c73" providerId="ADAL" clId="{F31BC264-820E-54C4-A6D1-F92AF9CC222E}" dt="2026-02-04T21:13:19.497" v="10078"/>
+          <ac:inkMkLst>
+            <pc:docMk/>
+            <pc:sldMk cId="519182463" sldId="376"/>
+            <ac:inkMk id="6" creationId="{1F331296-1F33-9BDA-3E63-CE927004A3DC}"/>
+          </ac:inkMkLst>
+        </pc:inkChg>
+      </pc:sldChg>
+      <pc:sldChg chg="addSp">
+        <pc:chgData name="Toby Donaldson" userId="2e6e5431-bb17-4c41-9985-d39c50d83c73" providerId="ADAL" clId="{F31BC264-820E-54C4-A6D1-F92AF9CC222E}" dt="2026-02-04T21:13:19.497" v="10078"/>
+        <pc:sldMkLst>
+          <pc:docMk/>
+          <pc:sldMk cId="2393883371" sldId="377"/>
+        </pc:sldMkLst>
+        <pc:inkChg chg="add">
+          <ac:chgData name="Toby Donaldson" userId="2e6e5431-bb17-4c41-9985-d39c50d83c73" providerId="ADAL" clId="{F31BC264-820E-54C4-A6D1-F92AF9CC222E}" dt="2026-02-04T21:13:19.497" v="10078"/>
+          <ac:inkMkLst>
+            <pc:docMk/>
+            <pc:sldMk cId="2393883371" sldId="377"/>
+            <ac:inkMk id="3" creationId="{4AA9D881-350B-7B0F-0229-4571BF9BD741}"/>
+          </ac:inkMkLst>
+        </pc:inkChg>
+      </pc:sldChg>
+      <pc:sldChg chg="addSp">
+        <pc:chgData name="Toby Donaldson" userId="2e6e5431-bb17-4c41-9985-d39c50d83c73" providerId="ADAL" clId="{F31BC264-820E-54C4-A6D1-F92AF9CC222E}" dt="2026-02-04T21:13:19.497" v="10078"/>
+        <pc:sldMkLst>
+          <pc:docMk/>
+          <pc:sldMk cId="4065328107" sldId="378"/>
+        </pc:sldMkLst>
+        <pc:inkChg chg="add">
+          <ac:chgData name="Toby Donaldson" userId="2e6e5431-bb17-4c41-9985-d39c50d83c73" providerId="ADAL" clId="{F31BC264-820E-54C4-A6D1-F92AF9CC222E}" dt="2026-02-04T21:13:19.497" v="10078"/>
+          <ac:inkMkLst>
+            <pc:docMk/>
+            <pc:sldMk cId="4065328107" sldId="378"/>
+            <ac:inkMk id="6" creationId="{52D74789-0183-317B-BAC4-D45888EF40A4}"/>
+          </ac:inkMkLst>
+        </pc:inkChg>
+      </pc:sldChg>
+      <pc:sldChg chg="addSp">
+        <pc:chgData name="Toby Donaldson" userId="2e6e5431-bb17-4c41-9985-d39c50d83c73" providerId="ADAL" clId="{F31BC264-820E-54C4-A6D1-F92AF9CC222E}" dt="2026-02-04T21:13:19.497" v="10078"/>
+        <pc:sldMkLst>
+          <pc:docMk/>
+          <pc:sldMk cId="3126398943" sldId="379"/>
+        </pc:sldMkLst>
+        <pc:inkChg chg="add">
+          <ac:chgData name="Toby Donaldson" userId="2e6e5431-bb17-4c41-9985-d39c50d83c73" providerId="ADAL" clId="{F31BC264-820E-54C4-A6D1-F92AF9CC222E}" dt="2026-02-04T21:13:19.497" v="10078"/>
+          <ac:inkMkLst>
+            <pc:docMk/>
+            <pc:sldMk cId="3126398943" sldId="379"/>
+            <ac:inkMk id="3" creationId="{B6119314-0208-E69A-B199-4C4E99ABBEEE}"/>
+          </ac:inkMkLst>
+        </pc:inkChg>
+      </pc:sldChg>
+      <pc:sldChg chg="addSp">
+        <pc:chgData name="Toby Donaldson" userId="2e6e5431-bb17-4c41-9985-d39c50d83c73" providerId="ADAL" clId="{F31BC264-820E-54C4-A6D1-F92AF9CC222E}" dt="2026-02-04T21:13:19.497" v="10078"/>
+        <pc:sldMkLst>
+          <pc:docMk/>
+          <pc:sldMk cId="792308464" sldId="380"/>
+        </pc:sldMkLst>
+        <pc:inkChg chg="add">
+          <ac:chgData name="Toby Donaldson" userId="2e6e5431-bb17-4c41-9985-d39c50d83c73" providerId="ADAL" clId="{F31BC264-820E-54C4-A6D1-F92AF9CC222E}" dt="2026-02-04T21:13:19.497" v="10078"/>
+          <ac:inkMkLst>
+            <pc:docMk/>
+            <pc:sldMk cId="792308464" sldId="380"/>
+            <ac:inkMk id="3" creationId="{C730225B-511E-EA42-AC41-F105762E23CE}"/>
+          </ac:inkMkLst>
+        </pc:inkChg>
+      </pc:sldChg>
+      <pc:sldChg chg="addSp">
+        <pc:chgData name="Toby Donaldson" userId="2e6e5431-bb17-4c41-9985-d39c50d83c73" providerId="ADAL" clId="{F31BC264-820E-54C4-A6D1-F92AF9CC222E}" dt="2026-02-04T21:13:19.497" v="10078"/>
+        <pc:sldMkLst>
+          <pc:docMk/>
+          <pc:sldMk cId="3350333952" sldId="381"/>
+        </pc:sldMkLst>
+        <pc:inkChg chg="add">
+          <ac:chgData name="Toby Donaldson" userId="2e6e5431-bb17-4c41-9985-d39c50d83c73" providerId="ADAL" clId="{F31BC264-820E-54C4-A6D1-F92AF9CC222E}" dt="2026-02-04T21:13:19.497" v="10078"/>
+          <ac:inkMkLst>
+            <pc:docMk/>
+            <pc:sldMk cId="3350333952" sldId="381"/>
+            <ac:inkMk id="3" creationId="{F54D6B3D-7E73-C37F-42FB-3AB7ED001DAB}"/>
+          </ac:inkMkLst>
+        </pc:inkChg>
+      </pc:sldChg>
+      <pc:sldChg chg="addSp">
+        <pc:chgData name="Toby Donaldson" userId="2e6e5431-bb17-4c41-9985-d39c50d83c73" providerId="ADAL" clId="{F31BC264-820E-54C4-A6D1-F92AF9CC222E}" dt="2026-02-04T21:13:19.497" v="10078"/>
+        <pc:sldMkLst>
+          <pc:docMk/>
+          <pc:sldMk cId="1739201111" sldId="382"/>
+        </pc:sldMkLst>
+        <pc:inkChg chg="add">
+          <ac:chgData name="Toby Donaldson" userId="2e6e5431-bb17-4c41-9985-d39c50d83c73" providerId="ADAL" clId="{F31BC264-820E-54C4-A6D1-F92AF9CC222E}" dt="2026-02-04T21:13:19.497" v="10078"/>
+          <ac:inkMkLst>
+            <pc:docMk/>
+            <pc:sldMk cId="1739201111" sldId="382"/>
+            <ac:inkMk id="7" creationId="{E4522100-2AD1-8182-706F-1588E5A6B392}"/>
+          </ac:inkMkLst>
+        </pc:inkChg>
       </pc:sldChg>
     </pc:docChg>
   </pc:docChgLst>
@@ -2090,6 +2376,334 @@
 </inkml:ink>
 </file>
 
+<file path=ppt/ink/ink10.xml><?xml version="1.0" encoding="utf-8"?>
+<inkml:ink xmlns:inkml="http://www.w3.org/2003/InkML">
+  <inkml:definitions>
+    <inkml:context xml:id="ctx0">
+      <inkml:inkSource xml:id="inkSrc0">
+        <inkml:traceFormat>
+          <inkml:channel name="X" type="integer" min="-2.14748E9" max="2.14748E9" units="cm"/>
+          <inkml:channel name="Y" type="integer" min="-2.14748E9" max="2.14748E9" units="cm"/>
+          <inkml:channel name="F" type="integer" max="32767" units="dev"/>
+        </inkml:traceFormat>
+        <inkml:channelProperties>
+          <inkml:channelProperty channel="X" name="resolution" value="1000" units="1/cm"/>
+          <inkml:channelProperty channel="Y" name="resolution" value="1000" units="1/cm"/>
+          <inkml:channelProperty channel="F" name="resolution" value="0" units="1/dev"/>
+        </inkml:channelProperties>
+      </inkml:inkSource>
+      <inkml:timestamp xml:id="ts0" timeString="2026-02-04T20:41:22.701"/>
+    </inkml:context>
+    <inkml:brush xml:id="br0">
+      <inkml:brushProperty name="width" value="0.05292" units="cm"/>
+      <inkml:brushProperty name="height" value="0.05292" units="cm"/>
+      <inkml:brushProperty name="color" value="#FF0000"/>
+    </inkml:brush>
+  </inkml:definitions>
+  <inkml:trace contextRef="#ctx0" brushRef="#br0">7691 12153 24575,'35'0'0,"-10"0"0,1 0 0,1 0 0,1 0 0,-1 0 0,1 0 0,3 0 0,-4 0 0,-5 0 0,17 0 0,-19 0 0,15 0 0,-15 0 0,-5 0 0,17 0 0,-9 0 0,2 0 0,1 0 0,9 0 0,-15 0 0,-4 0 0,-1 0 0,7 0 0,7 0 0,12 0 0,7 0 0,0 0 0,-10 0 0,0 0 0,1 0 0,-1 0 0,3 0 0,1 0 0,-2 0 0,-2 0 0,-1 0 0,-2 0 0,-5 0 0,13 0 0,-10-7 0,-1-1 0,3 4 0,-8-5 0,-3 2 0,-8 7 0</inkml:trace>
+  <inkml:trace contextRef="#ctx0" brushRef="#br0" timeOffset="2117">10901 12047 24575,'25'0'0,"1"0"0,1 0 0,1 0 0,7 0 0,0 0 0,-7 0 0,-1 0 0,-1 0 0,-1 0 0,10 0 0,1 0 0,-17 0 0,13 0 0,-29 0 0,29 0 0,-13 0 0,1 0 0,11 0 0,-6 1 0,1-2 0,10-6 0,3-1 0,-4 5 0,4 3 0,1-1 0,6-4 0,1-1 0,-1 1 0,-10 4 0,-1 2 0,-1-1 0,1 0 0,0 0 0,-3 0 0,4 0 0,-5 0 0,8 0 0,-3 0 0,-21 0 0,-15 0 0</inkml:trace>
+  <inkml:trace contextRef="#ctx0" brushRef="#br0" timeOffset="16567">6685 7338 24575,'20'0'0,"-5"0"0,1 0 0,-12 15 0,12-11 0,-16 12 0,0-16 0,0 0 0,0 0 0</inkml:trace>
+  <inkml:trace contextRef="#ctx0" brushRef="#br0" timeOffset="18168">6544 8079 24575,'20'0'0,"-5"0"0,-15 0 0,0 7 0,0-5 0,0 6 0,0-8 0</inkml:trace>
+  <inkml:trace contextRef="#ctx0" brushRef="#br0" timeOffset="20217">9737 12541 24575,'19'0'0,"13"0"0,-13 0 0,17 16 0,-17-12 0,5 27 0,-22-11 0,5-1 0,-7 13 0,0-28 0,0 11 0,0-15 0,0 0 0</inkml:trace>
+  <inkml:trace contextRef="#ctx0" brushRef="#br0" timeOffset="22219">13159 12753 24575,'19'0'0,"-3"0"0</inkml:trace>
+  <inkml:trace contextRef="#ctx0" brushRef="#br0" timeOffset="42498">6438 6826 24575,'35'0'0,"-2"0"0,1 0 0,-6 0 0,3 0 0,15 0 0,8 0 0,-5 0 0,-5 0 0,-2 0 0,-3 0 0,3 0 0,-5 0 0,-6 0 0,-4 0 0,11 0 0,5 0 0,-8 0 0,0 0 0,-15 0 0,11 0 0,-27 0 0,-4 16 0,-4-12 0,-11 12 0,-1-16 0,-4 0 0,-15 0 0,0 0 0,15 0 0,-3 0 0,5 0 0,6 15 0,-35-11 0,24 12 0,-9-7 0,-3-3 0,-4-2 0,4 12 0,3-16 0,44 0 0,-24 0 0,28 0 0</inkml:trace>
+  <inkml:trace contextRef="#ctx0" brushRef="#br0" timeOffset="45633">9666 12541 24575,'26'0'0,"-1"0"0,10 0 0,1 0 0,-11 0 0,1 0 0,7 0 0,-2 0 0,-3 0 0,-9 0 0,-3-15 0,-16 11 0,0-12 0,0 0 0,0 12 0,0-27 0,0 11 0,0-15 0,0 16 0,0-13 0,0 28 0,0-27 0,0 11 0,0 1 0,0-13 0,0 13 0,0-17 0,0 1 0,-16 0 0,12 15 0,-27-11 0,27 27 0,-12-12 0,9 1 0,-11 11 0,5-18 0,-1-3 0,-22 1 0,12-13 0,-3 0 0,0 23 0,-1 2 0,9-9 0,-1 3 0,-27 18 0,43 0 0,-11 0 0,-1 0 0,12 0 0,-12 16 0,1 3 0,11 1 0,-12 3 0,0-5 0,12 10 0,-11-9 0,15 12 0,-8-6 0,0 1 0,4 18 0,-4-3 0,0 0 0,8-2 0,0-6 0,0 1 0,0 5 0,0-13 0,0-1 0,0-6 0,16 13 0,-12-13 0,27 17 0,-11-17 0,0 13 0,-5-28 0,-15 11 0</inkml:trace>
+</inkml:ink>
+</file>
+
+<file path=ppt/ink/ink11.xml><?xml version="1.0" encoding="utf-8"?>
+<inkml:ink xmlns:inkml="http://www.w3.org/2003/InkML">
+  <inkml:definitions>
+    <inkml:context xml:id="ctx0">
+      <inkml:inkSource xml:id="inkSrc0">
+        <inkml:traceFormat>
+          <inkml:channel name="X" type="integer" min="-2.14748E9" max="2.14748E9" units="cm"/>
+          <inkml:channel name="Y" type="integer" min="-2.14748E9" max="2.14748E9" units="cm"/>
+          <inkml:channel name="F" type="integer" max="32767" units="dev"/>
+        </inkml:traceFormat>
+        <inkml:channelProperties>
+          <inkml:channelProperty channel="X" name="resolution" value="1000" units="1/cm"/>
+          <inkml:channelProperty channel="Y" name="resolution" value="1000" units="1/cm"/>
+          <inkml:channelProperty channel="F" name="resolution" value="0" units="1/dev"/>
+        </inkml:channelProperties>
+      </inkml:inkSource>
+      <inkml:timestamp xml:id="ts0" timeString="2026-02-04T20:42:45.334"/>
+    </inkml:context>
+    <inkml:brush xml:id="br0">
+      <inkml:brushProperty name="width" value="0.05292" units="cm"/>
+      <inkml:brushProperty name="height" value="0.05292" units="cm"/>
+      <inkml:brushProperty name="color" value="#FF0000"/>
+    </inkml:brush>
+  </inkml:definitions>
+  <inkml:trace contextRef="#ctx0" brushRef="#br0">9208 12577 24575,'25'0'0,"0"0"0,9 0 0,3 0 0,7 0 0,2 0 0,-11 0 0,1 0 0,-1 0 0,11 0 0,-2 0 0,1 0 0,-4 0 0,-13 0 0,-1 0 0,7 0 0,-1 0 0,14 0 0,-6 7 0,2 1 0,-9-6 0,-1 0 0,2 6 0,0 0 0,0-7 0,-3-2 0,7 1 0,-14 0 0,1 0 0,7 0 0,1 0 0,-5 0 0,1 0 0,6 0 0,-2 0 0,1 0 0,-3 0 0,-13 0 0,6 0 0,1 0 0,14 0 0,-7 0 0,0 0 0,6 0 0,-13 0 0,-1 0 0,3 0 0,5 0 0,-5 0 0,7 0 0,0 0 0,0 0 0,1 0 0,-1 0 0,0 0 0,-10 0 0,1 0 0,2 0 0,-1 0 0,12 0 0,8 0 0,-43 0 0,28 0 0,-29 0 0,13 0 0,0 0 0,-12 0 0,11 0 0,-15 15 0,0-11 0,0 12 0,0-16 0,-15 0 0,11 0 0,-12 16 0,16-12 0,0 27 0,0-27 0,0 27 0,0-27 0,0 12 0,0 0 0,0-12 0,0 11 0,0-15 0,0 0 0,0-15-820,0 11 1,0-12 0,0 16 0</inkml:trace>
+  <inkml:trace contextRef="#ctx0" brushRef="#br0" timeOffset="6483">11977 12612 24575,'25'0'0,"1"0"0,7 0 0,4 0 0,-3 0 0,1 0 0,2 0-667,4 0 0,1 0 0,1 0 667,3 0 0,2 0 0,-1 0 0,-7 0 0,-2 0 0,1 0 120,2 0 0,0 0 0,-3 0-120,4 0 0,-2 0 198,-4 0 1,-1 0-199,-9 0 0,-1 0 0,10 0 0,0 0 1015,1 0-1015,-5 0 0,4 0 0,-1 0 0,2 0 0,0 0 0,12 0 0,2 0 0,-5 0 0,2 0 0,-6 0 0,-10 0 0,-3 0 114,6 0 1,-1 0-115,2 0 0,-15 0 0,-20 0 0,-4 15 0,-12-11 0,16 12 0</inkml:trace>
+  <inkml:trace contextRef="#ctx0" brushRef="#br0" timeOffset="26952">9490 12471 24575,'25'0'0,"1"0"0,13 0 0,-13 0 0,-1 0 0,-6 0 0,-3 0 0,0 0 0,-12 0 0,27 0 0,-27 0 0,43 0 0,-8 0 0,2-8 0,9-4 0,0 0 0,-12 6 0,-1 2 0,1-2 0,0-1 0,2-5 0,-1-2 0,1 0 0,-2 3 0,9 3 0,0 2 0,-8 0 0,-10-2 0,-3 1 0,0 6 0,-1 2 0,10-1 0,-15 0 0,11 0 0,-27 0 0,28 0 0,-13 0 0,5-1 0,3 2 0,0 6 0,1 1 0,18-5 0,2-2 0,-2 7 0,0 0 0,4-7 0,-2-2 0,-11 0 0,-3 2 0,-8 7 0,-1 0 0,1-7 0,-1 1 0,14 14 0,-14-15 0,1-2 0,9 1 0,-15 16 0,-5-12 0,-15 11 0,0-15 0,0 0 0,0 0 0</inkml:trace>
+</inkml:ink>
+</file>
+
+<file path=ppt/ink/ink12.xml><?xml version="1.0" encoding="utf-8"?>
+<inkml:ink xmlns:inkml="http://www.w3.org/2003/InkML">
+  <inkml:definitions>
+    <inkml:context xml:id="ctx0">
+      <inkml:inkSource xml:id="inkSrc0">
+        <inkml:traceFormat>
+          <inkml:channel name="X" type="integer" min="-2.14748E9" max="2.14748E9" units="cm"/>
+          <inkml:channel name="Y" type="integer" min="-2.14748E9" max="2.14748E9" units="cm"/>
+          <inkml:channel name="F" type="integer" max="32767" units="dev"/>
+        </inkml:traceFormat>
+        <inkml:channelProperties>
+          <inkml:channelProperty channel="X" name="resolution" value="1000" units="1/cm"/>
+          <inkml:channelProperty channel="Y" name="resolution" value="1000" units="1/cm"/>
+          <inkml:channelProperty channel="F" name="resolution" value="0" units="1/dev"/>
+        </inkml:channelProperties>
+      </inkml:inkSource>
+      <inkml:timestamp xml:id="ts0" timeString="2026-02-04T20:44:07.817"/>
+    </inkml:context>
+    <inkml:brush xml:id="br0">
+      <inkml:brushProperty name="width" value="0.05292" units="cm"/>
+      <inkml:brushProperty name="height" value="0.05292" units="cm"/>
+      <inkml:brushProperty name="color" value="#FF0000"/>
+    </inkml:brush>
+  </inkml:definitions>
+  <inkml:trace contextRef="#ctx0" brushRef="#br0">19950 11748 24575,'35'0'0,"-3"0"0,2 0 0,3 0 0,1 0 0,3 0 0,0 0 0,3 0 0,-3 0 0,6 0 0,-12 0 0,-4 0 0,-11 0 0,-1 0 0,13 0 0,-8 0 0,3 0 0,2 0 0,1 0 0,6 0 0,-2 0 0,1 0 0,-19 0 0,0 15 0,-12-11 0,11 12 0,-15-16 0,32 0 0,7 0 0,8 0 0,-7 0 0,3 0 0,3 0-553,1 0 0,4 0 1,1 0-1,-2 0 553,-4 0 0,0 0 0,-1 0 0,0 0 0,2 0 0,0 0 0,-1 0 0,-1 0-100,4 0 1,-1 0-1,-4 0 100,3 0 0,-4 0 0,-7 0 0,-5 0 0,-12 0 0,13 0 0,-13 0 1087,5 0 1,3 0-1088,0 0 0,1 0 0,10 1 0,2-2 0,5-7 0,-1 0 167,-11 6 1,0 0-168,10-6 0,-3 1 0,-1 7 0,-14 0 0,1 0 0,9 0 0,-15 0 0,11 0 0,-27 0 0,27 0 0,-43 0 0,24 0 0,-27 0 0</inkml:trace>
+  <inkml:trace contextRef="#ctx0" brushRef="#br0" timeOffset="2217">19950 15028 24575,'40'0'0,"1"0"0,-1 0 0,-1 0 0,-1 0 0,3 0 0,-1 0 0,4 0 0,0 0 0,-2 0-886,6 0 1,-2 0 0,1 0 885,-4 0 0,1 0 0,0 0 0,-2 0 0,1 0 0,-2 0 0,0 0 156,1 0 0,-1 0 0,-2 0-156,7 0 0,-2 0 262,-8 0 0,-2 0-262,-3 0 0,-3 0 0,9 0 0,7 0 1353,-9 16-1353,-10-15 0,1 2 155,1 13 1,1-1-156,6-12 0,2-2 0,0 15 0,-1 0 0,1-14 0,-2-1 0,-6 8 0,-1-2 0,0-8 0,-3 2 0,-4 15 0,11-12 0,-27 11 0,12-15 0,31 0 0,-12 0 0,4 0 0,-3 0 0,1 0 0,0 0 0,13 0 0,-2 0 0,-4 0 0,-4 0 0,7 0 0,-20 0 0,-3 0 0,-4 0 0,11 0 0,1 0 0,3 0 0,-5 0 0,3 0 0,-1 0 0,4 0 0,-2 0 0,2 0 0,-2 0 0,-5 0 0,-3 0 0,9 0 0,-19 0 0,-16 0 0,0 0 0</inkml:trace>
+  <inkml:trace contextRef="#ctx0" brushRef="#br0" timeOffset="26517">9172 12506 24575,'0'20'0,"16"-5"0,-12-15 0,27 0 0,4 0 0,5 0 0,-5 0 0,-4 0 0,-27 0 0,12 0 0,0 0 0,3 0 0,16 16 0,1-12 0,-17 12 0,13-16 0,-28 0 0,11 0 0,1 0 0,4 0 0,15 0 0,-3 0 0,2 0 0,3 0 0,1 0 0,3 0 0,0 0 0,3 0 0,-3 0 0,6 0 0,-6 0 0,0 0 0,2 0 0,-9 0 0,-1 0 0,2 0 0,-15 0 0,11 0 0,-27 0 0,27 0 0,-27 0 0,27 0 0,-11 0 0,0 0 0,-5 0 0,1 0 0,-12 0 0,27 0 0,-27 0 0,28 15 0,-29-11 0,13 12 0,0-16 0,-12 0 0,27 0 0,-27 0 0,27 0 0,-27 0 0,12 0 0,-16 0 0</inkml:trace>
+  <inkml:trace contextRef="#ctx0" brushRef="#br0" timeOffset="29583">12224 12471 24575,'34'0'0,"0"0"0,0 0 0,10 0 0,3 0 0,3 0 0,-12 0 0,2 0 0,1 0 0,1 0 0,1 0-656,2 0 1,1 0-1,1 0 1,0 0 0,1 0 241,-6 0 1,1 0 0,0 0 0,0 0 0,-1 0 0,0 0 413,2 0 0,0 0 0,-1 0 0,-1 0 0,0 0 92,6 0 0,-1 1 1,-1-1-1,-3-1-92,6-4 0,-2-1 0,-3 1 583,6 3 0,-2 0-583,-4-6 0,-2 0 0,-7 8 0,0 0 0,9 0 0,-1 0 1458,-14 0 1,0 0-1459,7 0 0,-5 0 1265,-11 0-1265,8 0 0,6 0 0,-1 0 0,3 0 0,1 0 0,8 1 0,2-1 0,2-1-247,-6-2 0,2-1 1,0-1-1,-3 2 247,-1 1 0,-2 2 0,-2-2 0,-1-3 0,-1-2 0,-4 3 0,-2 4 0,-3 0 0,0 0 0,-1 0 0,10 0 0,-9 0 0,-1 0 0,14 0 0,-3 0 1026,-5 0-1026,-27 0 0,27 0 0,-11 0 0,4-1 0,3 2 0,7 7 0,3 0 0,3-6 0,2 0 0,-8 3 0,2 1 0,-2-2 0,8-3 0,-2-2 0,-4 1 0,-1 0 0,-8 0 0,-3 0 0,-5 0 0,-3 0 0,-1 0 0,-11 0 0,28 0 0,-28 0 0,11 16 0,-15-12 0,0 12 0,0-16 0,0 15 0,0-11 0,0 12 0,0-16 0,0 0 0,0 0 0</inkml:trace>
+  <inkml:trace contextRef="#ctx0" brushRef="#br0" timeOffset="68483">4992 12788 24575,'43'0'0,"0"0"0,5 0 0,2 0 0,-5 0 0,3 0 0,-2 0-527,-5 0 1,-1 0 0,1 0 526,5 0 0,1 0 0,-3 0 0,3 0 0,-4 0 256,-6 0 1,-3 0-257,1 0 65,-19 0 0,-16 0 0,0 0 1</inkml:trace>
+  <inkml:trace contextRef="#ctx0" brushRef="#br0" timeOffset="71617">5186 14852 24575,'19'0'0,"28"0"0,-13 0 0,3 0 0,-3 0 0,2 0 0,4 0-820,0 0 1,4 0 0,1 0 0,-2 0 761,-2 0 1,0 0 0,0 0 0,1 0 57,3 0 0,2 0 0,-1 0 0,0 0 0,-2 0 0,-1 0 0,1 0 0,0 0 0,1 0 0,1 0 0,1 0 0,-1 0 0,-1 0 0,0 0 0,0 0 0,0 0 0,0 0 0,0 0 0,0 0 0,-4 0 238,3 0 0,-2 0 1,-2 0-239,-5 0 0,0 0 0,-3 0 330,4 0 0,-2 0-330,-3 0 0,1 0 0,9 0 0,2 0 0,-3 0 0,3 0 0,-8 0 0,4 0 0,1 0 0,-1 0 0,6 0 0,-1 0 0,0 0 602,-1 0 0,0 0 0,-4 0-602,7 0 0,-9 0 325,-18 0-325,13 0 0,-13 0 0,19 1 0,6-2 0,-3-6 0,5-2 0,-5 5 0,8 1 0,4 0 0,1-1 0,-2-1-172,-5-3 0,0-1 1,0-1-1,1 1 0,2 2 172,-2 1 0,2 3 0,0 0 0,1 0 0,-2 0 0,-3-1 0,6-2 0,-3-1 0,-2 1 0,-1 1 0,4 5 0,-3 1 0,-3-2 0,2-6 0,-2-1 0,1 6 0,0 0 0,-1-6 0,-2 0 0,-6 7 0,-1 2 0,0-1 0,0 0 0,1 0 0,-1 0 0,-7 0 0,-1 0 429,7 2 1,-1-4-430,6-13 0,-13 13 0,-1 0 0,-6-14 0,13 16 0,-28 0 0,11 0 0,1 0 0,11 0 0,5 1 0,5-2 0,3-7 0,2 0 0,-7 6 0,0 2 0,1-2 0,0-3 0,-1-1 0,0 2 0,11 4 0,-2 0 0,-7-8 0,-3 0 0,-8 6 0,-1 0 0,10-14 0,-16 16 0,-3 0 0,-16 0 0,0 0 0,31 0 0,-5 0 0,3 0 0,4 4 0,3 2 0,1 0-233,7 0 0,1 1 1,-1 0 232,-5-1 0,-2 1 0,-1-1 0,15 3 0,-8-2 0,-7-7 0,-21 0 0,-15 16 0,0-12 0,0 11 0,0-15 0</inkml:trace>
+  <inkml:trace contextRef="#ctx0" brushRef="#br0" timeOffset="104050">9737 15628 24575,'49'0'0,"0"0"0,0 0 0,0 0 0,-7 0 0,1 0 0,0 0 0,1 0 0,1 0 0,-3 0 0,1 0 0,1 0 0,0 0 0,-1 0 0,0 0-656,6 0 1,0 0-1,-1 0 1,0 0 0,-3 0 491,2 0 0,-2 0 0,-1 0 0,-2 0 164,9 0 0,-2 0 0,-4 0 609,2 0 1,-3 0-610,0 0 0,-2 0 321,-13 0 1,-3 0-322,9 0 0,-19 0 0,-16 0 0</inkml:trace>
+  <inkml:trace contextRef="#ctx0" brushRef="#br0" timeOffset="119246">10530 12471 24575,'20'0'0,"-4"15"0,-16-11 0,0 12 0,0-16 0,0 16 0,0-12 0,0 11 0,0-15 0,0 16 0,-16-12 0,12 12 0,-12-16 0,16 0 0</inkml:trace>
+  <inkml:trace contextRef="#ctx0" brushRef="#br0" timeOffset="125716">14587 14305 24575,'26'0'0,"1"0"0,9 0 0,-11 8 0,1 0 0,13-4 0,1 10 0,2 3 0,-13-6 0,1-2 0,2-3 0,4 0 0,-2 1 0,3 9 0,0 0 0,-4-9 0,1-2 0,1 2 0,0 4 0,1 1 0,-1 1 0,2-1 0,0 0 0,-1-1 0,6-1 0,-2-1 0,-5 1 0,-5-4 0,-3-6 0,-1 0 0,-1 0 0,-1 0 0,23 0 0,-43 0 0,11 0 0,-15 16 0,16-12 0,-12 11 0,12-15 0,-16 0 0,15 0 0,-11 0 0,27 0 0,-11 16 0,4-13 0,3-2 0,0 6 0,1 2 0,-1-1 0,1-1 0,6-5 0,-2 0 0,8 14 0,-6-7 0,-2-2 0,-8-3 0,23 11 0,-28-15 0,1 0 0,11 0 0,-27 0 0,12 0 0,0 0 0,-28 0 0,8 0 0</inkml:trace>
+  <inkml:trace contextRef="#ctx0" brushRef="#br0" timeOffset="127434">15169 14993 24575,'36'0'0,"-4"0"0,2 0 0,-5 0 0,1 0 0,13 0 0,0 0 0,-14 0 0,-3 0 0,17 0 0,-25 0 0,6 0 0,-5 0 0,5 0 0,3 0 0,0 0 0,1 0 0,6-1 0,3 2 0,0 7 0,4 4 0,-2-1 0,2 1 0,0 0 0,-1 0 0,1 0 0,-4-1 0,-8-2 0,-3-2 0,1-8 0,-3 2 0,-5 15 0,13-13 0,-28 13 0,27-16 0,-11 16 0,15-12 0,0 11 0,-15-15 0,11 16 0,-27-12 0,12 27 0,-16-11 0,0 0 0,0-5 0,0-15 0</inkml:trace>
+  <inkml:trace contextRef="#ctx0" brushRef="#br0" timeOffset="222033">4427 12153 24575,'0'35'0,"0"1"0,0-4 0,0 2 0,0-5 0,0 1 0,0 2 0,0 3 0,0 0 0,0 0 0,0-1 0,0 3-605,0 8 1,0 3-1,0 0 605,0-11 0,0 1 0,0 0 0,0 2-409,0 6 1,0 2 0,0 0 0,0 0 408,0-1 0,0 0 0,0 0 0,0 0 0,0 2 0,0 1 0,0-1 0,0-1 0,0-3 0,0-1 0,0 0 0,0 0-384,0 1 1,0 1 0,0 0-1,0-3 384,0 2 0,0-2 0,0 0-124,0 1 1,0 0 0,0-2 123,0-8 0,0-1 0,0 1 0,0 11 0,0 1 0,0 1 0,0-3 0,0-1 0,0 3 0,0-5 0,0 2 0,0 0 0,0 2 0,0-3 0,0 1 0,0 1 0,0-2 0,0-1 0,0 0 0,0-2 0,0-1 0,0 3 272,0 7 0,0 3 1,0 0-1,0-5-272,0-2 0,0-4 0,0-3 0,0 2 0,0-3 986,0 0 0,0-6-986,0-10 0,0-4 0,0-16 0</inkml:trace>
+</inkml:ink>
+</file>
+
+<file path=ppt/ink/ink13.xml><?xml version="1.0" encoding="utf-8"?>
+<inkml:ink xmlns:inkml="http://www.w3.org/2003/InkML">
+  <inkml:definitions>
+    <inkml:context xml:id="ctx0">
+      <inkml:inkSource xml:id="inkSrc0">
+        <inkml:traceFormat>
+          <inkml:channel name="X" type="integer" min="-2.14748E9" max="2.14748E9" units="cm"/>
+          <inkml:channel name="Y" type="integer" min="-2.14748E9" max="2.14748E9" units="cm"/>
+          <inkml:channel name="F" type="integer" max="32767" units="dev"/>
+        </inkml:traceFormat>
+        <inkml:channelProperties>
+          <inkml:channelProperty channel="X" name="resolution" value="1000" units="1/cm"/>
+          <inkml:channelProperty channel="Y" name="resolution" value="1000" units="1/cm"/>
+          <inkml:channelProperty channel="F" name="resolution" value="0" units="1/dev"/>
+        </inkml:channelProperties>
+      </inkml:inkSource>
+      <inkml:timestamp xml:id="ts0" timeString="2026-02-04T20:48:37.750"/>
+    </inkml:context>
+    <inkml:brush xml:id="br0">
+      <inkml:brushProperty name="width" value="0.05292" units="cm"/>
+      <inkml:brushProperty name="height" value="0.05292" units="cm"/>
+      <inkml:brushProperty name="color" value="#FF0000"/>
+    </inkml:brush>
+  </inkml:definitions>
+  <inkml:trace contextRef="#ctx0" brushRef="#br0">8273 12435 24575,'25'0'0,"1"0"0,7 0 0,4 0 0,5 0 0,4 0 0,3 0-820,-4 0 1,1 0 0,2 0 0,1 0 373,-8 0 1,0 0-1,1 0 1,2 0 0,3 0-1,3 0 446,-8 0 0,3 0 0,3 0 0,1 0 0,2 0 0,1 0 0,-1 0 0,1 0 0,-1 0 0,-2 0 0,-2 0-365,2 0 1,-2 0 0,0 0 0,-2 0 0,1 0 0,0 0 0,1 0 0,1 0 0,2 0 231,-6 0 0,2 0 0,0 0 1,2 0-1,1 0 0,0 0 1,1 0-1,-1 0 0,-1 0 1,0 0-1,-1 0 0,-2 0 0,-2 0 133,6 0 0,-2 0 0,-1 0 0,0 0 0,-2 0 0,0 0 0,-1 0 0,0 0 0,1 0-58,7 0 0,0 0 0,-1 0 0,-1 0 0,1 0 0,-1 0 0,-1 0 58,-1 0 0,-2 0 0,1 0 0,-1 0 0,1 0 0,0 0 0,1 0 0,-1 0 0,1 0 0,1 0 0,0 0 0,0 0 0,-1 0 0,-1 0 0,-2 0 0,3 0 0,-3 0 0,-1 0 0,0 0 0,1 0 0,2 0 0,-1 0 0,3 0 0,1 0 0,-1 0 0,0 0 0,-1 0 0,-3 0-258,4 0 0,-3 0 1,-1 0-1,0 0 1,0 0 257,1 0 0,0 0 0,-1 0 0,1 0 0,0 0 0,1 0 0,0 0 0,1 0 0,-1 0 0,0 0 0,-1 0 0,-1 0 0,0 0 0,0 0 0,-1 0 161,6 1 1,0 0 0,-1-1-1,0-2-161,-5-1 0,0-1 0,-1-1 0,-2 2 1092,4 1 0,-3 2 0,0-2-847,-6-3 0,-1-1 0,-2 1-245,12 4 0,-1 2 0,1-1 0,2 0 0,-7 0 0,2 0 0,0 0 0,1 0 0,1 0 0,6 0 0,-8 0 0,6-1 0,3 1 0,1 0 0,-2 0 0,-3 1 262,-5 2 1,-1 0-1,-2 1 1,1-1-1,3 0-262,4-2 0,3 0 0,1-2 0,0 2 0,-2-1 0,-5 2 0,11 3 0,-4 1 0,-5-2 1135,4-3 0,-6-2-1135,-12 1 0,-3 0 1553,3 0-1553,-7 0 0,3 0 0,5 0 0,4 0 0,2 0-436,-1 3 1,3 2 0,1 0-1,2-2 436,-3-1 0,2-2 0,1 0 0,1 1 0,-2 0 0,0 2 0,0 0 0,0 1 0,-1-1 0,0 0 0,9-2 0,0-1 0,-1-1 0,-4 1 765,-3 0 1,-3 0-1,-2 0-765,8 0 0,-8 0 0,-17 0 0,-5 0 0,-15 0 0,-15 0 0,11 0 0,-12 0 0</inkml:trace>
+  <inkml:trace contextRef="#ctx0" brushRef="#br0" timeOffset="1918">17762 12647 24575,'47'0'0,"0"0"0,0 0 0,1 0 0,-1 0 0,0 0 0,-4 0 0,0 0 0,1 0 0,0 0 0,0 0 0,1 0 0,-1 0 0,3 0 0,1 0 0,1 0 0,-1 0 0,0 0 0,-1 0 0,-1 0-547,4 0 1,-1 0 0,-1 0 0,-1 0 0,-1 0 0,-3 0 339,5 0 0,-2 0 0,-3 0 0,-4 0 841,14-2 0,-12 4-634,-15 14 0,-20-12 0,-14 11 0</inkml:trace>
+  <inkml:trace contextRef="#ctx0" brushRef="#br0" timeOffset="6066">8590 14993 24575,'48'0'0,"0"0"0,0 0 0,0 0 0,-8 0 0,0 0 0,2 0 0,0 0 0,2 0 0,1 0 0,-3 0 0,2 0 0,1 0 0,1 0 0,1 0 0,0 0 0,0 0 0,0 0-410,2 0 0,0 0 1,1 0-1,1 0 1,-1 0-1,0 0 0,1 0 1,-2 0-1,1 0 0,-1 0 1,0 0-1,0 0 1,0 0-1,0 0 0,-1 0 1,-1 0-21,3 0 1,-2 0-1,-1 0 1,1 0-1,-1 0 1,1 0-1,1 0 564,-1 0 1,1 0 0,1 0 0,0 0 0,0 0 0,-1 0-1,-1 0 1,-1 0-135,4 0 0,-1 0 0,0 0 0,-2 0 0,-1 0 0,0 0 0,-3 0 0,1 0 0,-2 0 0,0 0 0,-3 0 0,-4 0 0,14 0 0,-5 0 0,-10 0 1716,-4 0-1716,-11 0 0,13 0 0,8 0 0,3 0 0,4 0 0,-10 0 0,5 1 0,0-1 0,-2-1 0,2-3 0,-1-1 0,6-2 0,-10 3 0,5-1 0,3 0 0,1 0 0,2 0 0,-1-1 0,-1 1-165,-2 0 0,-2-1 0,1 1 1,0 0-1,2-1 0,1 0 1,3 0 164,-6 0 0,1 1 0,1-1 0,2-1 0,1 1 0,1 0 0,0-1 0,2 1 0,0 0 0,0 0 0,1 0 0,-7 2 0,1-1 0,1 1 0,1 0 0,1 0 0,0 0 0,1 0 0,0 0 0,-1 0 0,1 0 0,-1 0 0,-1 0 0,0 0 0,-2-1 0,0 1-261,3-2 1,0 0 0,-1 0-1,0 0 1,-1-1 0,-1 1 0,0-1-1,0 1 1,0 0 0,0 0 0,-1 0-1,1 1 261,3 0 0,1 0 0,0 1 0,1 0 0,-1-1 0,-1 1 0,-1 1 0,-2-1 0,-2 0 0,-4-1 0,-3 1 0,21-4 0,-5 0 0,-8 1 0,-9-1 0,11-8 0,-25 14 0,4 0 0,11-3 0,6-1 0,4 1-343,-2 4 1,3 1 0,2 1 0,1-1 342,-5 0 0,1 0 0,1 0 0,0 0 0,1 0 0,-8 1 0,1-1 0,1 1 0,-1-1 0,-1-1 0,-1 0 0,10-2 0,0-1 0,-2-1 0,-2 2 1092,5 1 0,-1 2 0,-6-2-815,3-5 1,-9-2 2998,-4-7-1182,-19 12-2094,-16-11 0,-16 15 2932,12 0-2932,-12 15 280,16-11-280,0 12 0,-15 0 0,11 3 0,-11 6 0,-2 1 0,-2 14 0,1-11 0,1 0 0,-3 9 0,3-17 0,3 1 0,10 13 0,-12-15 0,16-5 0,0-15 0,0 0 0,0 0 0</inkml:trace>
+</inkml:ink>
+</file>
+
+<file path=ppt/ink/ink14.xml><?xml version="1.0" encoding="utf-8"?>
+<inkml:ink xmlns:inkml="http://www.w3.org/2003/InkML">
+  <inkml:definitions>
+    <inkml:context xml:id="ctx0">
+      <inkml:inkSource xml:id="inkSrc0">
+        <inkml:traceFormat>
+          <inkml:channel name="X" type="integer" min="-2.14748E9" max="2.14748E9" units="cm"/>
+          <inkml:channel name="Y" type="integer" min="-2.14748E9" max="2.14748E9" units="cm"/>
+          <inkml:channel name="F" type="integer" max="32767" units="dev"/>
+        </inkml:traceFormat>
+        <inkml:channelProperties>
+          <inkml:channelProperty channel="X" name="resolution" value="1000" units="1/cm"/>
+          <inkml:channelProperty channel="Y" name="resolution" value="1000" units="1/cm"/>
+          <inkml:channelProperty channel="F" name="resolution" value="0" units="1/dev"/>
+        </inkml:channelProperties>
+      </inkml:inkSource>
+      <inkml:timestamp xml:id="ts0" timeString="2026-02-04T20:49:48.417"/>
+    </inkml:context>
+    <inkml:brush xml:id="br0">
+      <inkml:brushProperty name="width" value="0.05292" units="cm"/>
+      <inkml:brushProperty name="height" value="0.05292" units="cm"/>
+      <inkml:brushProperty name="color" value="#FF0000"/>
+    </inkml:brush>
+  </inkml:definitions>
+  <inkml:trace contextRef="#ctx0" brushRef="#br0">6650 11606 24575,'35'0'0,"0"0"0,1 0 0,-1 0 0,1 0 0,-1 0 0,10 0 0,0 0 0,-5 0 0,-2 0 0,-4 0 0,1 0 0,3 1 0,2-2 0,4-5 0,2-3-457,-7 3 0,3 0 0,-1-2 457,1-3 0,0-2 0,-1 2 0,-4 3 0,-1 2 0,1 0 38,3 1 0,1 0 0,-4 0-38,-7-4 0,-2 2 0,-1 5 0,-3 0 0,8-14 0,11 16 0,-2 0 0,6 0 0,-10 0 0,1 0 0,5 0 0,-6 0 0,3 0 0,3 0 0,-1 0 0,-1 0 0,7 0 0,-1 0 0,0 0 0,0 0 83,-1 0 0,0 0 0,0 0 1,-4 0-84,1 0 0,-3 0 0,-6 0 111,-6 0 1,-5 0-112,13 0 0,-17 0 0,-3 0 0,-8 0 0,25 0 0,3 0 0,6 0 0,-2 0 0,2 0 0,2 0-212,-5 0 0,1 0 1,1 0-1,0 0 212,-1 0 0,1 0 0,-1 0 0,-1 0 0,10 0 0,-2 0 0,-2 0 0,-7 0 0,-3 0 0,-2 0 0,5 0 0,-5 0 0,2 0 0,-19 0 0,-16 16 0,8-12 1548,-6 12-1548,5-16 0,-7 0 0,16 0 0,-12 0 0,27 0 0,-27 0 0,12 0 0,-16 0 0,16 0 0,-12 0 0,11 0 0,-15 0 0,16 0 0,-12 15 0,12-11 0,-16 12 0,0-16 0,15 0 0,-11 16 0,12-13 0,-16 13 0,0-16 0,0 0 0,0 0 0</inkml:trace>
+  <inkml:trace contextRef="#ctx0" brushRef="#br0" timeOffset="5734">6756 14023 24575,'34'0'0,"0"0"0,0 0 0,-1 0 0,1 0 0,1 0 0,1 0 0,0 0 0,-1 0 0,14 0 0,-4 0 0,-16 0 0,-3 0 0,1 0 0,-3 0 0,-4 0 0,-4 0 0,-1 0 0,20 0 0,-1-8 0,3 0 0,0 6 0,0 0 0,0-6 0,-3 1 0,1 7 0,-3 0 0,-28 0 0,27 0 0,-7 0 0,3 0 0,4 0 0,5 0 0,3 0-629,0 0 1,2 0-1,3 0 1,0 0 628,-3 0 0,2 0 0,0 0 0,0 0 0,1 0 0,1 0 0,0 0 0,0 0 0,0 0 0,-2 0 0,8 0 0,-1 0 0,-1 0 0,-3 0-61,4 0 0,-2 0 0,-5 0 61,3-2 0,-5 4 0,-12 5 0,0 1 0,11-5 0,5-2 0,-4 4 0,4 1 0,2-1-698,-1-4 1,2-1 0,2-1 0,2 1 697,-10 0 0,1 0 0,2 0 0,0 0 0,-1 0 0,0 0 0,3 0 0,-1 0 0,0 0 0,0 0 0,0 0 179,0 0 1,1 0-1,0 0 1,-3 0 0,-3 0-180,7 0 0,-3 0 0,-4 0 82,5 0 0,-6 0-82,-5 0 0,-19 0 0,-16 0 2986,0 0-2986,-16 0 359,12 0 1,-12 0-1,16 0 1</inkml:trace>
+  <inkml:trace contextRef="#ctx0" brushRef="#br0" timeOffset="17549">8026 12506 24575,'33'0'0,"0"0"0,6 0 0,5 0 0,11 0 0,-21 0 0,5 0 0,3 0 0,5 0 0,2 0 0,2 0 0,2 0 0,1 0 0,0 0 0,1 0 0,-2 0 0,0 0-219,-7 0 1,0 0-1,1 0 1,0 1-1,1-1 1,0 0-1,0 0 1,1 1-1,0-1 1,0 0 0,1 0-1,0 0 1,1-1-1,0 1 1,1-1 45,-6 0 1,2 0-1,1 0 1,0-1-1,1 1 1,1-1-1,-1 1 1,1-1-1,1 0 1,-1 0-1,0 0 1,0 0 0,-1 0-1,0 0 1,0 1-1,-2-1 1,0 0-1,-1 0 1,-1 1-63,7-1 1,-1 0 0,0 1 0,-1-1 0,0 1 0,-1 0 0,-1-1 0,0 1 0,-1-1 0,-1 1 0,-1-1 0,0 0 0,-2 0 0,-2-1 194,9 0 0,-2-1 0,0 0 0,-2 0 1,-1-1-1,-2 1 0,-2 0 0,-3 0 1,-2 1 39,12-2 0,-4 1 0,-4 0 0,-1 1 884,4 3 1,-2 1-1,1-2-884,3-3 0,1-3 0,-3 2 0,5 4 0,0-1 155,-13-4 0,2-3 0,0 0 1,-1 1-156,5 1 0,-1 1 0,2 0 0,4-1 0,2 1 0,0-1 0,-4-4 0,-1-1 0,0 4-61,-3 5 0,-1 3 0,-2-1 61,5-7 0,-3 0 1638,-4 7 0,-2 2-528,-6-1 1,-5 0-1111,-3 0 0,-4 0 1326,-1 0-1326,5-16 137,4 14 1,3 0-138,-1-5 0,3-1 0,11 6 0,7 3 0,-1 0 0,-7-1 0,-1 0 0,2 0 0,0 0 0,2 0 0,0 0 0,-1 0 0,8 0 0,-2 0 0,-4 0 0,1 0 0,-2 0 0,10 0 0,-6 0 0,-6 0 0,-1-1 0,4 2 0,-6 6 0,0 1 0,-3-6 0,1-2 0,2 2 0,0 5 0,3 2 0,-1 0 0,-2-2 0,1-5 0,-3-2 0,2 2-153,8 2 0,1 1 0,-2 1 153,4 2 0,-2 0 0,-1 2 0,0 0 0,-10-4 0,1 0 0,-1 1 0,11 10 0,-2-2 0,-6-13 0,-5-1 0,2 15 0,-3-16 0,5 0 0,8 0 0,-5 0 0,3 0 0,3 0-625,-6 0 0,3 0 0,2 0 0,1 0 0,0 0 625,2 0 0,2 0 0,0 0 0,0 0 0,1 0 0,-8 0 0,0 0 0,0 0 0,1 0 0,-1 0 0,-1 0 0,8 0 0,-1 0 0,0 0 0,-2 0 0,-3 0 39,0 0 1,-1 0 0,-4 0 0,-2 0-40,14 0 0,-8 0 0,4 0 0,-27 0 0,-1 0 0,13 0 3154,3 0-3154,-9 0 0,3 0 135,5 0 1,3 0-136,5 0 0,2 0 0,0 0 0,2 0 0,-11 0 0,1 0 0,-1 0 0,10 0 0,0 0 0,0 0 0,-4 0 0,-2 0 0,8 0 0,-43 0 0,20 0 0,-7 0 0,11 0 0,7 0 0,-15 0 0,11 16 0,-11-12 0,15 11 0,-15-15 0,-5 0 0,-15 0 0,0 0 0</inkml:trace>
+  <inkml:trace contextRef="#ctx0" brushRef="#br0" timeOffset="35615">8872 14887 24575,'43'0'0,"-10"0"0,3 0 0,5 0 0,0 0 0,5 0 0,-1 0 0,-10 0 0,0 0 0,7 0 0,-2 0 0,-11 0 0,1 0 0,3 0 0,2 0 0,-1 0 0,4 0 0,-1 0 0,6 1 0,0-2 0,-6-6 0,-4-1 0,7 4 0,7-12 0,-43 16 0,27 0 0,-4 0 0,19 1 0,8-2 0,-19-4 0,-1-1 0,3 1-315,0 3 0,3 2 0,1 0 1,-2-2 314,9-2 0,-1-2 0,-1 1 0,-3-1 0,-1 0 0,-2 2 0,-3 3 0,-1 0 0,-3-1 0,5-6 0,-5 0 0,2 8 0,-19 0 0,-16 0 0,0 0 0,0 0 0</inkml:trace>
+  <inkml:trace contextRef="#ctx0" brushRef="#br0" timeOffset="58283">8767 14781 24575,'25'0'0,"0"0"0,2 0 0,1 0 0,6 0 0,4 0 0,0 0 0,-1 0 0,0 0 0,1 0-623,5 0 0,2 0 0,0 0 623,1 0 0,1 0 0,-3 0 0,-6 0 0,-3 0 0,2 0 0,4 0 0,0 0 0,-1 0 301,7 0 1,-4 0-302,-15 0 0,-1 0 309,20 0-309,-43 0 0,27 0 0,-11 0 0,13 0 0,8 0 0,-7 1 0,2-1 0,2-1-126,-2 0 1,2-1 0,2-1 0,-1 2 125,1 0 0,2 1 0,-2 0 0,-2-1 0,1-2 0,-3 0 0,-1 1 0,11 1 0,-10 2 0,-16-1 0,-4 0 0</inkml:trace>
+  <inkml:trace contextRef="#ctx0" brushRef="#br0" timeOffset="63833">14852 11571 24575,'35'0'0,"-10"0"0,1 0 0,8 0 0,3 0 0,7 0 0,2 0 0,-11 0 0,0 0 0,1 0-182,-1 0 1,0 0 0,1 0 181,-1 0 0,1 0 0,-2 0 0,8 0 0,-1 0 67,2 0 0,-2 0-67,6 0 0,-12 0 0,-3 0 0,-28 0 0,11 0 410,1 0-410,19 0 0,6-7 0,4-2 0,2 7 0,1 1 0,-13-4 0,1-2 0,-2 3 0,3 4 0,-3 0 0,0-8 0,-1 0 0,6 4 0,-4-11 0,-4 15 0,-27 0 0,12 0 0</inkml:trace>
+  <inkml:trace contextRef="#ctx0" brushRef="#br0" timeOffset="72849">7902 14852 24575,'39'0'0,"-1"0"0,1 0 0,3 0 0,-2 0 0,-4 0 0,-5 0 0,-12 0 0,-3 0 0,-16 0 0</inkml:trace>
+</inkml:ink>
+</file>
+
+<file path=ppt/ink/ink15.xml><?xml version="1.0" encoding="utf-8"?>
+<inkml:ink xmlns:inkml="http://www.w3.org/2003/InkML">
+  <inkml:definitions>
+    <inkml:context xml:id="ctx0">
+      <inkml:inkSource xml:id="inkSrc0">
+        <inkml:traceFormat>
+          <inkml:channel name="X" type="integer" min="-2.14748E9" max="2.14748E9" units="cm"/>
+          <inkml:channel name="Y" type="integer" min="-2.14748E9" max="2.14748E9" units="cm"/>
+          <inkml:channel name="F" type="integer" max="32767" units="dev"/>
+        </inkml:traceFormat>
+        <inkml:channelProperties>
+          <inkml:channelProperty channel="X" name="resolution" value="1000" units="1/cm"/>
+          <inkml:channelProperty channel="Y" name="resolution" value="1000" units="1/cm"/>
+          <inkml:channelProperty channel="F" name="resolution" value="0" units="1/dev"/>
+        </inkml:channelProperties>
+      </inkml:inkSource>
+      <inkml:timestamp xml:id="ts0" timeString="2026-02-04T20:51:57.300"/>
+    </inkml:context>
+    <inkml:brush xml:id="br0">
+      <inkml:brushProperty name="width" value="0.05292" units="cm"/>
+      <inkml:brushProperty name="height" value="0.05292" units="cm"/>
+      <inkml:brushProperty name="color" value="#FF0000"/>
+    </inkml:brush>
+  </inkml:definitions>
+  <inkml:trace contextRef="#ctx0" brushRef="#br0">5062 11642 24575,'42'0'0,"0"0"0,0 0 0,8 0 0,0 0 0,-7 0 0,1 0 0,-2 0 0,4 0 0,-6 0 0,0 0 0,7 0 0,-28 0 0,5-8 0,3 0 0,0 6 0,1 0 0,7-6 0,1 0 0,-1 7 0,0 2 0,0-1 0,1 0 0,6 0 0,2 0 0,-3 0 0,0 0 0,-7 0 0,1 0 0,0 0 0,15 0 0,-2 0 0,-2 0 0,-2 0 0,-7 0 0,-3 0 0,-9 0 0,1 0 0,12 0 0,6 0 0,-1 0 0,5 0 0,2 0-647,-11 0 0,1 0 1,2 0-1,1 0 0,1 0 647,-2 0 0,2 0 0,0 0 0,1 0 0,0 0 0,0 0 0,-2 0 0,1 0 0,0 0 0,-1 0 0,-1 0 0,0 0 0,3 1 0,0-1 0,-2 1 0,-1-1 0,-1-2-11,1-1 0,0-1 0,-4-1 0,-3 2 11,3 1 0,-6 0 0,15-14 0,-59 16 0,24 0 0,-27 0 3225,-1 0-3225,12 0 53,-12 0-53,16 16 0,0-12 0,0 11 0,16-15 0,27 0 0,-2 7 0,6 2 0,-12-4 0,2 0 0,1 0 0,1 0-469,1-1 0,1 1 1,1 0-1,0 0 469,6 3 0,1 1 0,0 0 0,-3-3 0,-1-4 0,-3-2 0,0 2 0,0 3 0,-1 1 0,-6-2 0,4-4 0,8 0 0,-43 0 0,35 16 0,-14-6 0,3 0 0,18-1 0,6 1 72,-7 0 1,2 2-1,2-3-72,-9-3 0,0-1 0,1-1 0,-1 1 0,9 2 0,0-1 0,-2 1 0,-5-1 0,-1-1 0,-3-1 0,9-3 0,-7-2 0,-1 1 0,8 0 0,-20 0 0,-2 0 0,3 0 829,4 0 0,-1 0-829,-3 0 0,-1 0 0,-1 0 0,-1 0 0,10 0 0,-15 0 0,11 0 0,-27 0 0,12 0 0,-16 0 0,15-15 0,-11 11 0,12-12 0,-16 16 0,0-16 0,0 12 0,0-11 0,16-1 0,-12 12 0,11-11 0,1 15 0,3 0 0,12 0 0,5 0 0,0 0 0,3 0 0,-5 0 0,2 0 0,-1 0 0,12 0 0,-3 0 0,-8 0 0,-2 0 0,-6-1 0,-5 2 0,-3-1 0,-5 0 0,-15 0 0,0 0 0,0 0 0</inkml:trace>
+  <inkml:trace contextRef="#ctx0" brushRef="#br0" timeOffset="2683">11395 11748 24575,'11'0'0,"19"0"0,11 0 0,-8 0 0,3 0 0,4 0 0,4 0-469,-4 0 1,4 0 0,4 0 0,1 0 0,0 0 0,-1 0 0,-3 0-79,1-1 1,-2 2 0,0-1 0,0 0 0,0 0 0,1 0 368,-2 0 1,1 0-1,1 0 1,0 0-1,-1 0 1,-2 0 0,-3 0 726,8 0 0,-2 0 0,-4 0 0,-4 0-549,7 0 0,-6 0 618,-9 0 1,-7 0-619,-6 0 0,-16 0 0</inkml:trace>
+  <inkml:trace contextRef="#ctx0" brushRef="#br0" timeOffset="6350">7938 12577 24575,'43'0'0,"-10"0"0,6 0 0,4 0 0,-6 0 0,2 0 0,2 0 0,2 0 0,1 0-469,-3 0 1,2 0 0,2 0 0,0 0 0,2 0 0,-1 0 0,1 0 58,-4 0 0,2 0 1,0 0-1,0 0 1,0 0-1,1 0 0,-1 0 1,-1 0 114,6 0 0,0 0 1,0 0-1,0 0 1,-1 0-1,-1 0 1,0 0 258,4 0 1,-1 0 0,0 0 0,-1 0 0,-2 0 0,-2 0 35,-2 0 0,-1 0 0,-2 0 0,-1 0 0,0 0 287,5 0 1,-2 0 0,0 0 0,-4 0-288,1 0 0,-4 0 0,2 0 0,5-1 0,1 1 0,6 1 0,-9 0 0,4 1 0,4 1 0,3-1 0,0 1 0,0-1 0,-2 0-410,-7-1 0,0 0 1,-1-1-1,1 0 1,0 1-1,1-1 0,2 0 1,1 1 321,-2 0 0,1 0 1,2 1-1,1 0 1,1-1-1,1 1 0,-1 0 1,1-1-1,-1 1 1,-1-1-1,-1 0-16,1-1 0,-1 0 0,0 0 0,0 0 0,-1 0 0,1-1 0,-1 1 1,0 0-1,0 0 0,0 1 104,0 0 0,0 0 0,-1 1 0,1 0 0,-1-1 0,1 1 0,-1 0 0,0 0 0,-1-1 0,1 0-111,2 0 1,0 0 0,0-1 0,0 0 0,0 0 0,-1 0 0,-1 1-1,1-1 1,-2 1 110,2 1 0,-1 0 0,0 0 0,0 1 0,-1-1 0,-1 0 0,0 0 0,-1-1-118,7 0 0,0-2 0,-1 1 0,-1-1 1,-1 1-1,-1 1 118,1 1 0,-2 1 0,0 1 0,0-1 0,2 1 0,-1-1 0,1-1 0,1 1 0,-1 0 0,0 1 0,-4 0 0,8 4 0,-3 1 0,-1 1 0,3-1 0,-8-3 0,3 0 0,0-1 0,0 1 0,-1 0 0,-2 0 0,8 2 0,-2 1 0,-1 0 0,2 0 0,-6-1 0,1-1 0,0 0 0,0 0 0,1-1 0,0 0 0,2-1 0,-1 0 0,0 0 0,1 2 0,0 1 0,-1 2 0,1 0 0,1 1 0,3-1 0,-10-2 0,3-1 0,1 1 0,1 0 0,0 0 0,0 0 0,-2 0 0,-1 0 0,3 1 0,-1 1 0,-2 0 0,0 0 0,1-1 0,1 1 0,0 0 0,1 0 0,1 0 0,0 0 0,-1 0 0,-1-1 0,-3-1 0,2 0 0,-2-1 0,-2 0 0,0-1 0,0 1 500,6 2 0,0 0 0,0 0 0,0 0-500,-1-1 0,-1 1 0,1 0 0,1 0 0,-5-2 0,0 0 0,1 0 0,0 0 0,0 0 455,-1 0 1,-1 0-1,0 0 1,1 1-1,1-2-455,2 2 0,0-2 0,1 1 0,2 0 0,2 1 0,-9-2 0,3 0 0,1 0 0,1 0 0,0 1 0,0-1 0,-1 1 0,-1 0 0,0 0 0,0 1 0,-2 0 0,1 0 0,0 0 0,0 0 0,3 0 74,0-1 0,3 0 0,0-1 0,1 1 0,0 0 0,-1 0 0,-2-1 0,-1 1-74,3 2 0,-1 0 0,-2 0 0,0-1 0,-1 1 0,1-2 0,1 0 0,-1 0 0,0-1 0,0 0 0,0-1 0,0 0-24,5-1 0,0 0 0,-1-1 0,1 1 0,0 0 24,-8 1 0,1 1 0,-1 0 0,1 0 0,-1-1 0,1-1 0,6-2 0,1-2 0,-1-1 0,0 1 0,0 3 0,0 2 0,-1 1 0,-1 2 0,1-1 0,0-2-49,-2-3 1,0-1-1,0-1 1,0 0 0,-1 1 48,-4 1 0,-1 1 0,-1 1 0,2-1 0,2 1 127,1-2 0,3 1 0,1 0 1,1 0-1,0-1 0,0 0-127,-6-1 0,0 0 0,0-1 0,0 0 0,0 0 0,1 1 0,-1 0 0,6 1 0,1 1 0,-1 0 0,1 0 0,-1 0 0,0-1 224,-2-1 0,2-1 0,-1 0 1,-1-1-1,-2 1 0,-3 0-224,1 0 0,-2 0 0,-3 0 0,1 0 0,9 0 0,-1 0 0,-1 0 781,-6 1 1,-2-1 0,-3-1-782,3-7 0,-3 0 1029,-3 8 1,-5-4-1030,-8-27 1322,13 11-1322,-28 1 0,11 3 0,-15 16 0</inkml:trace>
+  <inkml:trace contextRef="#ctx0" brushRef="#br0" timeOffset="7465">22260 13582 24575,'34'0'0,"0"0"0,0 0 0,2 0 0,0 0 0,2 0 0,8 0 0,2 0 0,-1 0-471,-5 0 1,0 0 0,-1 0 470,1 0 0,-1 0 0,-2 0 0,7 0 0,-2 0 96,3 0 0,0 0-96,-4 0 0,2 0 0,-3 1 0,2-1 0,0-1-441,-2-3 1,0-2 0,3 0 440,0 2 0,2 1 0,1-1 0,0-4 0,-8-3 0,-2-2 0,1-1 0,3-1 0,3 1 0,-7 4 0,2 0 0,2 0 0,2 1 0,1-1 0,0 0 0,1 0 0,-1 0 0,0-1-365,2-1 1,0 0 0,0 0 0,0 0 0,1-1 0,0 1 0,0-1 0,0 1 0,-1 0 132,2 0 0,0 0 1,0 0-1,0 0 0,0 0 1,0 0-1,-1 1 1,0-1-1,-1 1 232,3 0 0,0-1 0,-1 1 0,0 0 0,-1 1 0,-1-1 0,-2 1 0,-2 0-256,7-2 0,-3 1 0,-2 0 0,-1 1 0,1-1 256,0 1 0,-1-1 0,0 1 0,0 0 0,-2 0-200,4 1 1,-1 0-1,-1 1 1,0-1 199,-2 0 0,1 0 0,-2 0 0,-3 1 315,1 0 1,-3 2 0,-1 0-316,10-3 0,-4 2 1638,-14 7 0,-3 0-836,2-3 1,-1-1 452,2 3 0,1 0-1255,7-11 0,1 0 821,-8 10 0,-1 0-821,0-6 0,-3 0 0,-5 8 0,-3 0 0,-16 0 0</inkml:trace>
+</inkml:ink>
+</file>
+
+<file path=ppt/ink/ink16.xml><?xml version="1.0" encoding="utf-8"?>
+<inkml:ink xmlns:inkml="http://www.w3.org/2003/InkML">
+  <inkml:definitions>
+    <inkml:context xml:id="ctx0">
+      <inkml:inkSource xml:id="inkSrc0">
+        <inkml:traceFormat>
+          <inkml:channel name="X" type="integer" min="-2.14748E9" max="2.14748E9" units="cm"/>
+          <inkml:channel name="Y" type="integer" min="-2.14748E9" max="2.14748E9" units="cm"/>
+          <inkml:channel name="F" type="integer" max="32767" units="dev"/>
+        </inkml:traceFormat>
+        <inkml:channelProperties>
+          <inkml:channelProperty channel="X" name="resolution" value="1000" units="1/cm"/>
+          <inkml:channelProperty channel="Y" name="resolution" value="1000" units="1/cm"/>
+          <inkml:channelProperty channel="F" name="resolution" value="0" units="1/dev"/>
+        </inkml:channelProperties>
+      </inkml:inkSource>
+      <inkml:timestamp xml:id="ts0" timeString="2026-02-04T20:53:04.966"/>
+    </inkml:context>
+    <inkml:brush xml:id="br0">
+      <inkml:brushProperty name="width" value="0.05292" units="cm"/>
+      <inkml:brushProperty name="height" value="0.05292" units="cm"/>
+      <inkml:brushProperty name="color" value="#FF0000"/>
+    </inkml:brush>
+  </inkml:definitions>
+  <inkml:trace contextRef="#ctx0" brushRef="#br0">1940 5891 24575,'20'0'0,"-4"0"0,-1 0 0,21 0 0,-10 0 0,2 0 0,7 0 0,1 0 0,-1 0 0,1 0 0,-5 0 0,0 0 0,4 0 0,-1 0 0,-2 0 0,-1 0 0,-4 0 0,0 0 0,-1 0 0,-1 0 0,1 0 0,-1 0 0,15 0 0,-14 0 0,-2 0 0,-4 0 0,11 0 0,-27 0 0,28 0 0,-28 0 0,11 0 0,-15 0 0,16 0 0,19 0 0,-8 0 0,1 0 0,0 0 0,-1 0 0,-1 0 0,-1 0 0,10 0 0,-15 0 0,-4 0 0,-16 0 0</inkml:trace>
+  <inkml:trace contextRef="#ctx0" brushRef="#br0" timeOffset="18100">6297 6967 24575,'20'0'0,"11"0"0,-27 0 0,27 0 0,-27 0 0,28 0 0,-28 0 0,11 0 0</inkml:trace>
+  <inkml:trace contextRef="#ctx0" brushRef="#br0" timeOffset="22017">9490 7073 24575,'-20'-15'0,"-11"11"0,11-12 0,-15 0 0,15-3 0,-11-1 0,27-11 0,-12 27 0,16-12 0,0 16 0,0 0 0</inkml:trace>
+  <inkml:trace contextRef="#ctx0" brushRef="#br0" timeOffset="49600">5574 7761 24575,'35'0'0,"-3"0"0,3 0 0,8 0 0,4 0-632,-7 0 0,3 0 0,-1 0 632,2 0 0,1 0 0,0 0 0,1 0 0,0 0 0,1 0 0,3 0 0,1 0 0,-3 0 0,2 0 0,-2 0 203,-8 0 1,2 0 0,-11 0-204,-7 0 314,23 0-314,-12 0 0,-9 0 0,3 0 0,3 0 0,3 0 0,0 0 0,11 0 0,2 0-151,-5 0 0,1 0 0,-2 0 151,5 0 0,-1 0 0,2 0 0,-2 0 474,-17 0 1,-3 0-475,9 0 0,-19 0 0,-16 0 0,0 0 0</inkml:trace>
+  <inkml:trace contextRef="#ctx0" brushRef="#br0" timeOffset="53100">11642 9137 24575,'35'0'0,"-7"0"0,3 0 0,4 0 0,2 0 0,4 0 0,1 0 0,-9 0 0,2 0 0,-2 0 0,12 0 0,1 0 0,-12 0 0,2 0 0,-1 0 0,1 0 0,0 0 0,-2 0 0,11 0 0,0 0 0,-5 0 0,1 0 0,-4 0 0,-5 0 0,-1 0 0,13 0 0,-6 0 0,-18 0 0,19 0 0,-2 0 0,7 0 0,6 0 0,-15 0 0,0 0 0,5 0 0,2 0 0,4 0 0,4 0 0,0 0 0,-3 0-656,-6 0 1,-1-1-1,-1 1 1,2 0 0,2 1 642,-2 0 1,2 1 0,2 0 0,1 1 0,0-1 0,-2 1-1,-1 0 13,7 0 0,-2 1 0,-1-1 0,1 1 0,2 1 0,-3 0 0,2 1 0,0 0 0,1 0 0,0 0 0,-1 1-526,-3-2 0,1 1 0,-1 0 0,0 0 0,1 0 0,-1 0 526,1 0 0,0 0 0,1 0 0,-1 0 0,1 0 0,-1-1 0,1-1 0,0-1 0,1 0 0,-1 0 0,-1 0 0,-1 1-210,3 1 0,-1 1 1,-2 1-1,3 0 0,2-1 210,-8-1 0,3-1 0,1 0 0,1 0 0,0 0 0,0 1 0,-2-1 0,-1 1 0,4 1 0,-2 1 0,-2 0 0,1 0 0,1-1 0,1 0-290,-5-1 1,1 0 0,1-1-1,1 1 1,-1-1 0,0 0 0,-2 0-1,-1 1 290,10 1 0,-2 2 0,-2-1 0,0-1 0,-1-2 0,-5-2 0,-1-1 0,0-1 0,-1 0 0,0 1 325,5 3 1,0 0 0,-1 1 0,-2-2-326,6-3 0,-2-1 0,1 2 582,-8 2 1,2 1 0,-3 1 0,-3-2-583,3-1 0,-2 0 578,15 7 0,-6-2-578,-17-7 3276,-9 0-3190,-3 0 1140,-16 0-1226,0-16 505,16 12-505,-12-27 0,11 27 0,-15-27 0,0 27 0,0-12 0,16 16 0,-12 0 0,12 0 0</inkml:trace>
+  <inkml:trace contextRef="#ctx0" brushRef="#br0" timeOffset="56550">11977 11359 24575,'33'0'0,"0"0"0,0 0 0,2 0 0,3 0 0,6 0 0,3 0 0,3 0 0,1 0-656,-4 0 1,0 0-1,1 0 1,2 0 0,1 0 186,-6 0 1,1 0 0,1 0 0,2 0 0,-1 0 0,1 0 0,-1 0-1,0 0 1,0 0 0,1 0 0,0 0 0,0 0 0,-1 0 0,2 0 444,-7 1 1,1-1 0,0 0-1,0 0 1,0 0 0,0 0 0,2 0-1,-1-1 24,1 0 0,1 0 0,1-1 0,1 0 0,-1 0 0,0 0 0,-2 0 0,-1 0 0,-2 1 0,5 0 0,-3 0 0,-1 1 0,-1 0 0,0-1 0,0 0 318,3-1 1,2-1 0,0 0 0,-2-1 0,-3 2 0,-5 0-319,4 2 0,-5 0 0,-6 0 0,8 0 0,8 0 3249,-43 0-3249,27 0 0,4 0 0,-5 1 0,5-1 0,2-1 1092,5-3 0,1-3 0,2 2-1022,-6 4 1,1 0 0,1 1 0,-1-1-71,0-3 0,0-1 0,0 1 0,-3 1 0,5 2 0,-3 1 0,-2 1 0,1-1 0,-4 0 0,5 0 0,-39 0 0,0 0 0,0 0 0</inkml:trace>
+  <inkml:trace contextRef="#ctx0" brushRef="#br0" timeOffset="58284">12806 12153 24575,'48'0'0,"1"0"0,-1 0 0,-7 0 0,-1 0 0,4 0 0,-5 0 0,3 0 0,1 0 0,0 0 0,-2 0-669,4 0 1,-1 0 0,-2 0 0,0 0 668,4 0 0,-1 0 0,1 0 0,-7 0 0,1 0 0,-1 0 0,-2 0 250,-2 0 0,-2 0 1,0 0-251,3 0 0,-1 0 0,-4 0 231,-2 0 1,-3 0-232,1 0 0,-3 0 0,-4 0 0,-5 0 1377,-15 0-1377,16 0 82,19 0-82,-2 0 0,5 0 0,-5 0 0,2 0 0,3 0 0,4 0 0,5 0 0,0 0 0,-3 0 0,-1 0 0,-3 0 0,1 0 0,8 0 0,1 0 0,-8 0 0,-14 0 0,-5 0 0,-4 0 0,-3 0 0,-16 0 0,0 0 0</inkml:trace>
+  <inkml:trace contextRef="#ctx0" brushRef="#br0" timeOffset="70866">19350 13988 24575,'0'-20'0,"31"4"0,7 14 0,10 4 0,-10-2 0,5 0 0,4 0 0,1 0 0,0 0-547,-5 0 1,1 0 0,1 0 0,1 0 0,0 0 0,0 0 77,-1 0 1,1 0 0,0 0 0,1 0 0,-1 0 0,0 0 0,-2 0 367,1 0 1,0 0 0,-2 0 0,0 0 0,-2 0 0,-3 0 732,14 0 0,-4 0 1,-3 0-633,6 0 0,-4 0 0,-16 1 0,4-2 0,-1 0 0,5-2 0,4-1 0,3 0 0,0 1 0,-3 0 0,1 1 0,3 0 0,0-1 0,2 1 0,-1-2 0,1 0-302,-2-1 1,2-1-1,0-1 1,0 0 0,0 0-1,1 0 1,-2 1 0,-1 0 301,3 1 0,1 1 0,-1 1 0,-1-1 0,-2 0 0,-1-1 0,-4-1 0,2-3 0,-1-2 0,-4 0 0,-2 1 0,-4 2 0,14 1 0,-7 2 0,-12-4 0,-5 2 3071,-4 7-3071,-3 0 122,15 0-122,7 0 0,11 0 0,-12 1 0,6-1 0,3 1 0,0-2 0,-3 0 704,3-2 1,-1-1-1,0-1 1,1 2-705,-3 2 0,3 2 0,-1-1 0,-3 0 0,-6-4 0,11-12 0,-8 0 0,-12 14 0,-3 0 0,12-13 0,-6 13 0,6 4 0,1-2 0,4 0 0,3 0-641,-2-1 0,2 1 0,2 0 0,2 1 641,-2 1 0,2 1 0,1 1 0,-1 0 0,0-2 0,-3 0 0,-1-2 0,-1 0 0,0 1 0,0 0-191,5 3 1,-1 1-1,-1-1 1,-3-1 190,0-2 0,-2-2 0,-4 1 682,1 0 0,-5 0-682,2 0 0,-3 0 0,-8 0 0,3 0 0,8 0 0,4 0 0,9 0 0,2 0 0,-5 0 0,-2 0 1329,-10 0 1,-3 0-1330,-3 0 0,-3 0 961,-5 0-961,28 0 0,-3 4 0,9 3 0,-1-2 0,-4-3 0,-1-2 0,3 2-234,-7 0 0,4 2 0,1 0 0,-3-1 0,-4-1 234,-1-1 0,-4-1 0,-2-1 0,11 1 0,-8 0 0,-17 0 0,-5 0 0,-15 16 0,0-12 0,-15 12 1170,11-16-1170,-12 0 0,16 0 0,0 7 0,-16-5 0,12 6 0,-11-8 0,15 0 0,0 0 0,0 0 0</inkml:trace>
+  <inkml:trace contextRef="#ctx0" brushRef="#br0" timeOffset="102000">19420 13847 24575,'28'-10'0,"-1"0"0,-1 1 0,-1 2 0,1 6 0,-1 2 0,14-1 0,-5 0 0,-1 0 0,6 0 0,-3 0 0,-21 0 0,-15 0 0</inkml:trace>
+</inkml:ink>
+</file>
+
+<file path=ppt/ink/ink17.xml><?xml version="1.0" encoding="utf-8"?>
+<inkml:ink xmlns:inkml="http://www.w3.org/2003/InkML">
+  <inkml:definitions>
+    <inkml:context xml:id="ctx0">
+      <inkml:inkSource xml:id="inkSrc0">
+        <inkml:traceFormat>
+          <inkml:channel name="X" type="integer" min="-2.14748E9" max="2.14748E9" units="cm"/>
+          <inkml:channel name="Y" type="integer" min="-2.14748E9" max="2.14748E9" units="cm"/>
+          <inkml:channel name="F" type="integer" max="32767" units="dev"/>
+        </inkml:traceFormat>
+        <inkml:channelProperties>
+          <inkml:channelProperty channel="X" name="resolution" value="1000" units="1/cm"/>
+          <inkml:channelProperty channel="Y" name="resolution" value="1000" units="1/cm"/>
+          <inkml:channelProperty channel="F" name="resolution" value="0" units="1/dev"/>
+        </inkml:channelProperties>
+      </inkml:inkSource>
+      <inkml:timestamp xml:id="ts0" timeString="2026-02-04T20:55:49.516"/>
+    </inkml:context>
+    <inkml:brush xml:id="br0">
+      <inkml:brushProperty name="width" value="0.05292" units="cm"/>
+      <inkml:brushProperty name="height" value="0.05292" units="cm"/>
+      <inkml:brushProperty name="color" value="#FF0000"/>
+    </inkml:brush>
+  </inkml:definitions>
+  <inkml:trace contextRef="#ctx0" brushRef="#br0">15575 12912 24575,'41'0'0,"-1"0"0,1 0 0,4 0 0,2 0 0,2 0 0,-7 0 0,2 0 0,0 0 0,2 0-656,-5 0 1,2 0-1,0 0 1,0 0 0,-1 0 370,6 0 1,0 0 0,0 0 0,0 0 284,-7 0 0,2 0 0,0 0 0,-2 0 0,-3 0 400,5 0 1,-3 0 0,-2 0-401,-2 0 0,-1 0 0,-4 0 150,-3 0 1,-5 0-1,-3 0 1,-5 0 0</inkml:trace>
+  <inkml:trace contextRef="#ctx0" brushRef="#br0" timeOffset="2200">27358 11536 24575,'41'0'0,"0"0"0,-3 0 0,3 0 0,0 0 0,4 0 0,-2 0 0,4 0 0,-2 0 0,-4 0 0,-4 0 0,-10 0 0,-3 0 0,12 0 0,-17 0 0,-3 0 0,-16 0 0,16 0 0,-12 0 0,43 0 0,-14 0 0,4 0 0,-3 0 0,3 1 0,2-2-310,7-4 1,2-1 0,-1 1 309,-4 4 0,0 0 0,-4-1 0,9-6 0,-5 1 0,-15 6 0,-5 2 0,-8-1 0</inkml:trace>
+</inkml:ink>
+</file>
+
+<file path=ppt/ink/ink18.xml><?xml version="1.0" encoding="utf-8"?>
+<inkml:ink xmlns:inkml="http://www.w3.org/2003/InkML">
+  <inkml:definitions>
+    <inkml:context xml:id="ctx0">
+      <inkml:inkSource xml:id="inkSrc0">
+        <inkml:traceFormat>
+          <inkml:channel name="X" type="integer" min="-2.14748E9" max="2.14748E9" units="cm"/>
+          <inkml:channel name="Y" type="integer" min="-2.14748E9" max="2.14748E9" units="cm"/>
+          <inkml:channel name="F" type="integer" max="32767" units="dev"/>
+        </inkml:traceFormat>
+        <inkml:channelProperties>
+          <inkml:channelProperty channel="X" name="resolution" value="1000" units="1/cm"/>
+          <inkml:channelProperty channel="Y" name="resolution" value="1000" units="1/cm"/>
+          <inkml:channelProperty channel="F" name="resolution" value="0" units="1/dev"/>
+        </inkml:channelProperties>
+      </inkml:inkSource>
+      <inkml:timestamp xml:id="ts0" timeString="2026-02-04T20:56:13.466"/>
+    </inkml:context>
+    <inkml:brush xml:id="br0">
+      <inkml:brushProperty name="width" value="0.05292" units="cm"/>
+      <inkml:brushProperty name="height" value="0.05292" units="cm"/>
+      <inkml:brushProperty name="color" value="#FF0000"/>
+    </inkml:brush>
+  </inkml:definitions>
+  <inkml:trace contextRef="#ctx0" brushRef="#br0">5256 4745 24575,'34'0'0,"-1"0"0,0 0 0,2 0 0,3 0 0,0 0 0,2 0 0,1 0 0,1 0-409,-1 0 1,1 0 0,0 0 0,-3 0 408,5 0 0,-2 0 0,-2 0 264,4 0 1,-6 0-265,-3 0 271,-15 0-271,-4 0 0,-1 0 0,-11 0 833,35 0-833,3 0 0,11 0 0,-1 0 0,-14 0 0,-1 0 0,1 0 0,2 0-385,3 0 1,3 0 0,2 0 0,-2 0 0,-1 0 384,0 0 0,0 0 0,-3 0 0,-2 0 0,-1 0 0,-3 0 0,-1 0 0,10 0 0,-4 0 0,2 0 0,-10 0 0,-5 0 0,9-1 0,8 2 0,-9 5 0,4 3 0,1 0 0,-1-2 0,7-3 0,-1-3 0,2 2 0,-5 4 0,2 3 0,-2-1 0,-5-4 0,0-4 0,-6-2 0,3 1 0,-19 0 0</inkml:trace>
+</inkml:ink>
+</file>
+
+<file path=ppt/ink/ink19.xml><?xml version="1.0" encoding="utf-8"?>
+<inkml:ink xmlns:inkml="http://www.w3.org/2003/InkML">
+  <inkml:definitions>
+    <inkml:context xml:id="ctx0">
+      <inkml:inkSource xml:id="inkSrc0">
+        <inkml:traceFormat>
+          <inkml:channel name="X" type="integer" min="-2.14748E9" max="2.14748E9" units="cm"/>
+          <inkml:channel name="Y" type="integer" min="-2.14748E9" max="2.14748E9" units="cm"/>
+          <inkml:channel name="F" type="integer" max="32767" units="dev"/>
+        </inkml:traceFormat>
+        <inkml:channelProperties>
+          <inkml:channelProperty channel="X" name="resolution" value="1000" units="1/cm"/>
+          <inkml:channelProperty channel="Y" name="resolution" value="1000" units="1/cm"/>
+          <inkml:channelProperty channel="F" name="resolution" value="0" units="1/dev"/>
+        </inkml:channelProperties>
+      </inkml:inkSource>
+      <inkml:timestamp xml:id="ts0" timeString="2026-02-04T20:58:21.899"/>
+    </inkml:context>
+    <inkml:brush xml:id="br0">
+      <inkml:brushProperty name="width" value="0.05292" units="cm"/>
+      <inkml:brushProperty name="height" value="0.05292" units="cm"/>
+      <inkml:brushProperty name="color" value="#FF0000"/>
+    </inkml:brush>
+  </inkml:definitions>
+  <inkml:trace contextRef="#ctx0" brushRef="#br0">11642 10001 24575,'49'0'0,"0"0"0,-15 0 0,0 0 0,2 0 0,1 0 0,1 0 0,0 0 0,-1 0 0,0 0 0,-1 0 0,0 0 0,0 0 0,-2 0 0,3 0 0,-4 0 0,-6 0 0,-3 0 0,12 0 0,-17 0 0,13 0 0,-29 0 0,29 0 0,0 0 0,2 0 0,13 0 0,-3 0 0,-5 0 0,-20 0 0,-3 0 0,0 0 0,-12-8 0,11 6 0,-15-5 0,0 7 0</inkml:trace>
+  <inkml:trace contextRef="#ctx0" brushRef="#br0" timeOffset="1517">18450 9984 24575,'28'0'0,"-1"0"0,0 0 0,-3 0 0,-4 0 0,-5 0 0</inkml:trace>
+  <inkml:trace contextRef="#ctx0" brushRef="#br0" timeOffset="3417">19420 9984 24575,'-19'7'0,"3"-5"0,16 6 0,-16-8 0,-3 0 0,-1 0 0,5 0 0,-1 0 0,4 0 0,-21-8 0,5 6 0,4-2 0,-3 1 0,1 3 0,-2 0 0,-7-8 0,-1 0 0,0 6 0,1 0 0,7-5 0,2-2 0,-10-6 0,21 11 0,-1-12 0,12 16 0,-12 0 0,1 0 0,-21 0 0,10 0 0,-2 0 0,-7 0 0,-1 0 0,-1 0 0,3 0 0,-5 0 0,-8 0 0,43 0 0,-11 16 0,15-12 0,0 11 0,0-15 0,0 16 0,0-12 0,0 12 0,0-16 0</inkml:trace>
+  <inkml:trace contextRef="#ctx0" brushRef="#br0" timeOffset="27631">4886 10742 24575,'34'0'0,"0"0"0,0 0 0,3 0 0,1 0 0,4 0 0,-4 0 0,3 0 0,4 0 0,0 0 0,-1 0 0,-4 0-820,6 0 1,-4 0 0,1 0 0,3 0 606,-4 0 1,4 0-1,1 0 1,0 0 0,-2 0-1,-6 0 213,8 0 0,-6 0 0,1 0 377,2 0 1,0 0 0,-3 0-378,4 0 0,-2 0 398,-3 0 1,-1 0-399,-3 0 0,-2 0 0,-6 0 0,-1 0 0,0 0 0,-3 0 2391,-4 0-2391,11 0 231,-12 0-231,17 0 0,-17 0 0,-3 0 0</inkml:trace>
+  <inkml:trace contextRef="#ctx0" brushRef="#br0" timeOffset="28763">8308 10813 24575,'0'0'0</inkml:trace>
+  <inkml:trace contextRef="#ctx0" brushRef="#br0" timeOffset="80231">4745 6967 24575,'34'0'0,"0"0"0,0 0 0,11 0 0,2 0 0,2 0 0,-8 0 0,2 0 0,1 0 0,0 0-286,-3 0 0,0 0 0,0 0 0,2 0 0,1 0 286,-1 0 0,2 0 0,1 0 0,0 0 0,-2 0 0,-1 0-419,8 0 0,-3 0 0,0 0 0,1 0 419,-6 0 0,1 0 0,1 0 0,-3 0 0,-5 0 0,1 0 0,-4 0 0,-2 0 364,8 0 1,-1 0-365,-5 0 0,2 0 0,1 0 0,4 0 0,-1 0 0,8 0 0,2 0-267,-14 3 1,3 2 0,1 0 0,-2-2 266,4-2 0,-1-1 0,1 3 0,-5 3 0,1 4 0,0-1 0,-2-3 0,3-3 0,-2-3 0,-1 1 313,5 7 1,-4 0-314,10-8 1610,-43 0-1610,27 0 0,-27 0 0,12 0 1205,15 16-1205,1-14 0,7 0 0,5 7 0,5 3 0,-1-2 0,-8-8 0,-1-2 0,0 2 0,2 3 0,1 1 0,-8-2 0,1-4 0,-35 16 0,-3-12 0,-13 12 0</inkml:trace>
+  <inkml:trace contextRef="#ctx0" brushRef="#br0" timeOffset="81601">4022 7761 24575,'40'0'0,"0"0"0,0 0 0,0 0 0,1 0 0,3 0 0,1 0 0,3 0 0,1 0 0,1 0 0,-8 0 0,0 0 0,2 0 0,1 0 0,1 0 0,1 0 0,1 0 0,0 0 0,1 0-274,-5 0 1,1 0 0,1 0 0,1 0 0,0 0 0,1 0 0,0 0 0,0 0 0,1 0 0,-1 0 0,1 0 0,-1 0 20,-2 0 1,0 0 0,0 0 0,1 0 0,-1 0 0,1 0 0,0 0 0,0 0 0,0 0 0,0 0 0,0 0 0,0 0 0,0 0-1,1 0 1,0 0 0,1 0 0,-1 0 0,1 0 0,0 0 0,-1 0 0,1 0 0,-1 0 0,0 0 0,0 0 0,-1 0 0,-1 0-46,5 0 0,0 0 0,-1 0 0,0 0 0,0 0 0,-1 0 0,0 0 0,0 0 1,-1 0-1,1 0 0,-2 0 221,2 0 0,0 0 1,0 0-1,-1 0 0,0 0 1,-1 0-1,0 0 0,-1 0 1,0 0-1,0 0 77,4 0 0,1 0 0,-1 0 0,-1 0 0,-1 0 0,-1 0 0,-1 0 0,-1 0-15,2 0 0,-2 0 0,-1 0 0,-2 0 0,1 0 1,-2 0 14,6 0 0,1 0 0,-2 0 0,-4 0 0,-5 0 0,5 0 0,-6 0 0,-4 0 0,-1 0 0</inkml:trace>
+  <inkml:trace contextRef="#ctx0" brushRef="#br0" timeOffset="96016">19050 1111 24575,'16'-19'0,"3"3"0,5 14 0,3 4 0,12-2 0,-1-1 0,-1 2 0,4 15 0,-3-16 0,-1 4 0,-17 10 0,-1 3 0,14 0 0,0 1 0,-13 1 0,0 1 0,9 3 0,7 0 0,-3-2 0,-2-1 0,0-1 0,-2-2 0,1 0 0,-2 0 0,-1 5 0,-4-1 0,-3-3 0,-4 2 0,3 23 0,13-8 0,-13 0 0,1 1 0,-4-11 0,-1 0 0,5 15 0,-3 2 0,1-2 0,2-13 0,-10 5 0,-5-1 0,-5-11 0,0-1 0,0 13 0,16 3 0,-12 4 0,12-6 0,-1 1 0,-13-7 0,0 1 0,14 6 0,0 2 0,-14 0 0,0-1 0,6-7 0,-1-1 0,-7 16 0,0-10 0,0-21 0,0 19 0,0-11 0,0 15 0,0 0 0,0 1 0,0-17 0,0 13 0,0-13 0,0 1 0,0 11 0,0 4 0,0 5 0,0-8 0,0 2 0,0-6 0,0-1 0,0 0 0,0 1 0,0 5 0,0 1 0,1-7 0,-2 1 0,-6 0 0,-1-2 0,4 10 0,-12-5 0,16-27 0,0 27 0,-16-27 0,12 28 0,-11-13 0,-1 16 0,12-7 0,-12-10 0,1 5 0,11-3 0,-28 15 0,29-15 0,-13 11 0,0-27 0,12 12 0,-11-1 0,-1 5 0,-4 15 0,-15 0 0,17-9 0,1-1 0,-1-5 0,0-1 0,1 7 0,-1-1 0,-17 11 0,0-1 0,15 0 0,4-15 0,1 11 0,11-27 0,-12 12 0,16-16 0,0 0 0,0 0 0</inkml:trace>
+  <inkml:trace contextRef="#ctx0" brushRef="#br0" timeOffset="103135">25347 2046 24575,'35'0'0,"-10"0"0,1 0 0,1 0 0,1 0 0,7 0 0,1 0 0,-8 0 0,-1 0 0,8 0 0,-19 0 0,-16 0 0,31 0 0,-5 0 0,3 0 0,10 0 0,4 0 0,-9 0 0,1 0 0,0 0 0,14 0 0,0 0 0,-4 0 0,0 0 0,0 0 0,-4 0 0,-12 0 0,-3 0 0,10 0 0,-21 0 0,1-16 0,19 13 0,-9-5 0,3 0 0,6-1 0,1 2 0,-8 6 0,-2-2 0,10-12 0,11 15 0,-21-8 0,3 0 0,16 6 0,8 0-665,-11-4 1,5-4-1,2 1 1,-1 3 664,-1 3 0,1 2 0,1 2 0,3-2 0,-12-1 0,4 0 0,1-1 0,0 0 0,0 1 0,-2-1 0,-3 2 0,7 0 0,-3 1 0,-1 1 0,1-1 0,5 0 0,3 0 0,-4 0 0,-9 0 0,-9 0 0,-5 0 0,1 0 0,-1 0 0,0 0 0,1 0 0,8 0 0,3 0 0,-4 0 0,3 0 0,0 0-159,1 0 1,-1 0 0,1 0 158,4 0 0,1 0 0,-3 0 0,-1 0 0,-2 0 1293,0 0 1,-5 0-1294,-12 0 0,13 0 0,3 0 0,-4 0 0,8 0 0,3 0 273,-17 0 0,1 0-273,17 0 0,0 0 0,-15 0 0,-1 0 0,0 0 0,-3 0 0,-5 0 0,-3 0 0,-16 0 0,0 0 0,16 16 0,3-12 0,17 11 0,-1-15 0,-16 0 0,13 0 0,-28 0 0,11 0 0</inkml:trace>
+  <inkml:trace contextRef="#ctx0" brushRef="#br0" timeOffset="105216">25770 3193 24575,'30'0'0,"-1"0"0,6 0 0,3 0 0,8 0 0,6 0 0,-7 0 0,7 0 0,1 0 0,-3 0 0,-1 0 0,-3 0 0,4 0-622,-8 0 1,3 0 0,1 0 0,-1 0 0,-4 0 621,6 0 0,-3 1 0,-2-2 0,0-4 0,-1-1 0,0 1 156,-3 3 0,0 2 1,0-2-157,-2-3 0,0-1 0,-3 1 312,6 6 1,-3-2-313,-1-6 0,-3-1 0,3 4 0,-16-12 1583,13 16-1583,6 0 0,6 0 0,3 0 0,4 0-312,-13 0 1,4 0 0,1 0 0,-1 0 311,-2 0 0,-1 0 0,1 0 0,-1 0 0,0 0 0,-1 0 0,1 0 0,-2 0-314,11 0 1,-1 0 0,-1 0 313,1 0 0,-1 0 0,-1 0 0,-8 0 0,-1 0 0,0 0 0,4 0 0,1 0 0,0 0 0,-1 1 0,1-1 0,-1-1 0,3-3 0,0-2 0,5 0 0,-5 3 0,6 0 0,1-1 0,-1 0 0,-3-1 0,-1-3 0,-3-2 0,0 1 0,1 1 0,-2 2 0,3 3 0,-1-1 0,-2 1 0,-6-1 0,12-5 0,-8 2 0,-12 7 0,-3 0 0,12 0 0,-1 0 0,0 0 1590,0 0-1590,-7 0 1024,-11 0-1024,7 0 0,-20 16 0,12-12 0,-16 12 0,-16-16 0,12 0 0,-12 0 0,16 0 0</inkml:trace>
+</inkml:ink>
+</file>
+
 <file path=ppt/ink/ink2.xml><?xml version="1.0" encoding="utf-8"?>
 <inkml:ink xmlns:inkml="http://www.w3.org/2003/InkML">
   <inkml:definitions>
@@ -2118,6 +2732,255 @@
   <inkml:trace contextRef="#ctx0" brushRef="#br0" timeOffset="25366">20673 8943 24575,'33'0'0,"0"0"0,11 0 0,3 0 0,-7 0 0,3 0 0,-1 0-683,-3 0 1,-1 0-1,3 0 683,-5 0 0,2 0 0,1 0 0,-1 0 0,7 0 0,0 0 0,2 0-478,-5 0 0,2 0 0,1 0 0,0 0 478,3 0 0,1 1 0,-1-1 0,-1-1 0,-5-2 0,-1-2 0,0 1 0,0 0-44,0 3 1,1 0 0,-1 1 0,-1-2 43,8-3 0,-2-1 0,0 2 0,-2 3 0,0 1 0,1 1 0,2-1 0,0 0 0,0 0 0,-5 0 0,-1 1 0,1-2 0,3-4 0,1-1 0,1 1 0,-7 3 0,2 2 0,0 0 0,-2-2 0,6-2 0,-2-2 0,1 0 0,-5 2 0,2 0 0,-1 0 0,-3 1-63,-1 1 1,-2 2 0,-1-2 62,2-3 0,-1 0 0,0-1 0,10-2 0,0 0 437,-1 7 0,-2-2-437,-14-5 0,-1 1 976,6 6 0,1 2-976,-7-1 0,1 0 630,7 0 0,0 0-630,-7 0 0,-1 0 117,0 0 0,-3 0-117,3 0 0,7 0 0,-23 0 0,5 0 0,0 0 0,19 0 0,-8 0 0,1 0 0,0 0 0,-1 0 0,-1 0 0,-1 0 0,10 0 0,-15 0 0,11 0 0,-27 0 0,12 0 0,-16 0 0,0 0 0</inkml:trace>
   <inkml:trace contextRef="#ctx0" brushRef="#br0" timeOffset="55283">3316 10389 24575,'39'0'0,"1"0"0,-1 0 0,-2 0 0,0 0 0,2 0 0,2 0 0,3 0 0,0 0 0,0 0-820,-4 0 1,0 0 0,0 0 0,1 0 793,2 0 1,2 0 0,0 0 0,-2 0 25,-4 0 0,-1 0 0,0 0 0,0 0 0,1 0 0,-1 0 0,1 0 0,0 0 0,10 0 0,0 0 0,2 0 0,-9 1 0,2-1 0,1 0 0,0-1-356,3-1 1,2-2 0,-1-1 0,0 1 355,-2-1 0,0 0 0,0 0 0,0 0 0,1 0 0,0 1 0,0-1 0,-2-1-15,-6-1 0,-2-2 0,-1 0 0,1 3 15,1 4 0,0 2 0,1 0 0,-1-2 0,0-4 0,-1-3 0,1 0 0,2 2-417,-3 2 1,1 1 0,2 0 0,0 1 0,0-1 416,1 0 0,1 1 0,1-1 0,0 0 0,0 0 0,3-2 0,1-1 0,0-1 0,0 2 0,0 1 0,1 3 0,0 1 0,0 2 0,0-1 0,-2-2 0,-4 0 0,-2-2 0,1 0 0,-1 1 0,0 1 0,1 1 0,0 1 0,1 0 0,-1 0 0,-1 1-16,6-1 1,-1 1 0,-1-1 0,1-1 15,-2-2 0,0-2 0,0 0 0,0 2 0,4 2 0,0 1 0,0 0 0,0-3-46,-1-3 0,0-3 0,0 0 0,1 2 46,-7 2 0,1 2 0,0-1 0,0 1 0,0-2 0,-1-1 0,0-1 0,0 0 0,0-1 0,-1 1 0,9-2 0,0 0 0,0 0 0,0 1 0,-1 0 0,1 2 0,-1-1 0,-1 0 0,-2-1 0,0-1 0,-2 0 0,1 2 12,-6 3 1,1 2-1,-2 0 1,1-2-13,1-3 0,0-2 0,0 0 0,-1 3 0,8 3 0,-2 3 0,0-1 629,-7-4 0,-1-1 0,0 1-629,-1 5 0,0 1 0,-3-2 755,4-7 1,-1 0-756,0 6 0,0 0 1103,8-6 1,1 1-1104,-7 6 0,0 2 655,7-1 1,-2 0-656,5 0 109,-14 0 1,-1 0-110,15 0 0,-13 0 0,3 0 0,5 0 0,2 0-202,-10 0 1,2 0 0,0 0 201,0 0 0,0 0 0,1 0 0,9 0 0,1 0 0,-2 0 0,2 0 0,0 0 0,-8 0 0,1 0 0,-2 0 0,3 0 0,1 0 0,-5 0 0,4 0 0,0 0 0,3 0 0,0 0 0,1 0-485,-6 0 0,1 0 0,1 0 0,0 0 485,6 0 0,1 0 0,1 0 0,-1 0 0,-3 0 0,0 0 0,0 0 0,0 0 0,5-1 0,0 1 0,1 0 0,-2 1 0,-3 2 0,-2 1 0,0 1 0,1-2 0,1-1 0,0-3 0,0 2 0,0 1 0,-2 5 0,0 1 0,0 1 0,0-1 0,0-3 0,1 0 0,-1 0 0,0-1 0,-2 1 0,0 0 0,-1 0 0,2 0 0,4 1 0,1 0 0,0 0 0,-1-1 0,-3 0 0,-1-1 0,-1 0 0,2 1 0,4 1 0,0 1 0,1 0 0,-2 1 0,-6 0 0,0 2 0,-2-1 0,1-1-209,-2-3 1,-1 0 0,1-1 0,-2 1 208,6 5 0,-1 2 0,-1-2 0,-2-3 0,0-1 0,0 0-68,-2 0 1,-1 0 0,0 2 67,10 9 0,0-3 257,-1-12 0,-2 0-257,-6 14 0,-2 0 942,2-14 0,-1 0-942,1 6 0,-1-1 469,-8-7 1,0 0-470,14 8 0,1 0 121,-13-7 0,1 2-121,15 12 0,4 1 0,-6-14 0,2 0-228,-8 7 0,1 4 0,1-4 228,-3-6 0,0-3 0,1 1 0,8 4 0,2 0 0,-2 1 0,-3 0 0,0-1 0,0 0-377,4-3 0,2-2 0,-1 2 377,0 3 0,0 1 0,0-2 0,3-2 0,-1-3 0,1 0 0,-2 1 0,-1 0 0,1 0 0,2 0 0,0 0 0,-1 0 0,-2 0 0,0 0 0,0 0 0,0 0 0,0 0 0,0 0 0,0 0 0,1 0 0,-2 0 0,-1 0 0,-1 0 0,1 0 0,-7 0 0,0 0 0,2 0 0,-1 0-356,-2 0 1,1 0 0,0 0 0,1 0 355,8 0 0,1 0 0,1 0 0,-1 0-449,-2 0 1,-2 0 0,1 0-1,1 0 449,3 0 0,1 0 0,1 0 0,-1 0 0,-2 0 0,0 0 0,0 0 0,2 0-352,-7 0 1,0 0 0,1 0 0,1 0 0,-1 0 351,2 0 0,0 0 0,1 0 0,-1 0 0,0 0 0,-1 0 0,-1 0 0,1 0 0,-1 0 0,2 0 0,-4 0 0,0 0 0,1 0 0,0 0 0,1 0 0,-1 0-329,-1 0 0,1 0 0,0 0 1,0 0-1,0 0 0,1 0 329,-2 0 0,1 0 0,0 0 0,1 0 0,0 0 0,-1 0 0,0 0 0,6 0 0,0 0 0,0 0 0,0 0 0,0 0 0,0 0 0,0 0 0,1 0 0,-1 0 0,1 0 0,-1 0 0,0 0 0,0 0 0,-1 0 0,1 0 0,-1 0 0,0 0 0,0 0 0,-1 0 0,-1 0 0,1 0 0,-1 0 0,0 0 0,0 0-192,1 0 0,0 0 0,0 0 0,0 0 0,0 0 0,-1 0 192,-3 1 0,0-1 0,0 0 0,-1 1 0,0-2 0,0 0-60,5-1 1,-1-1 0,0-1-1,0 0 1,0 2 59,-2 1 0,1 1 0,-1 0 0,-1-1 0,0-1 0,7-5 0,-2-2 0,0 0 0,0 2 177,-1 5 1,-1 2 0,0 0 0,0-2-178,-5-1 0,-1-1 0,0 0 0,-1 0 648,9-2 0,-1 0 0,-1 2-648,1 2 0,-1 2 0,-1-2 0,-11-3 0,-1-1 0,1 1 814,6 4 0,1 2 0,-2-1-814,3 0 0,-2 0 0,-5 0 0,0 0 0,-3 0 1140,-2 0 1,-1 0-1141,5 0 0,-1 0 1618,2 0-1618,-15 0 1016,-5 0-1016,-15-15 196,0 11-196,0-12 0,0 16 0,16 0 0,19-15 0,-9 5 0,3 0 0,13 0 0,2 0 0,1-6 0,0 1 0,1 12 0,-1 2 0,-9-7 0,-2 0 0,-7 8 0,-3 0 0,4 0 0,-11 0 0,7 0 0,-5 0 0,17 0 0,-17 0 0,13 0 0,-29 0 0,13 0 0,0 0 0,19 0 0,-9 0 0,3 0 0,13 0 0,2 0 0,2 0 0,-2 0 0,-6 0 0,-1 0 0,-1 0 0,-6 0 0,-10 0 0,-4 0 0,-16 0 0,0 0 0</inkml:trace>
   <inkml:trace contextRef="#ctx0" brushRef="#br0" timeOffset="69533">7373 12012 24575,'35'0'0,"4"0"0,5 0 0,-10 0 0,3 0 0,1 0-820,0 0 1,2 0 0,1 0 0,1 0 758,3 0 0,1 0 0,0 0 0,1 0-368,-6 0 1,1 0-1,0 0 1,0 0-1,1 0 429,1 0 0,0 0 0,1 0 0,0 0 0,0 0 0,4 0 0,0 0 0,0 0 0,1 0 0,0 0-252,-5 0 1,0 0-1,0 0 1,1 0 0,-1 0-1,0 0 252,-2 0 0,-1 0 0,0 0 0,0 0 0,0 0 0,0 0 0,0 0 0,1 0 0,0 0 0,0 0 0,-1 0 0,-1 0-382,6 0 1,-2 0 0,0 0 0,0 0 0,1 0 381,0 0 0,1 0 0,0 0 0,0 0 0,1 0 0,-5 0 0,1 0 0,0 0 0,0 0 0,1 0 0,0 0-199,1 0 1,0 0 0,0 0-1,0 0 1,1 0 0,0 0 198,1 0 0,0 0 0,0 0 0,1 0 0,-1 0 0,1 0 0,0 0 0,1 0 0,0 0 0,-1 0 0,1 0 0,-2 0 0,-3 0 0,-1 0 0,-1 0 0,1 0 0,-1 0 0,1 0 0,0 0 0,0 0 1,0 0-1,0 0 1,0 0-1,-2 0 0,3 0 0,0 0 0,-2 0 0,0 0 0,1 0 0,-2 0 0,0 0 0,-1 0 0,1 0 0,0 0 0,2 0 0,-1 0 0,1 0 0,0 0 0,1 0 0,3 0 0,2 0 0,-1 0 0,1 0 0,0 0 35,-2 0 0,1-1 0,-1 1 0,1 0 0,0 1-35,-6 1 0,0 0 0,1 1 0,0 0 0,-1 0 0,1 0 0,-2 0 0,0 0 0,0 0 0,1 1 0,-1-1 0,1 0-106,2 1 0,1-1 0,-1 0 0,1 0 0,0 0 0,1 1 106,-5 0 0,0 0 0,1 1 0,-1 0 0,2 0 0,-1-1 0,1 0-86,1 0 1,1-1 0,0 0 0,1-1-1,0 1 1,0-1 0,0 1 85,1 0 0,1-1 0,0 1 0,0-1 0,1 1 0,-1 0 0,2 1-173,-4-1 0,1 1 1,0 1-1,1-1 0,-1 1 1,1-1-1,0-1 0,-1 0 173,-1-2 0,0 0 0,0-1 0,0 0 0,-1 0 0,1 0 0,1 0 0,-1 2 0,-3 0 0,1 1 0,0 1 0,0-1 0,0 1 0,0 0 0,0 0 0,-1 0 0,0-1 0,2 0 0,1 0 0,-2-1 0,1 1 0,-1-1 0,1 0 0,-1 0 0,0 1-74,4 0 0,1-1 1,-1 1-1,0 0 0,0 0 1,0 0-1,0-1 74,-4 1 0,1-1 0,-1 0 0,1 0 0,-1 1 0,1-2 0,-1 1 0,0-1 0,5 0 0,0-1 0,0 0 0,-1 0 0,1-1 0,0 1 0,0 0-70,-5 0 1,0 0 0,1 0 0,-1 0 0,1 0 0,0 0 0,-1 0 0,1 0 69,2 0 0,-1 0 0,1 0 0,0 0 0,0 0 0,0 0 0,0 0 0,0 0-65,0 0 1,0 0-1,0 0 1,0 0-1,1 0 1,-1 0-1,1 0 1,1 0 64,-4 0 0,1 0 0,1 0 0,-1 0 0,1 0 0,0 0 0,-1 0 0,0 0 0,0 0 0,3 0 0,0 0 0,-1 1 0,1-1 0,-1 0 0,0 0 0,0 0 0,1-1 16,0 0 1,0-1-1,0 0 1,0-1 0,1 1-1,-2 0 1,0 0-1,0 0-16,1 1 0,1 1 0,-2 0 0,0-1 0,0 1 0,-1 0 0,1-2 14,-4 1 1,0-1 0,0 0-1,0-1 1,-1 1 0,1-1 0,-1 1-15,1-1 0,0 1 0,0-1 0,0 1 0,0 0 0,-1 0 0,-1 0 134,1 1 0,0 0 0,-1 1 0,-1 0 0,1-1 0,0 0-134,0-1 0,1 0 0,0-1 0,0 0 0,0 0 0,-1 0 0,0 1 0,-1-1 0,0 1 0,0-1 0,1 1 0,0-1 0,3 0 0,0 1 0,0-1 0,1 0 0,1-1 0,-1-1 88,-3-1 1,-1 0-1,1-2 1,0 0-1,1 0 1,0 0 0,0 1-89,3 1 0,1 1 0,1 0 0,-1 0 0,1 0 0,0-1 0,-1-1 0,-1-1 0,1-2 0,-1 0 0,1-1 0,-1 1 0,0 1 0,1 0 0,0 2 0,0 1 0,0 1 0,0 0 0,0 0 0,0 0 0,-2-1 138,3-1 1,0 0 0,-1 0 0,0-1 0,-1 1-1,0 0-138,-3 1 0,0 0 0,0 0 0,-1 0 0,-1 1 0,-1 1 222,4 0 1,-1 2 0,-1 0 0,-1 0 0,-1 0-223,4-2 0,-2-1 0,-1 1 0,0 1 348,-2 2 0,-1 1 0,-1 1 0,-2-1-348,4 0 0,-2 0 0,-1 0 1092,-2 0 0,-1 0 0,-2 0-1029,0 0 1,-4 0 2983,7 0-3047,-5 0 1921,-27 0-1921,12 0 231,-16 16 0,0-12 0,0 12 0</inkml:trace>
+</inkml:ink>
+</file>
+
+<file path=ppt/ink/ink20.xml><?xml version="1.0" encoding="utf-8"?>
+<inkml:ink xmlns:inkml="http://www.w3.org/2003/InkML">
+  <inkml:definitions>
+    <inkml:context xml:id="ctx0">
+      <inkml:inkSource xml:id="inkSrc0">
+        <inkml:traceFormat>
+          <inkml:channel name="X" type="integer" min="-2.14748E9" max="2.14748E9" units="cm"/>
+          <inkml:channel name="Y" type="integer" min="-2.14748E9" max="2.14748E9" units="cm"/>
+          <inkml:channel name="F" type="integer" max="32767" units="dev"/>
+        </inkml:traceFormat>
+        <inkml:channelProperties>
+          <inkml:channelProperty channel="X" name="resolution" value="1000" units="1/cm"/>
+          <inkml:channelProperty channel="Y" name="resolution" value="1000" units="1/cm"/>
+          <inkml:channelProperty channel="F" name="resolution" value="0" units="1/dev"/>
+        </inkml:channelProperties>
+      </inkml:inkSource>
+      <inkml:timestamp xml:id="ts0" timeString="2026-02-04T21:00:25.432"/>
+    </inkml:context>
+    <inkml:brush xml:id="br0">
+      <inkml:brushProperty name="width" value="0.05292" units="cm"/>
+      <inkml:brushProperty name="height" value="0.05292" units="cm"/>
+      <inkml:brushProperty name="color" value="#FF0000"/>
+    </inkml:brush>
+  </inkml:definitions>
+  <inkml:trace contextRef="#ctx0" brushRef="#br0">24553 2223 24575,'41'0'0,"-1"0"0,0 0 0,0 0 0,0 0 0,-2 0 0,6 0 0,-7-1 0,5 1 0,2-1 0,1 1 0,-1 0 0,-4 2-820,6 1 1,-4 1 0,0 1 0,1-2 728,5-2 0,0-1 0,1 0 0,-2 3 91,-6 4 0,0 2 0,-2 0 0,1-3 108,8-4 1,-1-2-1,-1 2-108,-7 7 0,-2 3 0,0-1 0,-2-4 0,0-1 0,-1 0 0,15 4 0,0 0 0,-13-2 0,-1 0 0,0-1 0,11 3 0,-2-2 387,1-2 1,-3 0-388,-14 1 0,-2 2 0,0-1 0,-1-1 0,0-5 0,1 0 0,10 7 0,5 3 0,0-2 0,-1-2 0,1-2 0,3 0-169,-3-1 1,3-1-1,2-1 1,0 1 0,-1 0 168,-4-1 0,-1 1 0,0-1 0,2 0 0,3-1 0,-2 0 0,5-2 0,1 0 0,1 0 0,-1-1 0,-1 1 0,-2-1 0,4 1 0,-3 0 0,-1 0 0,0 0 0,2 0 0,-4 0 0,2 0 0,0 0 0,-1 0 0,-3 0 0,-3 0 84,12 0 0,-6 0 1,-3 0-85,5 0 0,-4 0 0,-15 0 0,-1 0 0,20 0 0,0 0 0,4 0 0,-6 0 0,4 0-236,-9 0 1,4 0 0,1 0-1,-4 0 236,0 0 0,-3-1 0,1 2 0,2 4 0,0 1 0,-2-1 1183,7-4 0,-1 2-1183,-12 6 0,2 4 0,-2-4 0,13-7 0,-1 0 0,0 14 0,0 0 188,-9-14 1,-2 0-189,-7 6 0,-3-1 0,12-7 0,-17 0 1099,13 0-1099,-29 0 230,29 0-230,-5 0 0,5 0 0,5 0 0,3 0 0,2 0 0,-8 0 0,2 0 0,0 0-140,4 0 1,2 0 0,-2 0 139,7 0 0,0 0 0,-13 0 0,2 0 0,-4 0 0,-4 0 0,-2 0 0,1 0 0,-3 0 0,-4 0 0,11 0 0,-11 0 0,-1 0 104,13 0 1,-28 0-1,11 0 1</inkml:trace>
+  <inkml:trace contextRef="#ctx0" brushRef="#br0" timeOffset="2116">24871 3298 24575,'46'0'0,"0"0"0,0 0 0,3 0 0,5 0 0,-9 0 0,3 0 0,2 0 0,1 0 0,2 0-469,-9 0 1,2 0 0,0 0 0,2 0 0,0 0 0,0 0 0,1 0 58,-2 0 0,0 0 1,0 0-1,1 0 1,1 0-1,1 0 0,0 0 1,2 0 152,-6 0 1,1 0-1,2 0 1,1 0 0,0 0-1,1 0 1,-1 0-1,-1 0 1,0 0 0,-2 0-1,-2 0 257,5 0 0,-2 0 0,-2 0 0,0 0 0,-1 0 0,0 0 0,2 0 0,1 0 0,0 0 0,2 0 0,2 0 0,0 0 0,0 0 0,-1 0 0,-3 0 0,-1 0 0,-5 0 419,8 0 0,-5 0 1,-2 0-1,-1 0 0,2 0-419,4 0 0,3 0 0,-2 0 0,0 0 0,-5 0 0,7 0 0,-4 0 0,0 0 0,1 0 0,-1 0 0,-9 0 1532,-2 0-1532,-5 0 0,-27 0 0,43 0 3276,-24 0-2277,3 0 0,-1 0-526,-5 0-473,27 0 0,-15 0 0,5 0 0,4 0-760,0 0 0,4 0 0,2 0 0,2 0 760,-9 0 0,2 0 0,2 0 0,0-1 0,0 2 0,1-1-496,1 2 0,1 1 1,1 0-1,-1 0 1,0 0-1,0-1 496,-3 0 0,0 0 0,0 0 0,-1 0 0,-1 0 0,0 0 0,2 1 0,0 1 0,0 0 0,-3-1 0,-1 1-53,13-1 0,-2 0 0,-6-2 53,2 0 0,-8-2 0,-3 1 0,-21 0 0,-15 0 0</inkml:trace>
+  <inkml:trace contextRef="#ctx0" brushRef="#br0" timeOffset="13116">3193 9525 24575,'0'35'0,"0"-3"0,0 3 0,0 0 0,0 4 0,0 7 0,0 5 0,0-3 0,0 2 0,0 0-389,0-4 0,0 3 0,0-3 389,0-11 0,0-1 0,0 3 0,0 2 0,0 5 0,0 2 0,0 0 0,0-1 0,0 4 0,0-1 0,1 0 0,-2 3-302,-1-11 1,0 3 0,-1 0 0,0 0 0,0-1 0,0-2 301,-1 6 0,-1-2 0,0-1 0,-1-2 0,0 5 0,0-2 0,-1-1-239,-4-2 1,-1 0-1,3-1 239,7-1 0,2 1 0,-2 2-49,-3 3 1,-3 2 0,-1 2-1,0-1 49,0-3 0,0 0 0,0 0 0,1 0 0,2 0 0,1 1 0,0-2 0,-3-1 249,-7 6 0,-3-3 0,4 0-249,11 0 0,4 1 0,-3-2 0,-7-6 0,-3-1 0,2 2 329,8-3 1,2 3 0,1-1 0,-4-2-330,-7 0 0,-2-2 0,3-1 0,6 11 0,2 0 398,-6 3 0,-2-2-398,1-9 0,0-1 113,7 3 1,-1 0-114,-7-3 0,2-1 0,6-8 0,2 0 0,-1 0 0,0-3 795,0-4-795,0 11 0,0-27 0,0 28 0,0-29 0,0 13 0,0-16 0</inkml:trace>
+  <inkml:trace contextRef="#ctx0" brushRef="#br0" timeOffset="48366">9560 9984 24575,'41'0'0,"-1"0"0,1 0 0,7 0 0,1 0 0,3 0 0,-6 0 0,2 0 0,2 0 0,0 0-656,-7 0 1,1 0-1,1 0 1,1 0 0,-1 0 176,4 0 1,0 0 0,1 0 0,0 0 0,-1 0 478,-1 0 0,-2 0 0,1 0 0,1 0 0,2 0 0,-6 0 0,3 0 0,0 0 0,1 0 0,0 0 0,-2 0 0,-2 0 0,3 0 0,-2 0 0,-1 0 0,0 0 0,3 0 0,0 0 0,2 0 0,2 0 0,-2 0 0,-2 0 0,-4 0 30,-2 0 0,-3 0 1,-2 0-1,2 0-30,3 0 0,0 0 0,2 0 0,2 0 0,-4 0 0,2 0 0,1 0 0,1 0 0,0 0 0,0 0 0,-1 0 0,0 0 0,-1 0 0,2 0 0,2 0 0,4 0-298,-8 0 0,3 0 0,2 0 0,2 0 0,2 0 0,0 0 0,0 0 0,0 0 1,-2 0-1,-2 0 0,-2 0 192,4 0 1,-2 0 0,-3 0 0,0 0 0,0 0-1,1 0 1,2 0 0,2 0 105,-7 0 0,1 0 0,2 0 0,2 0 0,0 0 0,0 0 0,0 0 0,0 0 0,0 0 0,-2 0 0,-1 0 0,-3 0 0,9 0 0,-2 0 0,-1 0 0,-2 0 0,0 0 0,0 0 0,1 0 0,1 0-164,-4 0 0,0 0 0,0 0 1,1 0-1,0 0 0,0 0 0,0 0 1,1 0-1,1 0 164,1 0 0,1 0 0,1 0 0,0 1 0,1-1 0,0 0 0,-1 0 0,0 0 0,-2-1 0,-1 1 0,3-2 0,-2 1 0,-1-1 0,-1 0 0,1 0 0,0-1 0,1 1 0,1 0-15,-2 0 0,0 1 0,0-1 0,2 1 1,0-1-1,0 0 0,1 0 0,-1 0 0,1-1 1,-1 0 14,-2 0 0,1-1 0,0-1 0,0 1 0,0-1 0,0 0 0,0 0 0,0 0 0,-1 0 0,-1 0 0,0 0-265,3 1 0,0-1 0,-1 1 0,-1 0 1,0 0-1,0-1 0,1 1 0,0 0 0,2-1 265,-4 1 0,1-1 0,2 1 0,0-1 0,0 0 0,0 0 0,0 0 0,-1 1 0,-1-1 0,-1 1 0,-2-1 0,5 0 0,-2 1 0,-1-1 0,-1 0 0,-1 1 0,0 0 0,-1 0 0,0 0 301,8 0 0,-1 0 1,-1 1-1,0 0 1,-1 0-1,-1 0-301,4 0 0,0-1 0,-2 1 0,-1 0 0,-2 1 233,-1 1 1,-2 1 0,-2 0 0,-2 1-234,4-1 0,-2 0 0,-3 0 930,6 0 0,-2 0-930,-7 0 0,1 0 0,-4 0 0,2 0 0,2 0 1092,6 0 0,2 0 0,3 0-963,-5 0 1,2 0 0,2 0 0,0 0-21,-3-1 0,1 1 0,1-1 1,-1 2-1,0 0-109,-4 1 0,0 1 0,-1 1 0,1 0 0,1-2 0,3-1 0,1-1 0,0 0 0,0 1 0,-1 1 0,4 5 0,-2 2 0,1 0 0,0-2 0,-6-5 0,1-2 0,1-1 0,-1 1 0,0 3 0,-1 1 0,0 3 0,0 0 0,-1 0 0,1-1 0,8-1 0,1-1 0,-1 1 0,-1 1-120,-3 2 0,-1 1 1,0 1-1,-1-2 120,-5-2 0,0-2 0,-1 1 0,-1-1-153,6 2 1,-1-1-1,-1 0 153,-1 1 0,-1-1 0,-1 0 0,-1-4 0,-1-1 0,0 3 0,0 6 0,0 4 0,1-4 0,-1-6 0,1-3 0,-1 1 681,11 7 0,-2 0-681,-8-8 0,-2 0 1131,1 3 1,-3 1-1132,7-2 713,-13 2 0,-1 0-713,10-4 614,1 16-614,-12-14 0,3 0 0,2 5 0,4 2 0,9-3 0,6-1 0,-2-1 0,-10-2 0,0-1 0,1 0-126,1 3 0,2 0 0,-1 1 1,-3-2 125,11-3 0,-4 0 0,-5 0 0,-5 0 0,2 0 0,-3 0 0,-29 0 0,13 0 0,-16 0 0,0 0 0,0 0 0</inkml:trace>
+</inkml:ink>
+</file>
+
+<file path=ppt/ink/ink21.xml><?xml version="1.0" encoding="utf-8"?>
+<inkml:ink xmlns:inkml="http://www.w3.org/2003/InkML">
+  <inkml:definitions>
+    <inkml:context xml:id="ctx0">
+      <inkml:inkSource xml:id="inkSrc0">
+        <inkml:traceFormat>
+          <inkml:channel name="X" type="integer" min="-2.14748E9" max="2.14748E9" units="cm"/>
+          <inkml:channel name="Y" type="integer" min="-2.14748E9" max="2.14748E9" units="cm"/>
+          <inkml:channel name="F" type="integer" max="32767" units="dev"/>
+        </inkml:traceFormat>
+        <inkml:channelProperties>
+          <inkml:channelProperty channel="X" name="resolution" value="1000" units="1/cm"/>
+          <inkml:channelProperty channel="Y" name="resolution" value="1000" units="1/cm"/>
+          <inkml:channelProperty channel="F" name="resolution" value="0" units="1/dev"/>
+        </inkml:channelProperties>
+      </inkml:inkSource>
+      <inkml:timestamp xml:id="ts0" timeString="2026-02-04T21:01:43.765"/>
+    </inkml:context>
+    <inkml:brush xml:id="br0">
+      <inkml:brushProperty name="width" value="0.05292" units="cm"/>
+      <inkml:brushProperty name="height" value="0.05292" units="cm"/>
+      <inkml:brushProperty name="color" value="#FF0000"/>
+    </inkml:brush>
+  </inkml:definitions>
+  <inkml:trace contextRef="#ctx0" brushRef="#br0">7161 10742 24575,'36'0'0,"-1"0"0,7 0 0,2 0 0,1 0 0,0 0 0,-11 0 0,1 0 0,2 0 0,0 0 0,3 0 0,-1 0 0,-2 0 0,-2 0 0,-2 0 0,1 0 0,12 0 0,1 0 0,-7 0 0,7 0 0,-14 0 0,-1 0 0,15 0 0,-13 0 0,3 0 0,-2 0 0,0 0 0,-7 0 0,-1 0 0,6 0 0,1 0 0,-8 0 0,2 0 0,9 0 0,5 0 0,-3 0 0,2 0 0,0 0 0,-2 0 0,1 0 0,-1 0 0,6 0 0,-4 0 0,-11 0 0,-1 0 0,5 0 0,-1 0 0,10 0 0,-6 0 0,-9 0 0,3 0 0,11 0 0,2 0 0,-5 0 0,0 0 0,-5 0 0,1 0 0,-2 0 0,4 0 0,-3 0 0,-6 0 0,-1 0 0,0 0 0,-3 0 0,-5 0 0,13 0 0,-13 0 0,17 0 0,-17 0 0,13 0 0,-13 0 0,16 0 0,-11 0 0,3 0 0,7 0 0,5 0 0,-2 0 0,5 0 0,0 0 0,4 0 0,4 0 0,-5 0 0,-6 0 0,-3 0 0,0 0 0,-1 0 0,-9 0 0,-2 0 0,12 0 0,-11 0 0,1 0 0,1 0 0,1 0 0,-1 0 0,0 0 0,7 0 0,-1 0 0,-6 0 0,1 0 0,7 0 0,1 0 0,-9 0 0,0 0 0,4 0 0,-3 0 0,9 0 0,-9 0 0,-12 0 0,-1 0 0,5 0 0,18 0 0,6 0 0,-6 0 0,3 0-260,2 0 1,5 0 0,-2 0 259,-9 0 0,0 0 0,-2 0 0,1 0 0,0 0 0,-2 0 0,11 0 0,-3 0 0,-14 0 0,-2 0 0,1 0 0,-3 0 0,12 0 0,-11 0 0,1 0 0,21 0 389,-21 0 0,1 0-389,16 0 0,-24 0 0,13 0 0,-28 0 0,11 0 0,1 0 0,14 4 0,12 3 0,0-2 0,-8-3 0,0-2 0,3 2-363,7 1 0,5 2 0,0-1 1,-2-1 362,2-2 0,-2-1 0,-2-1 0,-7 1 0,-2 0 0,-1 0 0,15 0 0,-5 0 0,-18-1 0,-2 2 0,5 7 0,-1 0 0,10-4 0,-3 12 0,-21-16 1451,1 0-1451,4 0 0,9 0 0,8 0 0,5 0 0,6 0 0,-1 0 0,-1 0 0,-1 0 0,2 0 0,-8 0 0,2 0 0,-1 0 0,-4 0 0,12 0 0,-9 0 0,-4 0 0,-19 0 0,-16 0 0,0 0 0</inkml:trace>
+</inkml:ink>
+</file>
+
+<file path=ppt/ink/ink22.xml><?xml version="1.0" encoding="utf-8"?>
+<inkml:ink xmlns:inkml="http://www.w3.org/2003/InkML">
+  <inkml:definitions>
+    <inkml:context xml:id="ctx0">
+      <inkml:inkSource xml:id="inkSrc0">
+        <inkml:traceFormat>
+          <inkml:channel name="X" type="integer" min="-2.14748E9" max="2.14748E9" units="cm"/>
+          <inkml:channel name="Y" type="integer" min="-2.14748E9" max="2.14748E9" units="cm"/>
+          <inkml:channel name="F" type="integer" max="32767" units="dev"/>
+        </inkml:traceFormat>
+        <inkml:channelProperties>
+          <inkml:channelProperty channel="X" name="resolution" value="1000" units="1/cm"/>
+          <inkml:channelProperty channel="Y" name="resolution" value="1000" units="1/cm"/>
+          <inkml:channelProperty channel="F" name="resolution" value="0" units="1/dev"/>
+        </inkml:channelProperties>
+      </inkml:inkSource>
+      <inkml:timestamp xml:id="ts0" timeString="2026-02-04T21:04:43.215"/>
+    </inkml:context>
+    <inkml:brush xml:id="br0">
+      <inkml:brushProperty name="width" value="0.05292" units="cm"/>
+      <inkml:brushProperty name="height" value="0.05292" units="cm"/>
+      <inkml:brushProperty name="color" value="#FF0000"/>
+    </inkml:brush>
+  </inkml:definitions>
+  <inkml:trace contextRef="#ctx0" brushRef="#br0">4198 15381 24575,'27'0'0,"22"0"0,-18 0 0,1 0 0,-3 0 0,1 0 0,4 0 0,-1 0 0,2 0 0,-15 0 0,11 0 0,-27 0 0,11 0 0,-15 0 0,16 0 0,4 0 0,12 0 0,14 0 0,6 0 0,-6 0 0,-1 0 0,-3 0 0,4 0 0,-2 0 0,4 0 0,1 0 0,-1 0 0,-5 0 0,2 0 0,-5 0 0,-2 0 0,4 0 0,-5 0 0,-2 0 0,-4 0 0,-27 0 0,43 0 0,-39 0 0,23 0 0,-15 0 0,-12 0 0,43 0 0,-8 0 0,3-7 0,2-2 0,-13 8 0,-3-1 0,0-7 0,-5 2 0,-7 7 0</inkml:trace>
+  <inkml:trace contextRef="#ctx0" brushRef="#br0" timeOffset="1851">4233 16140 24575,'26'0'0,"8"0"0,6 0 0,5 0 0,4 0-636,-3 0 0,2 0 1,-1 0 635,-4 0 0,-1 0 0,-1 0 0,-4 0 0,-2 0 0,-1 0 307,3 0 1,-4 0-308,-5 0 0,-5 0 315,-3 0-315,11 0 0,-7 0 0,3 0 0,12 0 0,4 0 0,-8 0 0,2 0 0,-1 0 0,2 0 0,1 0 0,-2 0 488,9 0 1,-2 0-489,-7 0 0,-3 0 0,1 0 0,-4 0 0,-27 0 0,12 0 0,0 0 0,19 0 0,4 0 0,-4 0 0,-3 0 0,-28 0 0,11 0 0,-15 0 0</inkml:trace>
+</inkml:ink>
+</file>
+
+<file path=ppt/ink/ink23.xml><?xml version="1.0" encoding="utf-8"?>
+<inkml:ink xmlns:inkml="http://www.w3.org/2003/InkML">
+  <inkml:definitions>
+    <inkml:context xml:id="ctx0">
+      <inkml:inkSource xml:id="inkSrc0">
+        <inkml:traceFormat>
+          <inkml:channel name="X" type="integer" min="-2.14748E9" max="2.14748E9" units="cm"/>
+          <inkml:channel name="Y" type="integer" min="-2.14748E9" max="2.14748E9" units="cm"/>
+          <inkml:channel name="F" type="integer" max="32767" units="dev"/>
+        </inkml:traceFormat>
+        <inkml:channelProperties>
+          <inkml:channelProperty channel="X" name="resolution" value="1000" units="1/cm"/>
+          <inkml:channelProperty channel="Y" name="resolution" value="1000" units="1/cm"/>
+          <inkml:channelProperty channel="F" name="resolution" value="0" units="1/dev"/>
+        </inkml:channelProperties>
+      </inkml:inkSource>
+      <inkml:timestamp xml:id="ts0" timeString="2026-02-04T21:05:08.948"/>
+    </inkml:context>
+    <inkml:brush xml:id="br0">
+      <inkml:brushProperty name="width" value="0.05292" units="cm"/>
+      <inkml:brushProperty name="height" value="0.05292" units="cm"/>
+      <inkml:brushProperty name="color" value="#FF0000"/>
+    </inkml:brush>
+  </inkml:definitions>
+  <inkml:trace contextRef="#ctx0" brushRef="#br0">7761 10001 24575,'20'0'0,"27"0"0,-11 0 0,6 0 0,0 0 0,6 0 0,3 0 0,-2 0 0,-3 0 0,-1 0 0,0 0 0,3 0-547,-7 0 1,1 0 0,2 0 0,0 0 0,-1 0 0,-2 0 458,1 0 0,-1 0 0,-2 0 0,1 0 0,2 0 88,6 0 0,0 0 0,2 0 0,-1 0 0,1 0-326,-7 0 0,-1 0 0,1 0 0,0 0 1,1 0-1,0 0 326,2 0 0,2 1 0,-1-1 0,1 0 0,-1 0 0,-1-1 0,4 0 0,-1-1 0,-1 0 0,0 1 0,0-1 0,1 2 0,0 0 0,0 1 0,-1-2 0,-2-1-361,3-2 1,-2-3 0,-1 0 0,0 2 360,2 3 0,1 2 0,-1-1 0,-1 0 0,-6-2 0,-1-2 0,0 0 0,0 2 0,1 2 0,0 1 0,0 1 0,1-1 0,1 0 0,1 0 0,-1 0 0,1 0 0,-1 0 0,0 0 0,0 0 0,1 0 0,0 1 0,0-1 0,1 1 0,-2-3-176,-3 0 0,0-2 0,-1-1 0,-1 1 176,5-2 0,-1-1 0,-2 0 682,-3 1 0,-2 0 0,-1-2-682,6-8 0,-2 1 1398,-1 13 0,-5 0-1398,-1-13 1888,16 15-1888,-27 0 1077,0 0-1077,27 0 0,-21 0 0,2 0 0,5 0 0,3 0 0,1 0-422,4 0 1,1 0-1,1 0 422,-5-4 0,1 0 0,1-1 0,0 2 0,9 1 0,-1 2 0,0-2 0,-4-3 0,1-1 0,-1 1 0,2 4 0,0 2 0,-3-1-141,1 0 1,-2 0 140,-3 0 0,2 0 0,-3 0 0,0 0 0,-2 0 0,0 0 0,-1 0 0,-9 0 0,-1 0 0,0 0 0,1 0 0,0 0 0,3 0 628,13 0 0,2 0-628,-7 0 0,0 0 150,6 1 0,1-2-150,-5-6 0,0-1 0,5 6 0,0 0 0,-3-14 0,1 0 0,-9 13 0,2 4 0,-2-3 0,5-6 0,-1 1 0,7 6 0,-2 2 0,-13-1 0,-3 0 0,1 0 0,-3 0 0,-4 0 0,11 0 0,-27 0 0,43 0 0,-21 0 0,3 0 0,7-1 0,5 0 0,3 3 0,-4 2 0,4 3 0,1 0 0,0 1 0,-3-3-274,0-2 0,-2-2 1,0 0-1,1 2 274,4 4 0,3 2 0,-3 1 0,-7-5 0,0-4 0,-9-2 0,-10 1 0,-3 0 0,-16 16 0,0-12 0,0 12 0,0-16 1095,16 0-1095,-13 0 0,13 0 0,-16 15 0,0-11 0,16 12 0,-12-16 0,11 15 0,-15-11 0,16 12 0,-12-16 0,12 0 0,-16 0 0,0 0 0</inkml:trace>
+  <inkml:trace contextRef="#ctx0" brushRef="#br0" timeOffset="15450">20955 12188 24575,'0'36'0,"0"-17"0,0 13 0,0 3 0,0-9 0,0 3 0,0 13 0,0 2 0,0-6 0,0-1 0,0-1 0,0-2 0,0-7 0,0-3 0,0 11 0,0-10 0,0 1 0,0 1 0,0 1 0,0 3 0,0 1 0,0 9 0,0 2 0,0 6 0,0 0 0,0-2 0,0 0 0,0-12 0,0-1 0,0-1 0,0 4 0,0-3 0,0-6 0,0-1 0,0-1 0,0-1 0,0 10 0,0 0 0,0 0 0,0 1 0,0-1 0,0-15 0,0-5 0,0-15 0,0 16 0,0 4 0,0 15 0,0 0 0,0-15 0,0 11 0,0-27 0,0 19 0,0-21 0,0 6 0,0-8 0,0 16 0,0-12 0,0 12 0,0-16 0</inkml:trace>
+  <inkml:trace contextRef="#ctx0" brushRef="#br0" timeOffset="18033">7126 14764 24575,'35'0'0,"3"0"0,7 0 0,-7 0 0,4 0 0,3 0-656,-6 0 1,2 0-1,2 0 1,1 0 0,1 0 131,-2 0 1,0 0 0,1 0 0,2 0 0,1 0 0,4 0 523,-7 0 0,3 0 0,2 0 0,2 0 0,1 0 0,0 0 0,0 0 0,-1 0 0,-3 0 0,-2 0 0,5 0 0,-4 0 0,0 0 0,-2 0 0,1 0 0,1 0 0,3 0 0,-6 0 0,3 0 0,2 0 0,0 0 0,1 0 0,0 0 0,-2 0 0,-3 0 0,-2 0 0,-3 0 0,7 0 0,-5 0 0,-3 0 0,0 0 0,2 0 0,1 0 0,0 0 0,1 0 0,-2 0 0,-2 0 435,12 0 1,-3 0 0,-2 0-436,-7 0 0,-1 0 0,-1 0 0,13 0 0,0 0 0,-4 0 0,6 0 0,-17 0 0,5 0 0,4 0 0,1 0 0,-1 0 0,-1 0 0,2 0 0,-1 0 0,0 0 0,2 0 0,2 0-287,-2 0 0,2 0 1,3 0-1,0 0 0,0 0 1,-2 0-1,-2 0 287,-2 0 0,-1 0 0,-1 0 0,-1 0 0,0 0 0,1 0 0,7 0 0,0 0 0,-1 0 0,0 0 0,0 0-303,-4 0 1,-1 0 0,0 0 0,-1 0 0,0 0 302,6 0 0,-1-1 0,0 1 0,1 1 0,-3 0 0,1 0 0,1 0 0,-2 1 0,-1 1 0,0 0 0,-2 2 0,-1 0 0,0-1 0,-1-1 0,-1 0 0,-1 0 0,-2 0 1225,18 3 1,-12 4-1226,-20 5 396,24-11-396,-43 12 3276,12-16-3088,0 0 2128,19 16-2316,1-14 0,6 0 0,-3 7 0,3 3 0,1-2-415,2-7 0,0-3 0,2 1 415,-8 2 0,1 2 0,0 0 0,-2-2 0,0-3 0,-2 0 0,0 0 0,0 0 0,-1 0 0,-5 0 0,10 0 0,-9 0 0</inkml:trace>
+  <inkml:trace contextRef="#ctx0" brushRef="#br0" timeOffset="21099">3739 12330 24575,'0'0'0</inkml:trace>
+  <inkml:trace contextRef="#ctx0" brushRef="#br0" timeOffset="22800">3669 12224 24575,'35'0'0,"-10"0"0,1 0 0,9 0 0,1 0 0,0 0 0,2 0 0,7 0 0,-4 0 0,-1 0 0,-9 0 0,-15 0 0,7 0 0,5 0 0,11 0 0,4 0 0,-8 0 0,2 0 0,-1 0 0,13 0 0,0 0 0,-6 0 0,0 0 0,1 0 0,-2 0 0,-12 0 0,-1 0 0,14 0 0,-4 0 0,-15 0 0,23 0 0,-43 0 0,27 0 0,-11 0 0,3 0 0,5 0 0,5 0 0,4 0 0,-1-1 0,3 1 0,0 1-306,3 3 0,0 1 0,1 1 306,2 1 0,0-1 0,-1 1 0,-7-1 0,-2 1 0,-2 0 0,5 2 0,-5-3 0,2-6 0,-19 0 0,-16 0 0</inkml:trace>
+  <inkml:trace contextRef="#ctx0" brushRef="#br0" timeOffset="24550">9895 12224 24575,'41'0'0,"-1"0"0,1 0 0,0 0 0,1 0 0,0 0 0,5 0 0,1 0 0,-2 0-321,-3 0 1,-1 0 0,-1 0 320,-4 0 0,-1 0 0,-3 0 157,-4 0 1,-3 0-158,5 0 160,-15 0-160,7 0 0,5 0 0,10 0 0,6 0 0,0 0 0,4 0 0,-1 0-189,-6 0 1,-1 0-1,1 0 189,0 0 0,1 0 0,-4 0 236,0 0 0,-5 0-236,2 0 0,-19 0 0,-16 0 0,0 0 0</inkml:trace>
+  <inkml:trace contextRef="#ctx0" brushRef="#br0" timeOffset="26599">9596 9066 24575,'25'0'0,"1"0"0,1 0 0,0 0 0,13 0 0,7 0 0,-43 0 0,27 0 0,-4 0 0,11 0 0,5 0 0,-8 0 0,-15 0 0,11 0 0,-27 0 0,27 0 0,4 0 0,3 0 0,9 0 0,2 0-815,-6 0 0,2 0 0,2 0 1,2 0 814,-7 0 0,3 0 0,1 0 0,1 0 0,0 0 0,0 0-547,3 0 1,-1 0 0,2 0 0,-1 0 0,0 0 0,0 0 519,0 0 1,-1 0 0,1 0 0,-1 0 0,-1 0 0,0 0 26,-3 0 0,-1 0 0,0 0 0,-1 0 0,-1 0 0,-1 0-141,11 1 1,-2-1-1,-2 0 1,-4-1 140,-3-1 0,-3-1 0,-3 1 0,2 1 0,-8 0 0,-9-7 0,-4 8 0</inkml:trace>
+</inkml:ink>
+</file>
+
+<file path=ppt/ink/ink24.xml><?xml version="1.0" encoding="utf-8"?>
+<inkml:ink xmlns:inkml="http://www.w3.org/2003/InkML">
+  <inkml:definitions>
+    <inkml:context xml:id="ctx0">
+      <inkml:inkSource xml:id="inkSrc0">
+        <inkml:traceFormat>
+          <inkml:channel name="X" type="integer" min="-2.14748E9" max="2.14748E9" units="cm"/>
+          <inkml:channel name="Y" type="integer" min="-2.14748E9" max="2.14748E9" units="cm"/>
+          <inkml:channel name="F" type="integer" max="32767" units="dev"/>
+        </inkml:traceFormat>
+        <inkml:channelProperties>
+          <inkml:channelProperty channel="X" name="resolution" value="1000" units="1/cm"/>
+          <inkml:channelProperty channel="Y" name="resolution" value="1000" units="1/cm"/>
+          <inkml:channelProperty channel="F" name="resolution" value="0" units="1/dev"/>
+        </inkml:channelProperties>
+      </inkml:inkSource>
+      <inkml:timestamp xml:id="ts0" timeString="2026-02-04T21:06:46.364"/>
+    </inkml:context>
+    <inkml:brush xml:id="br0">
+      <inkml:brushProperty name="width" value="0.05292" units="cm"/>
+      <inkml:brushProperty name="height" value="0.05292" units="cm"/>
+      <inkml:brushProperty name="color" value="#FF0000"/>
+    </inkml:brush>
+  </inkml:definitions>
+  <inkml:trace contextRef="#ctx0" brushRef="#br0">8061 9843 24575,'35'0'0,"1"0"0,-12 0 0,2 0 0,2 0 0,-1 0 0,1-2 0,-1 4 0,-1 5 0,-1 1 0,1-6 0,-1 0 0,14 14 0,-5-15 0,-1-2 0,6 1 0,-13 0 0,-1 0 0,10 0 0,-15 0 0,-4 0 0,-16 0 0,15 0 0,21 0 0,-11 0 0,5 0 0,3 0 0,5 0 0,0 0-333,-1 0 1,0 0-1,1 0 333,10 0 0,3 0 0,-1 0 0,-3 0 0,0 0 0,0 0 0,-8 0 0,2 0 0,-2 0 0,-1 0 0,1 0 0,-1 0 0,-1 0 0,-2 0 0,-1 0 0,-2 0 0,3 0 0,-3 0 0,-4-1 0,-1 2 0,0 6 0,1 1 0,1-6 0,1 0 0,-4 6 0,1 0 499,4-7 0,0-2-499,-3 1 0,-1 0 0,7 0 0,-1 0 0,6 0 0,-4 0 0,-3 0 0,3 16 0,-2-14 0,4 0 0,7 6 0,3-1 0,-13-5 0,2-3 0,-1 0 0,1 1 0,0 0 0,-2 0 0,12 0 0,-2 0 0,-4 0 0,-1 0 0,-4 0 0,-2 0 0,-1 0 0,-1 0 0,3 0 0,3 0 0,-4 0 0,3-1 0,-3 2 0,-2 7 0,0 0 0,18-7 0,0 2 0,-13 9 0,-1-1 0,2-9 0,0-2 0,-1 4 0,-1 0 0,-8-3 0,-3-2 0,-5 1 0,13 0 0,-28 0 0,27 0 0,4 0 0,2 0 0,5 0 0,-4 0 0,4 0 0,1 0-543,-3 0 1,2 0 0,1 0 0,1 0 542,4 0 0,0 0 0,2 0 0,0 0 0,-8 0 0,0 0 0,1 0 0,0 0 0,-2 0 0,7 0 0,-1-1 0,0 1 0,0 1 0,1 2 0,1 2 0,-1-1 0,-3 0-198,-3-3 1,-3 0-1,1 1 198,5 3 0,1 1 0,-4-1 0,4-5 0,-1 0 0,-12 0 0,1 0 0,4 0 0,0 0 0,3 0 0,3 0 0,0 0 0,-3 0 0,4 0 0,-2 0 0,1 0 0,3 0-353,-8 0 1,3 0 0,1 0-1,1 0 1,-2 0 0,-2 0 352,11 0 0,-3 0 0,-1 0 0,-1 0 0,-4 0 0,-1 0 0,-1 0 0,-2 0 0,5 0 0,-1 0 0,-1 0 0,-1 0 0,1 0 0,-5 0 0,-1 0 0,-3 0 924,2 0 0,0 0-924,-4 0 0,-1 0 291,-2 0 1,1 0-292,9-5 0,4-1 0,-1 1 0,1 3 0,0 0 0,1-3 0,4-1 0,-1 1 0,-3 4 0,-2 2 0,0-1 0,9 0 0,0 0 0,-5 0 0,3 0 0,-5 0 0,-8 0 0,-1 0 1222,15 0 1,4 0-1223,-10 0 0,2 0 0,-1 0 0,-4 0 0,0 0 0,1 0 0,6 0 0,1 0 0,-3 0 0,1 0 0,-4 0 0,-13 0 0,-1 0 0,-1 0 0,-1 0 0,0 0 0,1 0 0,0 0 0,3 0 0,13 0 0,2 0 0,-3 0 0,0 0 0,-7 0 0,1 0 0,0 0 0,14 0 0,0 0-170,-9 0 1,2 0 0,-2 0 169,7 0 0,0 0 0,-13 0 0,1 0 0,-2 0 0,3 0 0,-2 0 0,1 0 0,1 0 0,6 0 0,2 0 0,1 0 0,0 0 0,-4 0 0,0 0 0,-3 0 0,2 0 0,-2 0-318,5 0 1,0 0 317,1 5 0,3 1 0,-1-1 0,-3-3 0,-2-2 0,1 2 0,0 2 0,0 2 0,-1 0 0,0-1 0,0 1 0,-1-2 0,-4-2 0,-1-2 0,0 2 0,14 6 0,0 0 0,-15-7 0,0-2 0,2 1 0,1 0 0,1 0 0,0 0 0,3 0 0,1 0 0,1 0 0,4 0 0,1 0 0,-2 0 0,-8 0 0,-2 0 0,0 0 0,9 0 0,-4 0 0,-13 0 0,-5 0 492,-4 0-492,13 0 0,3 0 0,-9 0 0,3 0 325,2 1 1,1-2-326,2-7 0,0 0 0,13 4 0,-12-11 0,-3 15 0,-28 0 0,27 0 0,-11 0 0,15 0 0,0 0 0,1 0 0,-17 0 0,12 0 0,-11 0 0,15 0 0,1 0 0,-12 0 0,3 0 0,-1 0 0,2 0 0,15 0 0,1 0 0,-15 0 0,1 0 0,13 0 0,-4 0 0,-16 0 0,24 0 0,-43 0 0,12 0 0,-32 0 0,12 0 0,-11 0 0,15 0 0</inkml:trace>
+  <inkml:trace contextRef="#ctx0" brushRef="#br0" timeOffset="8700">10936 10971 24575,'26'0'0,"-1"0"0,8 0 0,5 0 0,-1 0 0,4 0 0,2 0-820,-5 0 1,2 0 0,1 0 0,1 0 636,-3 0 1,0 0 0,2 0 0,1 0-1,1 0-310,0 0 1,3 0 0,1 0 0,0 0-1,0 0 1,-1 0 492,-1 0 0,-1 0 0,0 0 0,0 0 0,0 0 0,2 0 0,2 0 0,2 0 0,0 0 0,1 0 0,-2 0 0,0 0 0,-3 0 0,-2 0 0,-1 0 0,2 0 0,0 0 0,3 0 0,-2 0 0,2 0 0,1 0 0,2 0 0,-1 0 0,0 0 0,-1 0 0,-2 0 0,4 0 0,-2 0 0,-1 0 0,0 0 0,1 0 0,4 0-196,-8 0 0,3 0 0,2 0 0,1 0 0,0 0 0,-1 0 1,0 0-1,-3 0 0,-2 0 196,5 0 0,-2 0 0,-2 0 0,-1 0 0,1 0 0,1 0 0,-4 0 0,1 0 0,0 0 0,0 0 0,0 0 0,0 0 0,-1 0-370,4 0 1,0 0 0,-1 0 0,1 0 0,-1 0-1,1 0 370,1 0 0,0 1 0,1-1 0,-1 0 0,1 0 0,-1-1 0,1 0 0,0 0 0,-1 0 0,1-1 0,1 1 0,-1 0 0,-4 0 0,-1 1 0,1 0 0,0-1 0,0 1 0,1 0 0,0 0-191,2-1 1,0 0 0,1-1 0,0 1 0,0 0 0,0 0 0,0 0 190,-2 0 0,1 1 0,-1 0 0,1 0 0,-1 1 0,1-1 0,0 0 0,-5 0 0,1 0 0,1 0 0,-1 0 0,0 0 0,0 0 0,0 0 0,-1 0 29,2 0 1,1 0 0,-2 0 0,1 0 0,-1 0 0,-1 0-1,-1 0-29,2 0 0,-1 0 0,0 0 0,-2 0 0,0 0 0,-2 0 470,10 0 1,-1 0 0,-3 0 0,-3 0-471,2 0 0,-3 0 0,-6 0 2395,12 0-2395,0 0 0,-43 0 0,12 0 0</inkml:trace>
+  <inkml:trace contextRef="#ctx0" brushRef="#br0" timeOffset="15234">5786 9208 24575,'43'0'0,"0"0"0,2 0 0,0 0 0,-4-1 0,0 2 0,11-1 0,-4 0 0,-21 0 0,-3 0 0,2 0 0,-1 0 0,6 0 0,5 0 0,4 0 0,6 0 0,-7-5 0,3-1 0,2 1-453,-2 3 0,3 3 0,0-2 0,0-1 453,-2-4 0,0-3 0,0 0 0,0 2 0,5 1 0,0 1 0,0 1 0,-2-1 0,-6 0 0,-1 0 0,-1 0 0,-2 0 0,3 0 0,-3 0 0,-1 0 0,9-4 0,-6 2 0,-2 3 0,-17-12 0,28 16 0,-21 0 0,3 0 0,3 0 0,4 0 0,2 0 66,9 0 0,4 0 0,0 0-66,-11 0 0,0 0 0,1 0 0,1 0 0,7 0 0,2 0 0,0 0 0,-3 0 0,4 0 0,-3 0 0,-1 0 0,0 0 0,-1 0 0,-4 0 0,-5 0 0,-6 0 0,3 0 0,-19 0 0</inkml:trace>
+  <inkml:trace contextRef="#ctx0" brushRef="#br0" timeOffset="18385">6121 13018 24575,'35'0'0,"0"0"0,-7 0 0,-1 0 0,7 0 0,-1 0 0,6 0 0,-4 0 0,-3 0 0,-13 0 0,17 0 0,11 0 0,-6 0 0,7 0 0,2 0 0,-1 0 0,-6 0 0,-1 0 0,0 0 0,3 0-282,1 0 0,4 0 1,1 0-1,-3 0 1,-6 0 281,1 0 0,-4 0 0,-3 0 0,9 0 0,-4 0 0,-13 0 0,-5 0 0,-3 0 0,11 0 0,-27 0 0,22 0 0,11 0 0,5 0 0,6 0-472,-12-1 0,4 1 0,2 1 0,1-1 472,2 0 0,2 0 0,1 0 0,0 0 0,-7 0 0,2-1 0,-1 2 0,1-2 0,-3 2 0,5-1 0,-2-1 0,0 2 0,-1-1 0,-2-1 0,1 0 0,-2 1 0,-2 2 422,0 2 1,-1 2 0,-4-1-423,6-4 0,-5 2 0,2 13 0,-19-16 0,0 0 0,-12 0 2028,11 0-2028,-15 0 0,0 0 0,0 15 0,0-11 0,0 12 0,0-16 0,0 0 0,0 0 0</inkml:trace>
+</inkml:ink>
+</file>
+
+<file path=ppt/ink/ink25.xml><?xml version="1.0" encoding="utf-8"?>
+<inkml:ink xmlns:inkml="http://www.w3.org/2003/InkML">
+  <inkml:definitions>
+    <inkml:context xml:id="ctx0">
+      <inkml:inkSource xml:id="inkSrc0">
+        <inkml:traceFormat>
+          <inkml:channel name="X" type="integer" min="-2.14748E9" max="2.14748E9" units="cm"/>
+          <inkml:channel name="Y" type="integer" min="-2.14748E9" max="2.14748E9" units="cm"/>
+          <inkml:channel name="F" type="integer" max="32767" units="dev"/>
+        </inkml:traceFormat>
+        <inkml:channelProperties>
+          <inkml:channelProperty channel="X" name="resolution" value="1000" units="1/cm"/>
+          <inkml:channelProperty channel="Y" name="resolution" value="1000" units="1/cm"/>
+          <inkml:channelProperty channel="F" name="resolution" value="0" units="1/dev"/>
+        </inkml:channelProperties>
+      </inkml:inkSource>
+      <inkml:timestamp xml:id="ts0" timeString="2026-02-04T21:07:18.427"/>
+    </inkml:context>
+    <inkml:brush xml:id="br0">
+      <inkml:brushProperty name="width" value="0.05292" units="cm"/>
+      <inkml:brushProperty name="height" value="0.05292" units="cm"/>
+      <inkml:brushProperty name="color" value="#FF0000"/>
+    </inkml:brush>
+  </inkml:definitions>
+  <inkml:trace contextRef="#ctx0" brushRef="#br0">6297 6967 24575,'33'0'0,"1"0"0,-1 0 0,4 0 0,3 0 0,3 0 0,1 0 0,2 0 0,3 0 0,2 0 0,2 0-410,-10 0 0,3 0 1,2 0-1,0 0 1,2 0-1,0 0 0,0 0 1,1 0 44,-3 0 1,0 0 0,0 0 0,0 0 0,2 0 0,-1 0 0,2 0 0,1 0 0,1 0 111,-10 0 1,3 0 0,1 0 0,0 0 0,2 0 0,-1 0 0,1 0 0,-1 0 0,0 0 0,-1 0 0,-1 0 0,-1 0 0,-3 0 129,12 0 1,-3 0 0,-2 0 0,0 0 0,-1 0 0,-1 0 0,2 0 0,0 0 122,-2 0 0,2 0 0,2 0 0,-1 0 0,0 0 0,-3 0 0,-3 0 0,-3 0 0,-6 0 916,10 0 0,-7 0 0,-4 0-916,2 0 0,-5 0 1654,0 0-1654,-43 0 0,24 0 0,-27 16 819,15-12 0,0 12 0,0-16 0</inkml:trace>
+  <inkml:trace contextRef="#ctx0" brushRef="#br0" timeOffset="2868">12012 9772 24575,'35'0'0,"1"0"0,-17 0 0,13 0 0,-13 0 0,1 0 0,27 0 0,-17 0 0,4 0 0,4 0-820,4 0 1,4 0 0,2 0 0,4 0 750,-7 0 1,3 0-1,2 0 1,1 0 0,1 0-1,2 0-296,-12 0 1,1 0 0,1 0 0,0 0 0,1 0 0,1 0 0,0 0 0,1 0 0,-1 0 135,1 0 1,0 0-1,1 0 1,0 0-1,0 0 1,1 0-1,0 0 1,-1 0-1,1 0 1,-1 0-93,-1 0 1,0 0 0,1 0 0,-1 0 0,1 0 0,-1 0 0,0 0 0,0 0-1,-1 0 1,0 0 320,2 0 0,0 0 0,0-1 0,0 1 0,-1 0 0,0 0 0,-1 0 0,-1 0 0,-1 1-173,5 1 0,-1 0 1,0 0-1,-2 1 0,-1 0 1,-1-1-1,-2 0 173,4-1 0,-2-1 0,-1 0 0,-1 1 0,-2 1 345,7 1 1,-2 2 0,-2-1 0,-5-1-346,1-2 0,-4-2 1638,2-1 0,-11 4-851,-22 14 2489,12-12-1661,-16 12-855,0-16 1,0 0-1,0 0 1</inkml:trace>
+  <inkml:trace contextRef="#ctx0" brushRef="#br0" timeOffset="5969">6544 10918 24575,'33'0'0,"1"0"0,-6 0 0,2 0 0,7 0 0,3 0 0,1 0-645,-2 0 1,-1 0 0,3 0 644,-3 0 0,2 0 0,0 0 0,0 0-297,-1 0 1,-1 0-1,0 0 1,0 0 296,2 1 0,-1 0 0,0-1 0,0-2 0,8-2 0,-1-1 0,2-1 0,-2 1 0,3 0 0,-1 0 0,-3 0 0,-1-1 0,-2-1 0,2 1 0,-1 1 0,2 0 0,2 2 0,0 0 0,2 2 0,0 1 0,0 1 0,0-1 0,-5 0 0,-1 0 0,0 0 0,3 0-261,-5 0 1,1 0 0,2 0 0,0 0 0,-1 0 0,-2 0 260,8 0 0,-2 0 0,-1 0 0,0 0 0,3 0 0,-1 0 0,1 0 0,-1 0-376,-1 0 0,-1 1 0,0-1 0,0-1 376,-2-2 0,1-2 0,-1 1 0,-1 0 242,6 3 0,-1 0 1,0-1-243,-9-1 0,1-2 0,-1 1 0,-4 1 0,6 2 0,-4 2 579,-2-1 1,-3 0-580,-1 0 2348,-27 0-2348,12 0 1950,-8 0-1950,9 0 0,11-16 0,11 13 0,4 2 0,4-15 0,-4 8 0,-4 1 0,-19 3 0,11-12 0,-27 16 0,12 0 0,0 0 0,7 0 0,5 0 0,1 0 0,0 0 0,-1 0 0,-1 0 0,20 0 0,-43 0 0,12 0 0,-16 0 0,16 0 0,-13 0 0,13 0 0,-16 0 0</inkml:trace>
+  <inkml:trace contextRef="#ctx0" brushRef="#br0" timeOffset="10171">10901 14093 24575,'35'0'0,"2"0"0,8 0 0,-10 0 0,3 0 0,4 0 0,2 0 0,1 0-469,-4 0 1,2 0 0,1 0 0,2 0 0,1 0 0,1 0 0,1 0 140,-7 0 0,2 0 0,2 0 1,0 0-1,1 0 0,0 0 1,1 0-1,-1 0 0,0 0 1,-1 0-1,0 0 0,-1 0 0,0 0 1,0 0-1,0 0 0,1 0 1,-1 0-1,-1 0 0,1 0 1,0 0 264,4 0 0,1 0 0,-1 0 0,1 0 0,-1 0 0,0 0 0,-1 0 0,-1 0 0,-1 0 7,6 0 1,-1 0-1,-1 0 1,-1 0 0,0 0-1,-2 0 1,0 0 55,1 1 0,-2-1 0,0 1 0,-1-1 0,0-1 0,-1 0 86,0 0 1,1-2 0,-1 0 0,-1 0-1,-1 0 1,-3 1-87,4 1 0,-3 0 0,-2 0 0,2 0-107,3-3 1,0 0-1,0-1 1,-4 2 106,-2 3 0,-3 1 0,1-2 0,5-3 0,1-3 0,0 3 0,-5 2 0,1 1 0,0 0 0,5-4 0,1 0 0,1-1 0,1 0 0,1 1 0,2 0 667,-7 4 0,1 1 0,0 0 0,2-3-667,3-3 0,2-2 0,0-1 0,2 1 105,-7 3 0,1 1 1,1 0-1,0 1 0,0-1-105,1 1 0,0-1 0,0 0 0,1 0 0,2 0 0,-7 0 0,2-1 0,1-1 0,0 1 0,0 1 0,-2-1 0,-2 2 0,2 2 0,-2 0 0,-2 1 0,0 0 0,1-2 0,4 0 0,1-2 0,0 0 0,-4 1 0,-5 1 936,9 1 1,-6 2-937,-8-1 0,-1 0 323,3 0 1,1 0-324,-4 0 0,0 0 930,4 0 0,1 0-930,6 0 0,2 0 0,1 0 0,0 0 0,-1 0 0,2 0 0,-8 0 0,5 0 0,0 0 0,-2 0 0,5 0 0,-2 0 0,3 0 457,-2 0 1,2 0 0,1 0 0,-4 0-458,5 0 0,-2 0 0,-3 0 0,7 0 0,-4 0 0,-11 0 0,-2 0 0,-6 0 0,-5 0 0,-3 0 0,27 0 0,-13-1 0,7 1 0,1 1 0,-6 2 0,1 1 0,2 1 0,2-2-340,0-1 1,4-1 0,2-2-1,0 1 1,-2 1 0,-3 0 339,0 3 0,-2 1 0,-2-1 0,0-1 0,4-2 0,2-1 0,-4-1 0,-9 1 1150,5 0-1150,-21 0 0,-15 16 0,0 3 0,0 17 0,0-17 0,0-3 0,0-16 0</inkml:trace>
+</inkml:ink>
+</file>
+
+<file path=ppt/ink/ink26.xml><?xml version="1.0" encoding="utf-8"?>
+<inkml:ink xmlns:inkml="http://www.w3.org/2003/InkML">
+  <inkml:definitions>
+    <inkml:context xml:id="ctx0">
+      <inkml:inkSource xml:id="inkSrc0">
+        <inkml:traceFormat>
+          <inkml:channel name="X" type="integer" min="-2.14748E9" max="2.14748E9" units="cm"/>
+          <inkml:channel name="Y" type="integer" min="-2.14748E9" max="2.14748E9" units="cm"/>
+          <inkml:channel name="F" type="integer" max="32767" units="dev"/>
+        </inkml:traceFormat>
+        <inkml:channelProperties>
+          <inkml:channelProperty channel="X" name="resolution" value="1000" units="1/cm"/>
+          <inkml:channelProperty channel="Y" name="resolution" value="1000" units="1/cm"/>
+          <inkml:channelProperty channel="F" name="resolution" value="0" units="1/dev"/>
+        </inkml:channelProperties>
+      </inkml:inkSource>
+      <inkml:timestamp xml:id="ts0" timeString="2026-02-04T21:08:39.415"/>
+    </inkml:context>
+    <inkml:brush xml:id="br0">
+      <inkml:brushProperty name="width" value="0.05292" units="cm"/>
+      <inkml:brushProperty name="height" value="0.05292" units="cm"/>
+      <inkml:brushProperty name="color" value="#FF0000"/>
+    </inkml:brush>
+  </inkml:definitions>
+  <inkml:trace contextRef="#ctx0" brushRef="#br0">2381 7726 24575,'20'0'0,"27"0"0,-24 0 0,9 0 0,3 0 0,-7 0 0,-1 0 0,0 0 0,1 0 0,-3 0 0,1 0 0,0 0 0,-1 0 0,14 0 0,-6 0 0,1 0 0,-7 0 0,0 0 0,1 0 0,-1 0 0,-1 0 0,-1 0 0,11 0 0,-1 0 0,0 0 0,0 0 0,-10 0 0,1 0 0,5 0 0,1 0 0,4 0 0,1 0 0,2 0 0,0 0 0,-11 0 0,-1 0 0,7 0 0,-2 0 0,8 0 0,-7 0 0,0 0 0,6 0 0,-13 0 0,-1 0 0,1 0 0,-1 0 0,15 0 0,-15 0 0,1 0 0,-1 0 0,1 0 0,13 0 0,-14 0 0,1 0 0,9 0 0,-15 0 0,11 0 0,-27 0 0,12 0 0,15 0 0,0 0 0,2 0 0,3 0 0,3 0 0,0 0 0,-2 0 0,1 0 0,-5 0 0,2 0 0,-1 0 0,3 0 0,0 0 0,6 0 0,0 0 0,1 0 0,-1 0 0,-7 0 0,2 0 0,-5 0 0,2 1 0,-1-2 0,11-7 0,0 0 0,4 6 0,0 0 0,-14-3 0,-1-1 0,1 2 0,13 3 0,2 2 0,-10-1 0,2 0 0,-3 0 0,9 0 0,-1 0 0,-13 0 0,1 0 0,-3 0 0,4 0 0,-1 0 0,7-8 0,2 0 0,1 6 0,0 0-209,-8-2 1,2-2 0,-1 0 208,-2 1 0,-1-1 0,2 2 0,6 2 0,1 2 0,-2-2 0,6-6 0,-2 0 0,-7 7 0,2 1 0,-3 1 0,0-1 0,-2 0 0,0 0 0,-1 0 0,-1 1 0,-1-2 0,-6-7 0,0 0 0,16 6 0,1 0 0,-7-6 0,0 1 312,7 6 1,-2 2-313,5-1 0,2 0 0,-37 0 0,20 0 0,-13 0 0,12 0 0,5 0 0,-8 0 0,3 0 0,1-5 0,4-1 0,-3 1 0,5 3 0,-1 0 0,6-6 0,0 0 0,1 7 0,-2 2 0,-4-1 0,-1 0 0,6 0 0,0 0 0,-8 0 0,1 0 0,9 0 0,4 0-393,-15 0 0,2 0 0,2 0 393,9 0 0,4 0 0,-1 0 0,-10 0 0,0 0 0,0 0 0,1 0-383,3 0 0,0-1 0,1 1 1,-1 1 382,-4 2 0,1 1 0,-1 1 0,-1-1 0,-1 1 0,-1 0 0,1 0 0,-2 0-320,11 1 1,-1 0-1,0 1 320,0 4 0,-2 1 0,0-3-62,-7-7 1,0-2 0,-2 2 61,0 3 0,0 1 0,-3-2 507,4-4 1,-1 0-508,7 8 0,2 0 0,0-6 0,2 0 506,-7 3 1,2 1 0,1-1-507,2-4 0,1-2 0,-1 1 0,-6 0 0,-2 0 0,2 0 216,4 0 0,1 0 0,-3 0-216,5 0 0,0 0 0,-1 0 0,2 0 0,2 0-413,-9 0 1,1 0 0,0 0 0,1 0 412,4 0 0,0 0 0,1 0 0,-1 0 0,-3-1 0,1 1 0,-1-1 0,-1 3-1,-2 0 1,-1 2-1,1 1 1,0-1 0,5 1 0,2 0 0,0 0 0,-2 0 0,-5-1 0,-1 1 0,0 0 0,0 0-119,6 3 0,1 1 1,-1 0-1,-4-3 119,7-4 0,-4 0 198,-8 6 1,-4-1-199,5-7 1862,-17 0-1862,-3 0 2,0 0-2,11 0 267,-3 0 1,5 0-268,4 0 0,5 0 0,1 0 0,7 0 0,3 0 0,1 0 0,-6 0 0,1 0 0,1 0 0,-1 0 0,-3 0 0,-1 0 0,-1 0 0,-2 0 0,0 0 0,-3 0 0,-2 0 0,2 0 0,-4 0 0,5 0 0,-17 0 0,12 0 0,-2 0 0,1 0 0,15 0 0,-5-2 0,-5 4 0,-16 14 0,-3-12 0,0 12 0,19-16 0,-2 0 0,9 0 0,4 0 0,-2 0 0,-5 0 0,0 0 0,1 0 0,2 0-363,3 0 0,4 1 1,0-1-1,-1 0 1,-3-1 362,-3-3 0,-1 0 0,-3-1 0,-1 2 0,4 2 0,-3 0 0,-3-1 0,2-6 0,-3 0 0,-7 8 0,-3 0 0,-5 0 0,12 0 0,-27 0 0,12 0 0,-16 0 0,0 0 0</inkml:trace>
+</inkml:ink>
+</file>
+
+<file path=ppt/ink/ink27.xml><?xml version="1.0" encoding="utf-8"?>
+<inkml:ink xmlns:inkml="http://www.w3.org/2003/InkML">
+  <inkml:definitions>
+    <inkml:context xml:id="ctx0">
+      <inkml:inkSource xml:id="inkSrc0">
+        <inkml:traceFormat>
+          <inkml:channel name="X" type="integer" min="-2.14748E9" max="2.14748E9" units="cm"/>
+          <inkml:channel name="Y" type="integer" min="-2.14748E9" max="2.14748E9" units="cm"/>
+          <inkml:channel name="F" type="integer" max="32767" units="dev"/>
+        </inkml:traceFormat>
+        <inkml:channelProperties>
+          <inkml:channelProperty channel="X" name="resolution" value="1000" units="1/cm"/>
+          <inkml:channelProperty channel="Y" name="resolution" value="1000" units="1/cm"/>
+          <inkml:channelProperty channel="F" name="resolution" value="0" units="1/dev"/>
+        </inkml:channelProperties>
+      </inkml:inkSource>
+      <inkml:timestamp xml:id="ts0" timeString="2026-02-04T21:09:16.480"/>
+    </inkml:context>
+    <inkml:brush xml:id="br0">
+      <inkml:brushProperty name="width" value="0.05292" units="cm"/>
+      <inkml:brushProperty name="height" value="0.05292" units="cm"/>
+      <inkml:brushProperty name="color" value="#FF0000"/>
+    </inkml:brush>
+  </inkml:definitions>
+  <inkml:trace contextRef="#ctx0" brushRef="#br0">4427 7761 24575,'20'0'0,"11"0"0,-11 0 0,15 0 0,-9-7 0,-1-2 0,14 6 0,-3-13 0,-5 16 0,-27 0 0,27 0 0,7-8 0,7 0 0,-10 6 0,3 2 0,2-2-492,0-4 0,2-3 0,1 0 0,1 2 492,3 5 0,1 2 0,0 0 0,-1-2 0,-7-5 0,-1-2 0,0 0 0,0 3-93,1 3 0,1 3 0,-2 0 0,-3-1 93,12-8 0,-5 2 0,-7 6 0,-6 2 0,-10-1 0,-4 0 0,-1 0 964,23 0 0,7 0-964,-13 0 0,2 0 137,0 0 0,3 0 1,-6 0-138,12 0 0,-25 0 0,5 0 0,-19 0 0,28 0 0,-7 0 0,1 0 0,17 0 0,-10 0 0,0 0 0,3 0 0,-1 0 0,-15 0 0,-5 0 0,1 0 0,3 0 0,5 7 0,3 2 0,8-7 0,1 0 0,0 6 0,2-1 0,-4-5 0,2-3 0,-4 0 0,-1 1 0,-3 0 0,7 0 0,-3 0 0,3 0 0,-15 0 0,5 0 0,5 0 0,-3 0 0,2 0 0,19 0 0,2 0 0,-5 0 0,1 0 0,-11 0 0,0 0 0,-4 0 0,13 0 0,3 0 0,-32 0 0,5 0 0,24 7 0,10 2 0,-17-7 0,1-2 0,1 2 0,4 3 0,1 1 0,-2-1 0,-6-4 0,-1-2 0,-4 1 0,12 0 0,-25 0 0,5 15 0,-3-11 0,11 4 0,4 0 0,-6-7 0,1-2 0,2 0 0,3 1 0,0 1 0,0 3 0,1 3 0,-1-2 0,11-3 0,2-1 0,0 4 0,4 2 0,-3-3 0,0-3 0,0-2 0,-9 1 0,2 0 0,-3 0 0,3 0 0,-5 0 0,-10 0 0,-1 0 0,17 0 0,-24 0 0,13 0 0,-28 0 0,43 16 0,-21-14 0,3 0 0,6 6 0,4-1 0,-6-5 0,2-3 0,-1 0 0,12 0 0,-2 2 0,-5 7 0,-3 0 0,-8-7 0,-5 2 0,-8 13 0,-15-16 0,0 0 0,16 15 0,-12-11 0,27 12 0,0-22 0,5-4 0,-5 8 0,3 2 0,3-2-365,4-1 0,3-2 1,2 1-1,-3 1 365,5 2 0,-1 1 0,-1 1 0,2-1 0,0 0 0,-6 0 0,-13 0 0,-4 0 0,22 0 0,-58 0 0,22 0 0,-26 0 0,-1 0 0,12 0 0,-12 0 0</inkml:trace>
+  <inkml:trace contextRef="#ctx0" brushRef="#br0" timeOffset="18934">21061 15169 24575,'36'0'0,"1"0"0,0 0 0,0 0 0,2 0 0,2 0 0,0 0 0,6 0 0,0 0 0,2 0 0,0 0-656,-4 0 1,1 0-1,1 0 1,-1 0 0,-2 0 416,2 0 0,0 0 0,-2 0 1,0 0 238,-2 0 0,-1 0 0,0 0 0,0 0-114,-2 1 1,-1-1 0,1 1-1,0-3 114,-2-1 0,1-1 0,0-1 0,1 2 0,8 1 0,1 3 0,1-2 0,-1-1 0,-2-5 0,-1-2 0,0 0 0,0 2 0,-2 5 0,-1 3 0,1-1 0,-3-2 0,8-8 0,-1-2 0,-3 2 263,-4 8 1,-2 3-1,-2-4-263,10-12 0,-2-1 0,1 13 0,-3 2 0,-14-7 0,-2 0 1017,1 9 1,-3-2-1018,12-14 1533,-17 11-1533,13-12 328,3 16-328,-3 0 0,6 0 0,-1 0 0,3 0 0,5 0 0,-4 0 0,5 0 0,2 0 0,1 0 0,-2 0-640,-1 0 0,-1-1 0,0 1 0,1 0 0,2 1 640,-2 1 0,2 0 0,1 2 0,0-1 0,-1 0 0,-2-1 0,0-1 0,-1-2 0,-2 1 0,0 1 0,-1 2-292,5 3 0,-2 2 1,-2 1-1,1-1 292,-6-2 0,-1-2 0,-1 1 0,1 0-119,3-1 1,0 0-1,-1 1 1,-5 1 118,8 11 0,-1-2 0,-2-13 0,3-3 0,-10 3 0,-8 14 2896,23-16-2896,-43 0 0,22 0 0,11 0 0,5 0 0,6 0 71,-11 0 1,3 0-1,4 0 1,3 0-72,-6 0 0,4 0 0,3 0 0,1 0 0,0 0 0,-2 0 0,-2 0-351,4 0 1,-2 0-1,-2 0 1,1 0-1,2 0 351,-3 0 0,3 0 0,1 0 0,-2 0 0,-4 0 0,-5 0 0,1 0 0,-5 0 0,-5 0 0,14 0 0,-25 16 0,-10-12 0,-8 11 958,0 1-958,15-12 2454,21 12-2454,-4-15 0,6-2 0,0 5 0,4 2 0,0-1-401,0-3 1,1-1 0,1 0 400,-5 3 0,1 0 0,0 1 0,-2-2 0,0-2 0,-2-2 0,0 1 0,-1 0 0,-1 0 0,-1 0 0,4 0 0,-4 0 0,6 0 0,8 0 0,-43 0 0,12 0 1201,7-16-1201,15 12 0,-1-10 0,4-3 0,4 7 0,0 0 0,2-7 0,-4-1 0,-13 8 0,-5 1 0,7-7 0,-32 16 0,0 0 0</inkml:trace>
+  <inkml:trace contextRef="#ctx0" brushRef="#br0" timeOffset="22499">30674 13847 24575,'0'19'0,"0"28"0,0-21 0,0 3 0,0 4 0,0 4 0,0-1 0,0 12 0,0-2 0,0-3 0,0 0 0,0-2 0,0 0 0,0-7 0,0 2 0,0 0 0,0 6 0,0 1 0,0 2-515,0 4 0,0 1 1,0 0 514,0-4 0,0 1 0,0-1 0,0-2 0,0 0 0,0 1 0,0 2 0,0 0 0,0 0 0,0 1 0,0-1 0,0-1 0,0-3 0,0-1 0,0-1 104,0-5 1,0-1 0,0 0-105,0 10 0,0-4 0,0-2 0,0 8 0,0-43 0,0 19 1166,0-21-1166,0 6 64,0 24-64,0-7 0,0 4 0,0 13 0,0 7 0,0-10 0,0 5 0,0 1 0,0-5 0,0-3 0,0-3 0,0 1 0,0 11 0,0 3 0,0-11 0,0-2 0,0-5 0,0-27 0,0 27 0,0-7 0,0 3 0,0 16 0,0 4-248,0-9 0,0 2 0,0 0 248,0 1 0,0 1 0,0-2 0,0 11 0,0-4 0,0-10 0,0-3 0,0-7 0,0-3 0,0-5 0,0-3 0,0-16 0</inkml:trace>
+  <inkml:trace contextRef="#ctx0" brushRef="#br0" timeOffset="32182">24836 3228 24575,'0'25'0,"0"1"0,0 4 0,0 3 0,0-1 0,0 3 0,0 1-302,0 6 1,0 1 0,0 6 301,0-9 0,0 4 0,0 3 0,0 1 0,0-1 0,0-3-656,0 0 1,0-3-1,0 0 1,0 1 0,0 2 645,0 2 1,0 3 0,0 1 0,0 0 0,0-2-1,0-3 10,0 4 0,0-2 0,0-2 0,0-2 44,0 7 0,0-2 1,0-1-45,0 0 0,0 0 0,0-4 0,0 4 0,0-3 0,0-7 0,0-4 0,0 2 374,0-3-374,0-28 2734,0 11-2734,0-15 996,0 16-996,0-12 0,0 27 0,0-11 0,0 13 0,0 8 0,-5-4 0,-1 4 0,1 5-547,3-4 1,1 7 0,1 3 0,0 2 0,0-2 0,-1-3 430,-2-2 1,0-2 0,-1-1 0,1 0-1,0 3 116,2 2 0,1 3 0,0 1 0,1-2 0,-1-3 0,0-7 0,0 0 0,0-7 0,0-1 0,0 8 0,0-8 0,0-13 0,0-20 0,0-20 0</inkml:trace>
+  <inkml:trace contextRef="#ctx0" brushRef="#br0" timeOffset="35534">12400 4710 24575,'28'0'0,"-1"0"0,6 0 0,1 0 0,-1 0 0,4 0 0,3 0 0,4 0 0,2 0 0,1 0 0,2 0 0,2 0-740,-3 0 0,3 0 0,0 0 0,-2 0 740,-6 0 0,-2 0 0,-1 0 0,1 0 0,3 0 0,0 0 0,0 0 0,-3 0 31,-3 0 0,-3 0 1,1 0-32,6 0 0,0 0 0,0 0 0,-6 0 0,-1 0 0,2 0 0,6 0 0,2 0 0,0 0 0,-3 0 0,0 0 0,-1 0 0,-4 0 0,-1 0 0,-3 0 0,4 0 0,-3 0 0,-7 0 0,-3 0 0,-5 0 0,13 0 2187,-29 0-2187,29 0 0,-8 0 0,3 0 0,15 0 0,6 0-408,-2 0 0,5 0 1,1 0 407,-9 0 0,2 1 0,0-1 0,0-1 0,2-2 0,0-1 0,0-1 0,0 1 0,1-1 0,1 0 0,-1 0 0,-1 0 0,-2 1 0,-1-1 0,0 0 0,0 0 0,-2-3 0,1-1 0,-1 1 0,-1 1 0,-1 5 0,0 2 0,-1 1 0,1-4-241,2-3 1,0-3 0,0 0 0,-3 2 240,0 5 0,-2 2 0,0-2 0,5-3 0,-1-1 0,-6 1 0,4 5 0,8 0 0,-27 0 901,4 0 1,3 0-902,-1 0 0,3 0 0,16 0 0,4 0 0,-14 0 0,1 0 0,1 0 71,1 0 1,1 0 0,1 0-72,5 0 0,1 0 0,0 0-497,1 0 0,0 0 1,0 0 496,-7 0 0,0 0 0,1 0 0,-1 0 0,0 0 0,0 0 0,1 0 0,-1 0 0,1 0 0,0 0 0,1 0 0,-1 0 0,-2 0 0,1 0 0,0 0 0,-1 0 0,0 1 0,-1-1 0,0 1 0,0-3 0,1-1 0,1-1 0,-1-1 0,0 2 0,9 1 0,-1 2 0,-1-2 0,-4-2 0,0-2 0,-1 0 0,1 1 0,0-1 0,-4 2 0,-3 2 0,-3 0 0,-6-7 0,-3 2 781,0 7-781,-19 0 1554,27 0-1554,10 0 0,11 0 0,0 0 0,-13 0 0,0 0 0,1 0 0,3 0-434,4 0 0,3 0 1,1 0-1,0 0 0,-3 0 434,1 0 0,-2 0 0,-2 0 0,-2 0 0,2 0 0,-3 0 0,-5 0 0,-3 0 0,-5 0 0,2 0 0,-31 0 0</inkml:trace>
+  <inkml:trace contextRef="#ctx0" brushRef="#br0" timeOffset="64600">4568 7479 24575,'42'10'0,"-1"-1"0,4 0 0,4-2 0,-10-5 0,5-2 0,2-1 0,-3 0-639,-3 1 1,-1 0 0,0 0 0,0 0 638,2 0 0,0 0 0,-1 0 0,-3 0 0,15 0 0,-6 0 406,-10 0 1,-5 0-407,-12 0 421,12 0-421,-11 0 0,15 0 0,-2 0 0,1 0 659,-5 0 1,1 0-660,14 0 0,-2 0 0,-3 0 0,-7 0 0</inkml:trace>
+  <inkml:trace contextRef="#ctx0" brushRef="#br0" timeOffset="66634">9137 7620 24575,'-35'0'0,"9"0"0,1 0 0,-14 0 0,-5 0 0,27 0 0,9 16 0,8-12 0,0 11 0,0-15 0,0 0 0,8 0 0,-6 0 0,6 0 0,-8 0 0,0 0 0,15 0-820,-11 0 1,12 0 0,-16 0 0</inkml:trace>
+  <inkml:trace contextRef="#ctx0" brushRef="#br0" timeOffset="86500">3493 8520 24575,'35'0'0,"0"0"0,6 0 0,4 0 0,-1 0 0,3 0 0,-1 0 0,-6 0 0,-1 1 0,0-2 0,7-3 0,0-2 0,-1 0 0,-7 0 0,-1 0 0,-2-2 0,11-9 0,0-1-354,-9 11 1,2 1 0,-1-1 353,-2-3 0,-1-2 0,0 3 0,10 6 0,0 2 173,-1-7 1,-2 0-174,-6 8 0,-1 0 88,-1 0 0,2 0-88,7 0 0,0 0 0,-6 0 0,1 0 0,-5 0 0,3 0 0,-3 0 0,0 0 0,0 0 0,17 0 0,0 0 0,-9 0 0,1 0 179,-4 0 0,3 0 0,1 0-179,-3 0 0,1 0 0,0 0 0,-2 0 0,2 0 0,-1 0 0,0 0 0,2 0 0,0 0 0,-6 0 0,-8 0 0,-3 0 0,2 0 0,-1 0 0,14 0 0,-6 0 0,1 0 0,13 0 0,-21 0 0,1 0 0,3 8 0,-1 0 0,10-4 0,-4 12 0,-19-1 0,-1-11 0,5 12 0,4-14 0,3-4 0,0 1 0,1 2 0,14 7 0,2 0 0,1-6 0,0 0 0,2 6 0,-4-1 0,-14-6 0,-3-2 0,21 1 0,-43 0 0,12 0 0,0 16 0,-12-12 0,11 12 0,-15-16 0,0 15 0,0-11 0,0 12 0,0 0 0,0-13 0,0 29 0,0-28 0,0 11 0</inkml:trace>
+  <inkml:trace contextRef="#ctx0" brushRef="#br0" timeOffset="89150">2187 6297 24575,'0'20'0,"0"9"0,0 4 0,0-4 0,0 1 0,0 7 0,0 5 0,0 1-980,0 3 0,0 1 0,0 1 980,0-9 0,0 0 0,0 1 0,0 3 0,0 1 0,0 3 0,0 1 0,0 0 0,0-4 0,0-3 0,0-1 0,0-2 0,0 2 0,0 5 0,0 2 0,0-2 0,0-6 465,0 0 0,0-8-465,0 5 483,0 11-483,0-8 0,1 1 0,-2 6 0,-2-11 0,-1 2 0,-1 3 0,2 1-654,1-2 1,2 1 0,0 2 0,0 1 0,-2 1 653,-2 1 0,-2 1 0,0 1 0,0 2 0,0-1 0,2 1 0,2-6 0,1 0 0,1 0 0,0 1 0,0 0 0,0 2 0,-1 1 0,0-2 0,-1 3 0,0 2 0,0 1 0,0 0 0,0-1 0,0-1 0,1-2 0,0-3 0,0 4 0,1-3 0,0-2 0,0 0 0,1 1 0,-1 1 0,0 3 0,0 5 0,0 0 0,0 0 0,0-3 0,0-6 0,0-8 632,0 7 0,0-7-632,0 9 0,0-12 0,0-29 0,0 12 0,0-16 0</inkml:trace>
+  <inkml:trace contextRef="#ctx0" brushRef="#br0" timeOffset="121232">31203 14058 24575,'0'26'0,"0"-1"0,0 2 0,0 1 0,0 6 0,0 3 0,0 6 0,0 0 0,0-7 0,0 2 0,0-1 0,0 2 0,0 3 0,0 0 0,0 4 0,0 0 0,0 0 0,0-2 0,0-2 0,0 2 0,0 1-458,0-3 1,0 2 0,0 0-1,0 0 1,0-3 457,0 0 0,0-1 0,0-2 0,0 0 0,0 10 0,0-1 0,0-1-24,0-3 1,0-2-1,0 1 24,0-4 0,0 0 0,0-1 0,0-2 0,0 0 0,0-1 0,0 16 0,0-2-4,0-2 0,0-2 4,0 1 0,0-4 0,0-12 0,0-3 0,0 1 0,0-3 1682,0 12-1682,0-1 674,0-16-674,0-3 10,0-16-10,0 16 0,0-12 0,0 27 0,0-27 0,-15 12 0,11-16 0,-12 15 0,16-11 0,0 12 0,0 0 0,0-12 0,0 11 0,0-15 0,0 0 0,0 0 0</inkml:trace>
 </inkml:ink>
 </file>
 
@@ -2297,6 +3160,37 @@
 </inkml:ink>
 </file>
 
+<file path=ppt/ink/ink9.xml><?xml version="1.0" encoding="utf-8"?>
+<inkml:ink xmlns:inkml="http://www.w3.org/2003/InkML">
+  <inkml:definitions>
+    <inkml:context xml:id="ctx0">
+      <inkml:inkSource xml:id="inkSrc0">
+        <inkml:traceFormat>
+          <inkml:channel name="X" type="integer" min="-2.14748E9" max="2.14748E9" units="cm"/>
+          <inkml:channel name="Y" type="integer" min="-2.14748E9" max="2.14748E9" units="cm"/>
+          <inkml:channel name="F" type="integer" max="32767" units="dev"/>
+        </inkml:traceFormat>
+        <inkml:channelProperties>
+          <inkml:channelProperty channel="X" name="resolution" value="1000" units="1/cm"/>
+          <inkml:channelProperty channel="Y" name="resolution" value="1000" units="1/cm"/>
+          <inkml:channelProperty channel="F" name="resolution" value="0" units="1/dev"/>
+        </inkml:channelProperties>
+      </inkml:inkSource>
+      <inkml:timestamp xml:id="ts0" timeString="2026-02-04T20:38:52.402"/>
+    </inkml:context>
+    <inkml:brush xml:id="br0">
+      <inkml:brushProperty name="width" value="0.05292" units="cm"/>
+      <inkml:brushProperty name="height" value="0.05292" units="cm"/>
+      <inkml:brushProperty name="color" value="#FF0000"/>
+    </inkml:brush>
+  </inkml:definitions>
+  <inkml:trace contextRef="#ctx0" brushRef="#br0">11501 10742 24575,'43'0'0,"0"0"0,-3 0 0,4 0 0,1 0 0,-6 0 0,0 0 0,3 0 0,1 0-656,1 0 1,3 0-1,1 0 1,1 0 0,-2 0 231,-3 0 0,0 0 0,0 0 0,0 0 0,0 0 424,0 0 0,1 0 0,0 0 0,-2 0 0,-1 0 208,0 0 1,-1 0 0,-2 0 0,-2 0-209,3 0 0,-3 0 0,-1 0 517,10 0 1,-5 0-518,-13 0 0,-1 0 0,-2 0 0,1 0 0,7 1 0,0-2 2801,10-15-2801,-10 14 0,1 0 363,-10-5 0,3-1-363,11 2 0,8 1 0,3 0 0,-10 1 0,2 1 0,1-1 0,1 0 0,0 0 0,2-3 0,0 0 0,1-1 0,-1 1 0,-1 0 0,-2 3 0,0 0 0,0 0 0,-3 1 0,-4-1 0,3-2 0,-4 0 0,-4 2 0,-4 3 0,-1 2 0,15-1 0,2 0 0,-3 1 0,1-2 0,5-7 0,0 0 0,-11 7 0,-1-2 0,-7-5 0,-2 1 0,8 7 0,17 0 0,-22 0 0,9 0 0,-17 0 0,13 0 0,-29 0 0,13 0 0,-16 0 0,0 15 0,-16-11 0,13 12 0,-13-16 0</inkml:trace>
+  <inkml:trace contextRef="#ctx0" brushRef="#br0" timeOffset="3332">7038 10319 24575,'8'-20'0,"19"11"0,14 5 0,2 1 0,-5 2 0,1 1 0,2 1 0,2-1 0,2 0 0,3 0 0,1 0 0,-1 0 0,-3 0 0,-1 0 0,-2 0 0,-1 0 0,-3 0 0,5 0 0,-2 0 0,-11 0 0,-11 0 0,-3 0 0,-16 0 0,0 0 0</inkml:trace>
+  <inkml:trace contextRef="#ctx0" brushRef="#br0" timeOffset="37283">5927 11077 24575,'19'0'0,"13"0"0,-28 0 0,43 0 0,-24 0 0,4-7 0,5-1 0,9 5 0,2 2 0,0-7 0,0 0 0,4 7 0,-3 2 0,-17 0 0,-3-2 0,7-15 0,-12 12 0,17-27 0,-17 27 0,13-12 0,-13 16 0,6 0 0,1 0 0,13 0 0,-12 0 0,-3 0 0,-4 0 0,-4 0 0,-16-7 0,0 5 0,15-6 0,-11 8 0,12 0 0,0 0 0,-12-16 0,27 12 0,4-12 0,-8 15 0,1 2 0,0-1 0,-1 0 0,16 0 0,-10 0 0,-5 0 0,7 0 0,-15 0 0,11 0 0,-27 0 0,27 0 0,-11 16 0,15-12 0,1 12 0,-17-16 0,12 0 0,-27 8 0,28-6 0,-13 5 0,17-7 0,-1 0 0,0 0 0,-15 0 0,11 0 0,-11 16 0,-1-12 0,13 12 0,-13-16 0,1 0 0,11 0 0,-11 0 0,-1 0 0,-3 0 0,0 0 0,3 0 0,17 0 0,-1 0 0,-7 0 0,3 0 0,5-1 0,0 2 0,-2 6 0,-1 1 0,-6-6 0,-3 0 0,7 14 0,-27-16 0,27 0 0,-27 0 0,28 0 0,-28 0 0,11 0 0,-15 16 0,0-12 0,0 27 0,0-27 0,0 12 0,0-16 0,0 15 0,0 5 0</inkml:trace>
+  <inkml:trace contextRef="#ctx0" brushRef="#br0" timeOffset="92699">10566 14270 24575,'0'35'0,"0"-11"0,0 3 0,0 15 0,0 2 0,0 2 0,0 2 0,0-10 0,0 4 0,0 1 0,0-5 0,0 13 0,0-2 0,0-7 0,0 1 0,0-2 0,0 3 0,0-2 0,0 2 0,0 2 0,0-7 0,0 2 0,0 0 0,0 1 0,0 0 0,0 0 0,0 0 0,0 1 0,0-3 0,-2 7 0,4-4 0,5-7 0,1-5 0,-4 4 0,12-15 0,0 19 0,3-17 0,17 5 0,-13-10 0,4-3 0,17-10 0,7-4 0,-6 9 0,3 2 0,2 1 0,-8-3 0,1 0 0,1 0 0,-1-1 0,-2-2 0,0 0 0,-1-1 0,-1 2 0,7 3 0,-1 2 0,1-3 0,-8-7 0,0-2 0,1-1 0,-1 0 0,10 1 0,-1 0 0,-1 0 0,-3 0 0,0 0 0,-2 0 0,-3 0 0,-2 0 0,-4 0 0,-3 0 0,-3 0 0,2 0 0,-1 0 0,-1 0 0,-1 0 0,-1 0 0,3 0 0,4 0 0,4 0 0,1 0 0,5 0 0,2 0 0,2 0 0,-4 0 0,2 0 0,0 0 0,-1 0 0,7 0 0,0 0 0,-4 0 0,6 0 0,-4 0 0,-13 0 0,-2 0 0,-7 0 0,1 0 0,6 0 0,4 0 0,-2 0 0,7 0 0,1 0 0,-4 1 0,3 0 0,-3-3 0,-1-5 0,-3-2 0,3 1 0,-4-3 0,-12-6 0,-3-2 0,9 2 0,-6-1 0,-18-17 0,13-8 0,-7 18 0,-2-3 0,-5-17 0,0-4 0,7 8 0,4-1 0,-4-1 0,-6 0 0,-3-1 0,1 2 0,4 5 0,1 2 0,-1 1 0,-5-9 0,0 4 0,0 11 0,0 1 0,0 0 0,0-1 0,0-4 0,0-3 0,0-11 0,0-2 0,-1 1 0,2-2 0,3 11 0,2 0 0,-1 1 0,-3-8 0,0 3 0,6 6 0,0 2 0,-7 5 0,-2 3 0,1-9 0,0 3 0,0 28 0,0-11 0,0-1 0,0 12 0,-16-12 0,12 1 0,-11 11 0,15-12 0,-16 0 0,12 13 0,-27-29 0,27 13 0,-28-17 0,13 1 0,-16 0 0,15 15 0,4 4 0,1 16 0,-21 0 0,-3 0 0,4 0 0,3-15 0,29 11 0,-44-12 0,23 16 0,-1-7 0,-1-1 0,-9 4 0,0-12 0,-1 16 0,11-8 0,-1 0 0,-13 4 0,6-2 0,-1-3 0,-5-7 0,14 15 0,-1-2 0,5-12 0,-1-1 0,-12 5 0,0 2 0,8-1 0,1 0 0,-9 1 0,1 3 0,7 6 0,1 0 0,-2-8 0,-1 0 0,1 6 0,-1 0 0,-5-6 0,0 1 0,5 6 0,1 2 0,-8-9 0,-1 0 0,1 6 0,0 0 0,-1-6 0,1 0 0,-1 7 0,2 2 0,5-1 0,3 0 0,-10 0 0,5 0 0,11 0 0,-7 0 0,-22-8 0,18 6 0,-15-2 0,-6 1 0,6 3 0,-2 0-362,11-3 0,-3-2 0,-1 0 0,2 2 362,-10 1 0,1 2 0,0-2 0,9-1 0,-1-2 0,0 0 0,2 2 0,-8 2 0,2 2 0,1-1-50,6 1 0,1 0 1,1-3 49,-14-5 0,4-1 0,16 6 0,3 0 0,-1-7 0,3 2 0,4 7 0,-11 0 1436,27 0-1436,-12 16 161,16-12-161,0 27 0,0-27 0,0 35 0,0-17 0,0 21 0,0-8 0,0-15 0,16-5 0,-12-15 0,12 16 0,-16-12 0,0 12 0,15-1 0,-11-11 0,12 28 0,-16-13 0,0 16 0,16-15 0,-12-4 0,11-16 0,-15 0 0</inkml:trace>
+</inkml:ink>
+</file>
+
 <file path=ppt/notesMasters/notesMaster1.xml><?xml version="1.0" encoding="utf-8"?>
 <p:notesMaster xmlns:a="http://schemas.openxmlformats.org/drawingml/2006/main" xmlns:r="http://schemas.openxmlformats.org/officeDocument/2006/relationships" xmlns:p="http://schemas.openxmlformats.org/presentationml/2006/main">
   <p:cSld>
@@ -2379,7 +3273,7 @@
           <a:p>
             <a:fld id="{0FE4A08A-2663-6E4C-B1DC-5BBC17F83115}" type="datetimeFigureOut">
               <a:rPr lang="en-US" smtClean="0"/>
-              <a:t>2/2/26</a:t>
+              <a:t>2/4/26</a:t>
             </a:fld>
             <a:endParaRPr lang="en-US"/>
           </a:p>
@@ -2793,7 +3687,7 @@
           <a:p>
             <a:fld id="{68424796-D03B-5E41-81B6-00E7B73B0CFA}" type="datetimeFigureOut">
               <a:rPr lang="en-US" smtClean="0"/>
-              <a:t>2/2/26</a:t>
+              <a:t>2/4/26</a:t>
             </a:fld>
             <a:endParaRPr lang="en-US"/>
           </a:p>
@@ -2991,7 +3885,7 @@
           <a:p>
             <a:fld id="{68424796-D03B-5E41-81B6-00E7B73B0CFA}" type="datetimeFigureOut">
               <a:rPr lang="en-US" smtClean="0"/>
-              <a:t>2/2/26</a:t>
+              <a:t>2/4/26</a:t>
             </a:fld>
             <a:endParaRPr lang="en-US"/>
           </a:p>
@@ -3199,7 +4093,7 @@
           <a:p>
             <a:fld id="{68424796-D03B-5E41-81B6-00E7B73B0CFA}" type="datetimeFigureOut">
               <a:rPr lang="en-US" smtClean="0"/>
-              <a:t>2/2/26</a:t>
+              <a:t>2/4/26</a:t>
             </a:fld>
             <a:endParaRPr lang="en-US"/>
           </a:p>
@@ -3397,7 +4291,7 @@
           <a:p>
             <a:fld id="{68424796-D03B-5E41-81B6-00E7B73B0CFA}" type="datetimeFigureOut">
               <a:rPr lang="en-US" smtClean="0"/>
-              <a:t>2/2/26</a:t>
+              <a:t>2/4/26</a:t>
             </a:fld>
             <a:endParaRPr lang="en-US"/>
           </a:p>
@@ -3672,7 +4566,7 @@
           <a:p>
             <a:fld id="{68424796-D03B-5E41-81B6-00E7B73B0CFA}" type="datetimeFigureOut">
               <a:rPr lang="en-US" smtClean="0"/>
-              <a:t>2/2/26</a:t>
+              <a:t>2/4/26</a:t>
             </a:fld>
             <a:endParaRPr lang="en-US"/>
           </a:p>
@@ -3937,7 +4831,7 @@
           <a:p>
             <a:fld id="{68424796-D03B-5E41-81B6-00E7B73B0CFA}" type="datetimeFigureOut">
               <a:rPr lang="en-US" smtClean="0"/>
-              <a:t>2/2/26</a:t>
+              <a:t>2/4/26</a:t>
             </a:fld>
             <a:endParaRPr lang="en-US"/>
           </a:p>
@@ -4349,7 +5243,7 @@
           <a:p>
             <a:fld id="{68424796-D03B-5E41-81B6-00E7B73B0CFA}" type="datetimeFigureOut">
               <a:rPr lang="en-US" smtClean="0"/>
-              <a:t>2/2/26</a:t>
+              <a:t>2/4/26</a:t>
             </a:fld>
             <a:endParaRPr lang="en-US"/>
           </a:p>
@@ -4490,7 +5384,7 @@
           <a:p>
             <a:fld id="{68424796-D03B-5E41-81B6-00E7B73B0CFA}" type="datetimeFigureOut">
               <a:rPr lang="en-US" smtClean="0"/>
-              <a:t>2/2/26</a:t>
+              <a:t>2/4/26</a:t>
             </a:fld>
             <a:endParaRPr lang="en-US"/>
           </a:p>
@@ -4603,7 +5497,7 @@
           <a:p>
             <a:fld id="{68424796-D03B-5E41-81B6-00E7B73B0CFA}" type="datetimeFigureOut">
               <a:rPr lang="en-US" smtClean="0"/>
-              <a:t>2/2/26</a:t>
+              <a:t>2/4/26</a:t>
             </a:fld>
             <a:endParaRPr lang="en-US"/>
           </a:p>
@@ -4914,7 +5808,7 @@
           <a:p>
             <a:fld id="{68424796-D03B-5E41-81B6-00E7B73B0CFA}" type="datetimeFigureOut">
               <a:rPr lang="en-US" smtClean="0"/>
-              <a:t>2/2/26</a:t>
+              <a:t>2/4/26</a:t>
             </a:fld>
             <a:endParaRPr lang="en-US"/>
           </a:p>
@@ -5202,7 +6096,7 @@
           <a:p>
             <a:fld id="{68424796-D03B-5E41-81B6-00E7B73B0CFA}" type="datetimeFigureOut">
               <a:rPr lang="en-US" smtClean="0"/>
-              <a:t>2/2/26</a:t>
+              <a:t>2/4/26</a:t>
             </a:fld>
             <a:endParaRPr lang="en-US"/>
           </a:p>
@@ -5443,7 +6337,7 @@
           <a:p>
             <a:fld id="{68424796-D03B-5E41-81B6-00E7B73B0CFA}" type="datetimeFigureOut">
               <a:rPr lang="en-US" smtClean="0"/>
-              <a:t>2/2/26</a:t>
+              <a:t>2/4/26</a:t>
             </a:fld>
             <a:endParaRPr lang="en-US"/>
           </a:p>
@@ -10229,6 +11123,57 @@
           </a:fontRef>
         </p:style>
       </p:cxnSp>
+      <mc:AlternateContent xmlns:mc="http://schemas.openxmlformats.org/markup-compatibility/2006">
+        <mc:Choice xmlns:p14="http://schemas.microsoft.com/office/powerpoint/2010/main" Requires="p14">
+          <p:contentPart p14:bwMode="auto" r:id="rId2">
+            <p14:nvContentPartPr>
+              <p14:cNvPr id="3" name="Ink 2">
+                <a:extLst>
+                  <a:ext uri="{FF2B5EF4-FFF2-40B4-BE49-F238E27FC236}">
+                    <a16:creationId xmlns:a16="http://schemas.microsoft.com/office/drawing/2014/main" id="{12AADC8E-3DF0-6125-A515-2D5617E39751}"/>
+                  </a:ext>
+                </a:extLst>
+              </p14:cNvPr>
+              <p14:cNvContentPartPr/>
+              <p14:nvPr/>
+            </p14:nvContentPartPr>
+            <p14:xfrm>
+              <a:off x="2133720" y="3701520"/>
+              <a:ext cx="3175200" cy="2033640"/>
+            </p14:xfrm>
+          </p:contentPart>
+        </mc:Choice>
+        <mc:Fallback>
+          <p:pic>
+            <p:nvPicPr>
+              <p:cNvPr id="3" name="Ink 2">
+                <a:extLst>
+                  <a:ext uri="{FF2B5EF4-FFF2-40B4-BE49-F238E27FC236}">
+                    <a16:creationId xmlns:a16="http://schemas.microsoft.com/office/drawing/2014/main" id="{12AADC8E-3DF0-6125-A515-2D5617E39751}"/>
+                  </a:ext>
+                </a:extLst>
+              </p:cNvPr>
+              <p:cNvPicPr/>
+              <p:nvPr/>
+            </p:nvPicPr>
+            <p:blipFill>
+              <a:blip r:embed="rId3"/>
+              <a:stretch>
+                <a:fillRect/>
+              </a:stretch>
+            </p:blipFill>
+            <p:spPr>
+              <a:xfrm>
+                <a:off x="2124360" y="3692160"/>
+                <a:ext cx="3193920" cy="2052360"/>
+              </a:xfrm>
+              <a:prstGeom prst="rect">
+                <a:avLst/>
+              </a:prstGeom>
+            </p:spPr>
+          </p:pic>
+        </mc:Fallback>
+      </mc:AlternateContent>
     </p:spTree>
     <p:extLst>
       <p:ext uri="{BB962C8B-B14F-4D97-AF65-F5344CB8AC3E}">
@@ -10689,6 +11634,57 @@
           </a:p>
         </p:txBody>
       </p:sp>
+      <mc:AlternateContent xmlns:mc="http://schemas.openxmlformats.org/markup-compatibility/2006">
+        <mc:Choice xmlns:p14="http://schemas.microsoft.com/office/powerpoint/2010/main" Requires="p14">
+          <p:contentPart p14:bwMode="auto" r:id="rId2">
+            <p14:nvContentPartPr>
+              <p14:cNvPr id="5" name="Ink 4">
+                <a:extLst>
+                  <a:ext uri="{FF2B5EF4-FFF2-40B4-BE49-F238E27FC236}">
+                    <a16:creationId xmlns:a16="http://schemas.microsoft.com/office/drawing/2014/main" id="{03DF54A1-2B8B-1B4C-84F7-284C95E49959}"/>
+                  </a:ext>
+                </a:extLst>
+              </p14:cNvPr>
+              <p14:cNvContentPartPr/>
+              <p14:nvPr/>
+            </p14:nvContentPartPr>
+            <p14:xfrm>
+              <a:off x="2317680" y="2457360"/>
+              <a:ext cx="2432520" cy="2134080"/>
+            </p14:xfrm>
+          </p:contentPart>
+        </mc:Choice>
+        <mc:Fallback>
+          <p:pic>
+            <p:nvPicPr>
+              <p:cNvPr id="5" name="Ink 4">
+                <a:extLst>
+                  <a:ext uri="{FF2B5EF4-FFF2-40B4-BE49-F238E27FC236}">
+                    <a16:creationId xmlns:a16="http://schemas.microsoft.com/office/drawing/2014/main" id="{03DF54A1-2B8B-1B4C-84F7-284C95E49959}"/>
+                  </a:ext>
+                </a:extLst>
+              </p:cNvPr>
+              <p:cNvPicPr/>
+              <p:nvPr/>
+            </p:nvPicPr>
+            <p:blipFill>
+              <a:blip r:embed="rId3"/>
+              <a:stretch>
+                <a:fillRect/>
+              </a:stretch>
+            </p:blipFill>
+            <p:spPr>
+              <a:xfrm>
+                <a:off x="2308320" y="2448000"/>
+                <a:ext cx="2451240" cy="2152800"/>
+              </a:xfrm>
+              <a:prstGeom prst="rect">
+                <a:avLst/>
+              </a:prstGeom>
+            </p:spPr>
+          </p:pic>
+        </mc:Fallback>
+      </mc:AlternateContent>
     </p:spTree>
     <p:extLst>
       <p:ext uri="{BB962C8B-B14F-4D97-AF65-F5344CB8AC3E}">
@@ -11112,6 +12108,57 @@
           </a:p>
         </p:txBody>
       </p:sp>
+      <mc:AlternateContent xmlns:mc="http://schemas.openxmlformats.org/markup-compatibility/2006">
+        <mc:Choice xmlns:p14="http://schemas.microsoft.com/office/powerpoint/2010/main" Requires="p14">
+          <p:contentPart p14:bwMode="auto" r:id="rId2">
+            <p14:nvContentPartPr>
+              <p14:cNvPr id="3" name="Ink 2">
+                <a:extLst>
+                  <a:ext uri="{FF2B5EF4-FFF2-40B4-BE49-F238E27FC236}">
+                    <a16:creationId xmlns:a16="http://schemas.microsoft.com/office/drawing/2014/main" id="{0681E530-8710-BE1A-89B9-9288F11D287F}"/>
+                  </a:ext>
+                </a:extLst>
+              </p14:cNvPr>
+              <p14:cNvContentPartPr/>
+              <p14:nvPr/>
+            </p14:nvContentPartPr>
+            <p14:xfrm>
+              <a:off x="3314880" y="4438440"/>
+              <a:ext cx="1582200" cy="165600"/>
+            </p14:xfrm>
+          </p:contentPart>
+        </mc:Choice>
+        <mc:Fallback>
+          <p:pic>
+            <p:nvPicPr>
+              <p:cNvPr id="3" name="Ink 2">
+                <a:extLst>
+                  <a:ext uri="{FF2B5EF4-FFF2-40B4-BE49-F238E27FC236}">
+                    <a16:creationId xmlns:a16="http://schemas.microsoft.com/office/drawing/2014/main" id="{0681E530-8710-BE1A-89B9-9288F11D287F}"/>
+                  </a:ext>
+                </a:extLst>
+              </p:cNvPr>
+              <p:cNvPicPr/>
+              <p:nvPr/>
+            </p:nvPicPr>
+            <p:blipFill>
+              <a:blip r:embed="rId3"/>
+              <a:stretch>
+                <a:fillRect/>
+              </a:stretch>
+            </p:blipFill>
+            <p:spPr>
+              <a:xfrm>
+                <a:off x="3305520" y="4429080"/>
+                <a:ext cx="1600920" cy="184320"/>
+              </a:xfrm>
+              <a:prstGeom prst="rect">
+                <a:avLst/>
+              </a:prstGeom>
+            </p:spPr>
+          </p:pic>
+        </mc:Fallback>
+      </mc:AlternateContent>
     </p:spTree>
     <p:extLst>
       <p:ext uri="{BB962C8B-B14F-4D97-AF65-F5344CB8AC3E}">
@@ -11697,6 +12744,57 @@
           </a:p>
         </p:txBody>
       </p:sp>
+      <mc:AlternateContent xmlns:mc="http://schemas.openxmlformats.org/markup-compatibility/2006">
+        <mc:Choice xmlns:p14="http://schemas.microsoft.com/office/powerpoint/2010/main" Requires="p14">
+          <p:contentPart p14:bwMode="auto" r:id="rId2">
+            <p14:nvContentPartPr>
+              <p14:cNvPr id="8" name="Ink 7">
+                <a:extLst>
+                  <a:ext uri="{FF2B5EF4-FFF2-40B4-BE49-F238E27FC236}">
+                    <a16:creationId xmlns:a16="http://schemas.microsoft.com/office/drawing/2014/main" id="{BE710084-D6F4-3090-B3BB-C57BC20DE4B2}"/>
+                  </a:ext>
+                </a:extLst>
+              </p14:cNvPr>
+              <p14:cNvContentPartPr/>
+              <p14:nvPr/>
+            </p14:nvContentPartPr>
+            <p14:xfrm>
+              <a:off x="1593720" y="4229280"/>
+              <a:ext cx="6585480" cy="1397160"/>
+            </p14:xfrm>
+          </p:contentPart>
+        </mc:Choice>
+        <mc:Fallback>
+          <p:pic>
+            <p:nvPicPr>
+              <p:cNvPr id="8" name="Ink 7">
+                <a:extLst>
+                  <a:ext uri="{FF2B5EF4-FFF2-40B4-BE49-F238E27FC236}">
+                    <a16:creationId xmlns:a16="http://schemas.microsoft.com/office/drawing/2014/main" id="{BE710084-D6F4-3090-B3BB-C57BC20DE4B2}"/>
+                  </a:ext>
+                </a:extLst>
+              </p:cNvPr>
+              <p:cNvPicPr/>
+              <p:nvPr/>
+            </p:nvPicPr>
+            <p:blipFill>
+              <a:blip r:embed="rId3"/>
+              <a:stretch>
+                <a:fillRect/>
+              </a:stretch>
+            </p:blipFill>
+            <p:spPr>
+              <a:xfrm>
+                <a:off x="1584360" y="4219920"/>
+                <a:ext cx="6604200" cy="1415880"/>
+              </a:xfrm>
+              <a:prstGeom prst="rect">
+                <a:avLst/>
+              </a:prstGeom>
+            </p:spPr>
+          </p:pic>
+        </mc:Fallback>
+      </mc:AlternateContent>
     </p:spTree>
     <p:extLst>
       <p:ext uri="{BB962C8B-B14F-4D97-AF65-F5344CB8AC3E}">
@@ -12173,6 +13271,57 @@
           </a:fontRef>
         </p:style>
       </p:cxnSp>
+      <mc:AlternateContent xmlns:mc="http://schemas.openxmlformats.org/markup-compatibility/2006">
+        <mc:Choice xmlns:p14="http://schemas.microsoft.com/office/powerpoint/2010/main" Requires="p14">
+          <p:contentPart p14:bwMode="auto" r:id="rId2">
+            <p14:nvContentPartPr>
+              <p14:cNvPr id="3" name="Ink 2">
+                <a:extLst>
+                  <a:ext uri="{FF2B5EF4-FFF2-40B4-BE49-F238E27FC236}">
+                    <a16:creationId xmlns:a16="http://schemas.microsoft.com/office/drawing/2014/main" id="{6E29C5E8-2A21-AC3E-6FB3-66A65E266211}"/>
+                  </a:ext>
+                </a:extLst>
+              </p14:cNvPr>
+              <p14:cNvContentPartPr/>
+              <p14:nvPr/>
+            </p14:nvContentPartPr>
+            <p14:xfrm>
+              <a:off x="2978280" y="4463640"/>
+              <a:ext cx="3959280" cy="934560"/>
+            </p14:xfrm>
+          </p:contentPart>
+        </mc:Choice>
+        <mc:Fallback>
+          <p:pic>
+            <p:nvPicPr>
+              <p:cNvPr id="3" name="Ink 2">
+                <a:extLst>
+                  <a:ext uri="{FF2B5EF4-FFF2-40B4-BE49-F238E27FC236}">
+                    <a16:creationId xmlns:a16="http://schemas.microsoft.com/office/drawing/2014/main" id="{6E29C5E8-2A21-AC3E-6FB3-66A65E266211}"/>
+                  </a:ext>
+                </a:extLst>
+              </p:cNvPr>
+              <p:cNvPicPr/>
+              <p:nvPr/>
+            </p:nvPicPr>
+            <p:blipFill>
+              <a:blip r:embed="rId3"/>
+              <a:stretch>
+                <a:fillRect/>
+              </a:stretch>
+            </p:blipFill>
+            <p:spPr>
+              <a:xfrm>
+                <a:off x="2968920" y="4454280"/>
+                <a:ext cx="3978000" cy="953280"/>
+              </a:xfrm>
+              <a:prstGeom prst="rect">
+                <a:avLst/>
+              </a:prstGeom>
+            </p:spPr>
+          </p:pic>
+        </mc:Fallback>
+      </mc:AlternateContent>
     </p:spTree>
     <p:extLst>
       <p:ext uri="{BB962C8B-B14F-4D97-AF65-F5344CB8AC3E}">
@@ -12714,6 +13863,57 @@
           </a:fontRef>
         </p:style>
       </p:cxnSp>
+      <mc:AlternateContent xmlns:mc="http://schemas.openxmlformats.org/markup-compatibility/2006">
+        <mc:Choice xmlns:p14="http://schemas.microsoft.com/office/powerpoint/2010/main" Requires="p14">
+          <p:contentPart p14:bwMode="auto" r:id="rId2">
+            <p14:nvContentPartPr>
+              <p14:cNvPr id="7" name="Ink 6">
+                <a:extLst>
+                  <a:ext uri="{FF2B5EF4-FFF2-40B4-BE49-F238E27FC236}">
+                    <a16:creationId xmlns:a16="http://schemas.microsoft.com/office/drawing/2014/main" id="{45A3617A-F215-CDD3-AADF-606A20D23C4D}"/>
+                  </a:ext>
+                </a:extLst>
+              </p14:cNvPr>
+              <p14:cNvContentPartPr/>
+              <p14:nvPr/>
+            </p14:nvContentPartPr>
+            <p14:xfrm>
+              <a:off x="2394000" y="4127400"/>
+              <a:ext cx="3949920" cy="1232640"/>
+            </p14:xfrm>
+          </p:contentPart>
+        </mc:Choice>
+        <mc:Fallback>
+          <p:pic>
+            <p:nvPicPr>
+              <p:cNvPr id="7" name="Ink 6">
+                <a:extLst>
+                  <a:ext uri="{FF2B5EF4-FFF2-40B4-BE49-F238E27FC236}">
+                    <a16:creationId xmlns:a16="http://schemas.microsoft.com/office/drawing/2014/main" id="{45A3617A-F215-CDD3-AADF-606A20D23C4D}"/>
+                  </a:ext>
+                </a:extLst>
+              </p:cNvPr>
+              <p:cNvPicPr/>
+              <p:nvPr/>
+            </p:nvPicPr>
+            <p:blipFill>
+              <a:blip r:embed="rId3"/>
+              <a:stretch>
+                <a:fillRect/>
+              </a:stretch>
+            </p:blipFill>
+            <p:spPr>
+              <a:xfrm>
+                <a:off x="2384640" y="4118040"/>
+                <a:ext cx="3968640" cy="1251360"/>
+              </a:xfrm>
+              <a:prstGeom prst="rect">
+                <a:avLst/>
+              </a:prstGeom>
+            </p:spPr>
+          </p:pic>
+        </mc:Fallback>
+      </mc:AlternateContent>
     </p:spTree>
     <p:extLst>
       <p:ext uri="{BB962C8B-B14F-4D97-AF65-F5344CB8AC3E}">
@@ -13199,6 +14399,57 @@
           </a:fontRef>
         </p:style>
       </p:cxnSp>
+      <mc:AlternateContent xmlns:mc="http://schemas.openxmlformats.org/markup-compatibility/2006">
+        <mc:Choice xmlns:p14="http://schemas.microsoft.com/office/powerpoint/2010/main" Requires="p14">
+          <p:contentPart p14:bwMode="auto" r:id="rId2">
+            <p14:nvContentPartPr>
+              <p14:cNvPr id="3" name="Ink 2">
+                <a:extLst>
+                  <a:ext uri="{FF2B5EF4-FFF2-40B4-BE49-F238E27FC236}">
+                    <a16:creationId xmlns:a16="http://schemas.microsoft.com/office/drawing/2014/main" id="{D94A51CC-44BB-AA6D-35BB-8FDACD07F3D3}"/>
+                  </a:ext>
+                </a:extLst>
+              </p14:cNvPr>
+              <p14:cNvContentPartPr/>
+              <p14:nvPr/>
+            </p14:nvContentPartPr>
+            <p14:xfrm>
+              <a:off x="1822320" y="4165560"/>
+              <a:ext cx="7817400" cy="762840"/>
+            </p14:xfrm>
+          </p:contentPart>
+        </mc:Choice>
+        <mc:Fallback>
+          <p:pic>
+            <p:nvPicPr>
+              <p:cNvPr id="3" name="Ink 2">
+                <a:extLst>
+                  <a:ext uri="{FF2B5EF4-FFF2-40B4-BE49-F238E27FC236}">
+                    <a16:creationId xmlns:a16="http://schemas.microsoft.com/office/drawing/2014/main" id="{D94A51CC-44BB-AA6D-35BB-8FDACD07F3D3}"/>
+                  </a:ext>
+                </a:extLst>
+              </p:cNvPr>
+              <p:cNvPicPr/>
+              <p:nvPr/>
+            </p:nvPicPr>
+            <p:blipFill>
+              <a:blip r:embed="rId3"/>
+              <a:stretch>
+                <a:fillRect/>
+              </a:stretch>
+            </p:blipFill>
+            <p:spPr>
+              <a:xfrm>
+                <a:off x="1812960" y="4156200"/>
+                <a:ext cx="7836120" cy="781560"/>
+              </a:xfrm>
+              <a:prstGeom prst="rect">
+                <a:avLst/>
+              </a:prstGeom>
+            </p:spPr>
+          </p:pic>
+        </mc:Fallback>
+      </mc:AlternateContent>
     </p:spTree>
     <p:extLst>
       <p:ext uri="{BB962C8B-B14F-4D97-AF65-F5344CB8AC3E}">
@@ -13672,6 +14923,57 @@
           </a:p>
         </p:txBody>
       </p:sp>
+      <mc:AlternateContent xmlns:mc="http://schemas.openxmlformats.org/markup-compatibility/2006">
+        <mc:Choice xmlns:p14="http://schemas.microsoft.com/office/powerpoint/2010/main" Requires="p14">
+          <p:contentPart p14:bwMode="auto" r:id="rId2">
+            <p14:nvContentPartPr>
+              <p14:cNvPr id="5" name="Ink 4">
+                <a:extLst>
+                  <a:ext uri="{FF2B5EF4-FFF2-40B4-BE49-F238E27FC236}">
+                    <a16:creationId xmlns:a16="http://schemas.microsoft.com/office/drawing/2014/main" id="{504AF155-F49E-69CC-9C50-5955E8C51A18}"/>
+                  </a:ext>
+                </a:extLst>
+              </p14:cNvPr>
+              <p14:cNvContentPartPr/>
+              <p14:nvPr/>
+            </p14:nvContentPartPr>
+            <p14:xfrm>
+              <a:off x="698400" y="2120760"/>
+              <a:ext cx="8617320" cy="2915280"/>
+            </p14:xfrm>
+          </p:contentPart>
+        </mc:Choice>
+        <mc:Fallback>
+          <p:pic>
+            <p:nvPicPr>
+              <p:cNvPr id="5" name="Ink 4">
+                <a:extLst>
+                  <a:ext uri="{FF2B5EF4-FFF2-40B4-BE49-F238E27FC236}">
+                    <a16:creationId xmlns:a16="http://schemas.microsoft.com/office/drawing/2014/main" id="{504AF155-F49E-69CC-9C50-5955E8C51A18}"/>
+                  </a:ext>
+                </a:extLst>
+              </p:cNvPr>
+              <p:cNvPicPr/>
+              <p:nvPr/>
+            </p:nvPicPr>
+            <p:blipFill>
+              <a:blip r:embed="rId3"/>
+              <a:stretch>
+                <a:fillRect/>
+              </a:stretch>
+            </p:blipFill>
+            <p:spPr>
+              <a:xfrm>
+                <a:off x="689040" y="2111400"/>
+                <a:ext cx="8636040" cy="2934000"/>
+              </a:xfrm>
+              <a:prstGeom prst="rect">
+                <a:avLst/>
+              </a:prstGeom>
+            </p:spPr>
+          </p:pic>
+        </mc:Fallback>
+      </mc:AlternateContent>
     </p:spTree>
     <p:extLst>
       <p:ext uri="{BB962C8B-B14F-4D97-AF65-F5344CB8AC3E}">
@@ -13881,6 +15183,57 @@
           </a:p>
         </p:txBody>
       </p:sp>
+      <mc:AlternateContent xmlns:mc="http://schemas.openxmlformats.org/markup-compatibility/2006">
+        <mc:Choice xmlns:p14="http://schemas.microsoft.com/office/powerpoint/2010/main" Requires="p14">
+          <p:contentPart p14:bwMode="auto" r:id="rId2">
+            <p14:nvContentPartPr>
+              <p14:cNvPr id="4" name="Ink 3">
+                <a:extLst>
+                  <a:ext uri="{FF2B5EF4-FFF2-40B4-BE49-F238E27FC236}">
+                    <a16:creationId xmlns:a16="http://schemas.microsoft.com/office/drawing/2014/main" id="{9566BD26-D264-8870-E85F-08AC902A0931}"/>
+                  </a:ext>
+                </a:extLst>
+              </p14:cNvPr>
+              <p14:cNvContentPartPr/>
+              <p14:nvPr/>
+            </p14:nvContentPartPr>
+            <p14:xfrm>
+              <a:off x="5607000" y="4140000"/>
+              <a:ext cx="4692960" cy="508680"/>
+            </p14:xfrm>
+          </p:contentPart>
+        </mc:Choice>
+        <mc:Fallback>
+          <p:pic>
+            <p:nvPicPr>
+              <p:cNvPr id="4" name="Ink 3">
+                <a:extLst>
+                  <a:ext uri="{FF2B5EF4-FFF2-40B4-BE49-F238E27FC236}">
+                    <a16:creationId xmlns:a16="http://schemas.microsoft.com/office/drawing/2014/main" id="{9566BD26-D264-8870-E85F-08AC902A0931}"/>
+                  </a:ext>
+                </a:extLst>
+              </p:cNvPr>
+              <p:cNvPicPr/>
+              <p:nvPr/>
+            </p:nvPicPr>
+            <p:blipFill>
+              <a:blip r:embed="rId3"/>
+              <a:stretch>
+                <a:fillRect/>
+              </a:stretch>
+            </p:blipFill>
+            <p:spPr>
+              <a:xfrm>
+                <a:off x="5597640" y="4130640"/>
+                <a:ext cx="4711680" cy="527400"/>
+              </a:xfrm>
+              <a:prstGeom prst="rect">
+                <a:avLst/>
+              </a:prstGeom>
+            </p:spPr>
+          </p:pic>
+        </mc:Fallback>
+      </mc:AlternateContent>
     </p:spTree>
     <p:extLst>
       <p:ext uri="{BB962C8B-B14F-4D97-AF65-F5344CB8AC3E}">
@@ -14258,6 +15611,57 @@
           </a:fontRef>
         </p:style>
       </p:cxnSp>
+      <mc:AlternateContent xmlns:mc="http://schemas.openxmlformats.org/markup-compatibility/2006">
+        <mc:Choice xmlns:p14="http://schemas.microsoft.com/office/powerpoint/2010/main" Requires="p14">
+          <p:contentPart p14:bwMode="auto" r:id="rId2">
+            <p14:nvContentPartPr>
+              <p14:cNvPr id="7" name="Ink 6">
+                <a:extLst>
+                  <a:ext uri="{FF2B5EF4-FFF2-40B4-BE49-F238E27FC236}">
+                    <a16:creationId xmlns:a16="http://schemas.microsoft.com/office/drawing/2014/main" id="{598873EE-33C1-6D05-3D84-6EDED3CE2C18}"/>
+                  </a:ext>
+                </a:extLst>
+              </p14:cNvPr>
+              <p14:cNvContentPartPr/>
+              <p14:nvPr/>
+            </p14:nvContentPartPr>
+            <p14:xfrm>
+              <a:off x="1892160" y="1707840"/>
+              <a:ext cx="902160" cy="26280"/>
+            </p14:xfrm>
+          </p:contentPart>
+        </mc:Choice>
+        <mc:Fallback>
+          <p:pic>
+            <p:nvPicPr>
+              <p:cNvPr id="7" name="Ink 6">
+                <a:extLst>
+                  <a:ext uri="{FF2B5EF4-FFF2-40B4-BE49-F238E27FC236}">
+                    <a16:creationId xmlns:a16="http://schemas.microsoft.com/office/drawing/2014/main" id="{598873EE-33C1-6D05-3D84-6EDED3CE2C18}"/>
+                  </a:ext>
+                </a:extLst>
+              </p:cNvPr>
+              <p:cNvPicPr/>
+              <p:nvPr/>
+            </p:nvPicPr>
+            <p:blipFill>
+              <a:blip r:embed="rId3"/>
+              <a:stretch>
+                <a:fillRect/>
+              </a:stretch>
+            </p:blipFill>
+            <p:spPr>
+              <a:xfrm>
+                <a:off x="1882800" y="1698480"/>
+                <a:ext cx="920880" cy="45000"/>
+              </a:xfrm>
+              <a:prstGeom prst="rect">
+                <a:avLst/>
+              </a:prstGeom>
+            </p:spPr>
+          </p:pic>
+        </mc:Fallback>
+      </mc:AlternateContent>
     </p:spTree>
     <p:extLst>
       <p:ext uri="{BB962C8B-B14F-4D97-AF65-F5344CB8AC3E}">
@@ -14985,6 +16389,57 @@
           </a:fontRef>
         </p:style>
       </p:cxnSp>
+      <mc:AlternateContent xmlns:mc="http://schemas.openxmlformats.org/markup-compatibility/2006">
+        <mc:Choice xmlns:p14="http://schemas.microsoft.com/office/powerpoint/2010/main" Requires="p14">
+          <p:contentPart p14:bwMode="auto" r:id="rId2">
+            <p14:nvContentPartPr>
+              <p14:cNvPr id="3" name="Ink 2">
+                <a:extLst>
+                  <a:ext uri="{FF2B5EF4-FFF2-40B4-BE49-F238E27FC236}">
+                    <a16:creationId xmlns:a16="http://schemas.microsoft.com/office/drawing/2014/main" id="{981A9EA2-C2B0-F1F4-3A13-3AAF6487CBDE}"/>
+                  </a:ext>
+                </a:extLst>
+              </p14:cNvPr>
+              <p14:cNvContentPartPr/>
+              <p14:nvPr/>
+            </p14:nvContentPartPr>
+            <p14:xfrm>
+              <a:off x="1447920" y="386640"/>
+              <a:ext cx="9233280" cy="3506400"/>
+            </p14:xfrm>
+          </p:contentPart>
+        </mc:Choice>
+        <mc:Fallback>
+          <p:pic>
+            <p:nvPicPr>
+              <p:cNvPr id="3" name="Ink 2">
+                <a:extLst>
+                  <a:ext uri="{FF2B5EF4-FFF2-40B4-BE49-F238E27FC236}">
+                    <a16:creationId xmlns:a16="http://schemas.microsoft.com/office/drawing/2014/main" id="{981A9EA2-C2B0-F1F4-3A13-3AAF6487CBDE}"/>
+                  </a:ext>
+                </a:extLst>
+              </p:cNvPr>
+              <p:cNvPicPr/>
+              <p:nvPr/>
+            </p:nvPicPr>
+            <p:blipFill>
+              <a:blip r:embed="rId3"/>
+              <a:stretch>
+                <a:fillRect/>
+              </a:stretch>
+            </p:blipFill>
+            <p:spPr>
+              <a:xfrm>
+                <a:off x="1438560" y="377280"/>
+                <a:ext cx="9252000" cy="3525120"/>
+              </a:xfrm>
+              <a:prstGeom prst="rect">
+                <a:avLst/>
+              </a:prstGeom>
+            </p:spPr>
+          </p:pic>
+        </mc:Fallback>
+      </mc:AlternateContent>
     </p:spTree>
     <p:extLst>
       <p:ext uri="{BB962C8B-B14F-4D97-AF65-F5344CB8AC3E}">
@@ -15777,6 +17232,57 @@
           </a:fontRef>
         </p:style>
       </p:cxnSp>
+      <mc:AlternateContent xmlns:mc="http://schemas.openxmlformats.org/markup-compatibility/2006">
+        <mc:Choice xmlns:p14="http://schemas.microsoft.com/office/powerpoint/2010/main" Requires="p14">
+          <p:contentPart p14:bwMode="auto" r:id="rId2">
+            <p14:nvContentPartPr>
+              <p14:cNvPr id="6" name="Ink 5">
+                <a:extLst>
+                  <a:ext uri="{FF2B5EF4-FFF2-40B4-BE49-F238E27FC236}">
+                    <a16:creationId xmlns:a16="http://schemas.microsoft.com/office/drawing/2014/main" id="{1F331296-1F33-9BDA-3E63-CE927004A3DC}"/>
+                  </a:ext>
+                </a:extLst>
+              </p14:cNvPr>
+              <p14:cNvContentPartPr/>
+              <p14:nvPr/>
+            </p14:nvContentPartPr>
+            <p14:xfrm>
+              <a:off x="1022040" y="799560"/>
+              <a:ext cx="9925560" cy="3963240"/>
+            </p14:xfrm>
+          </p:contentPart>
+        </mc:Choice>
+        <mc:Fallback>
+          <p:pic>
+            <p:nvPicPr>
+              <p:cNvPr id="6" name="Ink 5">
+                <a:extLst>
+                  <a:ext uri="{FF2B5EF4-FFF2-40B4-BE49-F238E27FC236}">
+                    <a16:creationId xmlns:a16="http://schemas.microsoft.com/office/drawing/2014/main" id="{1F331296-1F33-9BDA-3E63-CE927004A3DC}"/>
+                  </a:ext>
+                </a:extLst>
+              </p:cNvPr>
+              <p:cNvPicPr/>
+              <p:nvPr/>
+            </p:nvPicPr>
+            <p:blipFill>
+              <a:blip r:embed="rId3"/>
+              <a:stretch>
+                <a:fillRect/>
+              </a:stretch>
+            </p:blipFill>
+            <p:spPr>
+              <a:xfrm>
+                <a:off x="1012680" y="790200"/>
+                <a:ext cx="9944280" cy="3981960"/>
+              </a:xfrm>
+              <a:prstGeom prst="rect">
+                <a:avLst/>
+              </a:prstGeom>
+            </p:spPr>
+          </p:pic>
+        </mc:Fallback>
+      </mc:AlternateContent>
     </p:spTree>
     <p:extLst>
       <p:ext uri="{BB962C8B-B14F-4D97-AF65-F5344CB8AC3E}">
@@ -16577,6 +18083,57 @@
           </a:p>
         </p:txBody>
       </p:sp>
+      <mc:AlternateContent xmlns:mc="http://schemas.openxmlformats.org/markup-compatibility/2006">
+        <mc:Choice xmlns:p14="http://schemas.microsoft.com/office/powerpoint/2010/main" Requires="p14">
+          <p:contentPart p14:bwMode="auto" r:id="rId2">
+            <p14:nvContentPartPr>
+              <p14:cNvPr id="3" name="Ink 2">
+                <a:extLst>
+                  <a:ext uri="{FF2B5EF4-FFF2-40B4-BE49-F238E27FC236}">
+                    <a16:creationId xmlns:a16="http://schemas.microsoft.com/office/drawing/2014/main" id="{B396B79E-FD57-9CEE-9579-1056674AF0D7}"/>
+                  </a:ext>
+                </a:extLst>
+              </p14:cNvPr>
+              <p14:cNvContentPartPr/>
+              <p14:nvPr/>
+            </p14:nvContentPartPr>
+            <p14:xfrm>
+              <a:off x="2577960" y="3867120"/>
+              <a:ext cx="2299320" cy="25920"/>
+            </p14:xfrm>
+          </p:contentPart>
+        </mc:Choice>
+        <mc:Fallback>
+          <p:pic>
+            <p:nvPicPr>
+              <p:cNvPr id="3" name="Ink 2">
+                <a:extLst>
+                  <a:ext uri="{FF2B5EF4-FFF2-40B4-BE49-F238E27FC236}">
+                    <a16:creationId xmlns:a16="http://schemas.microsoft.com/office/drawing/2014/main" id="{B396B79E-FD57-9CEE-9579-1056674AF0D7}"/>
+                  </a:ext>
+                </a:extLst>
+              </p:cNvPr>
+              <p:cNvPicPr/>
+              <p:nvPr/>
+            </p:nvPicPr>
+            <p:blipFill>
+              <a:blip r:embed="rId3"/>
+              <a:stretch>
+                <a:fillRect/>
+              </a:stretch>
+            </p:blipFill>
+            <p:spPr>
+              <a:xfrm>
+                <a:off x="2568600" y="3857760"/>
+                <a:ext cx="2318040" cy="44640"/>
+              </a:xfrm>
+              <a:prstGeom prst="rect">
+                <a:avLst/>
+              </a:prstGeom>
+            </p:spPr>
+          </p:pic>
+        </mc:Fallback>
+      </mc:AlternateContent>
     </p:spTree>
     <p:extLst>
       <p:ext uri="{BB962C8B-B14F-4D97-AF65-F5344CB8AC3E}">
@@ -17689,6 +19246,57 @@
           </a:p>
         </p:txBody>
       </p:sp>
+      <mc:AlternateContent xmlns:mc="http://schemas.openxmlformats.org/markup-compatibility/2006">
+        <mc:Choice xmlns:p14="http://schemas.microsoft.com/office/powerpoint/2010/main" Requires="p14">
+          <p:contentPart p14:bwMode="auto" r:id="rId2">
+            <p14:nvContentPartPr>
+              <p14:cNvPr id="3" name="Ink 2">
+                <a:extLst>
+                  <a:ext uri="{FF2B5EF4-FFF2-40B4-BE49-F238E27FC236}">
+                    <a16:creationId xmlns:a16="http://schemas.microsoft.com/office/drawing/2014/main" id="{4AA9D881-350B-7B0F-0229-4571BF9BD741}"/>
+                  </a:ext>
+                </a:extLst>
+              </p14:cNvPr>
+              <p14:cNvContentPartPr/>
+              <p14:nvPr/>
+            </p14:nvContentPartPr>
+            <p14:xfrm>
+              <a:off x="1511280" y="5524560"/>
+              <a:ext cx="584640" cy="286200"/>
+            </p14:xfrm>
+          </p:contentPart>
+        </mc:Choice>
+        <mc:Fallback>
+          <p:pic>
+            <p:nvPicPr>
+              <p:cNvPr id="3" name="Ink 2">
+                <a:extLst>
+                  <a:ext uri="{FF2B5EF4-FFF2-40B4-BE49-F238E27FC236}">
+                    <a16:creationId xmlns:a16="http://schemas.microsoft.com/office/drawing/2014/main" id="{4AA9D881-350B-7B0F-0229-4571BF9BD741}"/>
+                  </a:ext>
+                </a:extLst>
+              </p:cNvPr>
+              <p:cNvPicPr/>
+              <p:nvPr/>
+            </p:nvPicPr>
+            <p:blipFill>
+              <a:blip r:embed="rId3"/>
+              <a:stretch>
+                <a:fillRect/>
+              </a:stretch>
+            </p:blipFill>
+            <p:spPr>
+              <a:xfrm>
+                <a:off x="1501920" y="5515200"/>
+                <a:ext cx="603360" cy="304920"/>
+              </a:xfrm>
+              <a:prstGeom prst="rect">
+                <a:avLst/>
+              </a:prstGeom>
+            </p:spPr>
+          </p:pic>
+        </mc:Fallback>
+      </mc:AlternateContent>
     </p:spTree>
     <p:extLst>
       <p:ext uri="{BB962C8B-B14F-4D97-AF65-F5344CB8AC3E}">
@@ -18360,6 +19968,57 @@
           </a:p>
         </p:txBody>
       </p:sp>
+      <mc:AlternateContent xmlns:mc="http://schemas.openxmlformats.org/markup-compatibility/2006">
+        <mc:Choice xmlns:p14="http://schemas.microsoft.com/office/powerpoint/2010/main" Requires="p14">
+          <p:contentPart p14:bwMode="auto" r:id="rId2">
+            <p14:nvContentPartPr>
+              <p14:cNvPr id="6" name="Ink 5">
+                <a:extLst>
+                  <a:ext uri="{FF2B5EF4-FFF2-40B4-BE49-F238E27FC236}">
+                    <a16:creationId xmlns:a16="http://schemas.microsoft.com/office/drawing/2014/main" id="{52D74789-0183-317B-BAC4-D45888EF40A4}"/>
+                  </a:ext>
+                </a:extLst>
+              </p14:cNvPr>
+              <p14:cNvContentPartPr/>
+              <p14:nvPr/>
+            </p14:nvContentPartPr>
+            <p14:xfrm>
+              <a:off x="1320840" y="3257640"/>
+              <a:ext cx="6223320" cy="2115000"/>
+            </p14:xfrm>
+          </p:contentPart>
+        </mc:Choice>
+        <mc:Fallback>
+          <p:pic>
+            <p:nvPicPr>
+              <p:cNvPr id="6" name="Ink 5">
+                <a:extLst>
+                  <a:ext uri="{FF2B5EF4-FFF2-40B4-BE49-F238E27FC236}">
+                    <a16:creationId xmlns:a16="http://schemas.microsoft.com/office/drawing/2014/main" id="{52D74789-0183-317B-BAC4-D45888EF40A4}"/>
+                  </a:ext>
+                </a:extLst>
+              </p:cNvPr>
+              <p:cNvPicPr/>
+              <p:nvPr/>
+            </p:nvPicPr>
+            <p:blipFill>
+              <a:blip r:embed="rId3"/>
+              <a:stretch>
+                <a:fillRect/>
+              </a:stretch>
+            </p:blipFill>
+            <p:spPr>
+              <a:xfrm>
+                <a:off x="1311480" y="3248280"/>
+                <a:ext cx="6242040" cy="2133720"/>
+              </a:xfrm>
+              <a:prstGeom prst="rect">
+                <a:avLst/>
+              </a:prstGeom>
+            </p:spPr>
+          </p:pic>
+        </mc:Fallback>
+      </mc:AlternateContent>
     </p:spTree>
     <p:extLst>
       <p:ext uri="{BB962C8B-B14F-4D97-AF65-F5344CB8AC3E}">
@@ -18743,6 +20402,57 @@
           </a:p>
         </p:txBody>
       </p:sp>
+      <mc:AlternateContent xmlns:mc="http://schemas.openxmlformats.org/markup-compatibility/2006">
+        <mc:Choice xmlns:p14="http://schemas.microsoft.com/office/powerpoint/2010/main" Requires="p14">
+          <p:contentPart p14:bwMode="auto" r:id="rId2">
+            <p14:nvContentPartPr>
+              <p14:cNvPr id="3" name="Ink 2">
+                <a:extLst>
+                  <a:ext uri="{FF2B5EF4-FFF2-40B4-BE49-F238E27FC236}">
+                    <a16:creationId xmlns:a16="http://schemas.microsoft.com/office/drawing/2014/main" id="{B6119314-0208-E69A-B199-4C4E99ABBEEE}"/>
+                  </a:ext>
+                </a:extLst>
+              </p14:cNvPr>
+              <p14:cNvContentPartPr/>
+              <p14:nvPr/>
+            </p14:nvContentPartPr>
+            <p14:xfrm>
+              <a:off x="2082960" y="3263760"/>
+              <a:ext cx="5162760" cy="1448280"/>
+            </p14:xfrm>
+          </p:contentPart>
+        </mc:Choice>
+        <mc:Fallback>
+          <p:pic>
+            <p:nvPicPr>
+              <p:cNvPr id="3" name="Ink 2">
+                <a:extLst>
+                  <a:ext uri="{FF2B5EF4-FFF2-40B4-BE49-F238E27FC236}">
+                    <a16:creationId xmlns:a16="http://schemas.microsoft.com/office/drawing/2014/main" id="{B6119314-0208-E69A-B199-4C4E99ABBEEE}"/>
+                  </a:ext>
+                </a:extLst>
+              </p:cNvPr>
+              <p:cNvPicPr/>
+              <p:nvPr/>
+            </p:nvPicPr>
+            <p:blipFill>
+              <a:blip r:embed="rId3"/>
+              <a:stretch>
+                <a:fillRect/>
+              </a:stretch>
+            </p:blipFill>
+            <p:spPr>
+              <a:xfrm>
+                <a:off x="2073600" y="3254400"/>
+                <a:ext cx="5181480" cy="1467000"/>
+              </a:xfrm>
+              <a:prstGeom prst="rect">
+                <a:avLst/>
+              </a:prstGeom>
+            </p:spPr>
+          </p:pic>
+        </mc:Fallback>
+      </mc:AlternateContent>
     </p:spTree>
     <p:extLst>
       <p:ext uri="{BB962C8B-B14F-4D97-AF65-F5344CB8AC3E}">
@@ -19122,6 +20832,57 @@
           </a:p>
         </p:txBody>
       </p:sp>
+      <mc:AlternateContent xmlns:mc="http://schemas.openxmlformats.org/markup-compatibility/2006">
+        <mc:Choice xmlns:p14="http://schemas.microsoft.com/office/powerpoint/2010/main" Requires="p14">
+          <p:contentPart p14:bwMode="auto" r:id="rId2">
+            <p14:nvContentPartPr>
+              <p14:cNvPr id="3" name="Ink 2">
+                <a:extLst>
+                  <a:ext uri="{FF2B5EF4-FFF2-40B4-BE49-F238E27FC236}">
+                    <a16:creationId xmlns:a16="http://schemas.microsoft.com/office/drawing/2014/main" id="{C730225B-511E-EA42-AC41-F105762E23CE}"/>
+                  </a:ext>
+                </a:extLst>
+              </p14:cNvPr>
+              <p14:cNvContentPartPr/>
+              <p14:nvPr/>
+            </p14:nvContentPartPr>
+            <p14:xfrm>
+              <a:off x="2266920" y="2508120"/>
+              <a:ext cx="4464360" cy="2566440"/>
+            </p14:xfrm>
+          </p:contentPart>
+        </mc:Choice>
+        <mc:Fallback>
+          <p:pic>
+            <p:nvPicPr>
+              <p:cNvPr id="3" name="Ink 2">
+                <a:extLst>
+                  <a:ext uri="{FF2B5EF4-FFF2-40B4-BE49-F238E27FC236}">
+                    <a16:creationId xmlns:a16="http://schemas.microsoft.com/office/drawing/2014/main" id="{C730225B-511E-EA42-AC41-F105762E23CE}"/>
+                  </a:ext>
+                </a:extLst>
+              </p:cNvPr>
+              <p:cNvPicPr/>
+              <p:nvPr/>
+            </p:nvPicPr>
+            <p:blipFill>
+              <a:blip r:embed="rId3"/>
+              <a:stretch>
+                <a:fillRect/>
+              </a:stretch>
+            </p:blipFill>
+            <p:spPr>
+              <a:xfrm>
+                <a:off x="2257560" y="2498760"/>
+                <a:ext cx="4483080" cy="2585160"/>
+              </a:xfrm>
+              <a:prstGeom prst="rect">
+                <a:avLst/>
+              </a:prstGeom>
+            </p:spPr>
+          </p:pic>
+        </mc:Fallback>
+      </mc:AlternateContent>
     </p:spTree>
     <p:extLst>
       <p:ext uri="{BB962C8B-B14F-4D97-AF65-F5344CB8AC3E}">
@@ -19360,6 +21121,57 @@
           </a:p>
         </p:txBody>
       </p:sp>
+      <mc:AlternateContent xmlns:mc="http://schemas.openxmlformats.org/markup-compatibility/2006">
+        <mc:Choice xmlns:p14="http://schemas.microsoft.com/office/powerpoint/2010/main" Requires="p14">
+          <p:contentPart p14:bwMode="auto" r:id="rId2">
+            <p14:nvContentPartPr>
+              <p14:cNvPr id="3" name="Ink 2">
+                <a:extLst>
+                  <a:ext uri="{FF2B5EF4-FFF2-40B4-BE49-F238E27FC236}">
+                    <a16:creationId xmlns:a16="http://schemas.microsoft.com/office/drawing/2014/main" id="{F54D6B3D-7E73-C37F-42FB-3AB7ED001DAB}"/>
+                  </a:ext>
+                </a:extLst>
+              </p14:cNvPr>
+              <p14:cNvContentPartPr/>
+              <p14:nvPr/>
+            </p14:nvContentPartPr>
+            <p14:xfrm>
+              <a:off x="857160" y="2717280"/>
+              <a:ext cx="4153320" cy="102960"/>
+            </p14:xfrm>
+          </p:contentPart>
+        </mc:Choice>
+        <mc:Fallback>
+          <p:pic>
+            <p:nvPicPr>
+              <p:cNvPr id="3" name="Ink 2">
+                <a:extLst>
+                  <a:ext uri="{FF2B5EF4-FFF2-40B4-BE49-F238E27FC236}">
+                    <a16:creationId xmlns:a16="http://schemas.microsoft.com/office/drawing/2014/main" id="{F54D6B3D-7E73-C37F-42FB-3AB7ED001DAB}"/>
+                  </a:ext>
+                </a:extLst>
+              </p:cNvPr>
+              <p:cNvPicPr/>
+              <p:nvPr/>
+            </p:nvPicPr>
+            <p:blipFill>
+              <a:blip r:embed="rId3"/>
+              <a:stretch>
+                <a:fillRect/>
+              </a:stretch>
+            </p:blipFill>
+            <p:spPr>
+              <a:xfrm>
+                <a:off x="847800" y="2707920"/>
+                <a:ext cx="4172040" cy="121680"/>
+              </a:xfrm>
+              <a:prstGeom prst="rect">
+                <a:avLst/>
+              </a:prstGeom>
+            </p:spPr>
+          </p:pic>
+        </mc:Fallback>
+      </mc:AlternateContent>
     </p:spTree>
     <p:extLst>
       <p:ext uri="{BB962C8B-B14F-4D97-AF65-F5344CB8AC3E}">
@@ -19855,6 +21667,57 @@
           </a:p>
         </p:txBody>
       </p:sp>
+      <mc:AlternateContent xmlns:mc="http://schemas.openxmlformats.org/markup-compatibility/2006">
+        <mc:Choice xmlns:p14="http://schemas.microsoft.com/office/powerpoint/2010/main" Requires="p14">
+          <p:contentPart p14:bwMode="auto" r:id="rId2">
+            <p14:nvContentPartPr>
+              <p14:cNvPr id="7" name="Ink 6">
+                <a:extLst>
+                  <a:ext uri="{FF2B5EF4-FFF2-40B4-BE49-F238E27FC236}">
+                    <a16:creationId xmlns:a16="http://schemas.microsoft.com/office/drawing/2014/main" id="{E4522100-2AD1-8182-706F-1588E5A6B392}"/>
+                  </a:ext>
+                </a:extLst>
+              </p14:cNvPr>
+              <p14:cNvContentPartPr/>
+              <p14:nvPr/>
+            </p14:nvContentPartPr>
+            <p14:xfrm>
+              <a:off x="761760" y="1162080"/>
+              <a:ext cx="10471680" cy="4972320"/>
+            </p14:xfrm>
+          </p:contentPart>
+        </mc:Choice>
+        <mc:Fallback>
+          <p:pic>
+            <p:nvPicPr>
+              <p:cNvPr id="7" name="Ink 6">
+                <a:extLst>
+                  <a:ext uri="{FF2B5EF4-FFF2-40B4-BE49-F238E27FC236}">
+                    <a16:creationId xmlns:a16="http://schemas.microsoft.com/office/drawing/2014/main" id="{E4522100-2AD1-8182-706F-1588E5A6B392}"/>
+                  </a:ext>
+                </a:extLst>
+              </p:cNvPr>
+              <p:cNvPicPr/>
+              <p:nvPr/>
+            </p:nvPicPr>
+            <p:blipFill>
+              <a:blip r:embed="rId3"/>
+              <a:stretch>
+                <a:fillRect/>
+              </a:stretch>
+            </p:blipFill>
+            <p:spPr>
+              <a:xfrm>
+                <a:off x="752400" y="1152720"/>
+                <a:ext cx="10490400" cy="4991040"/>
+              </a:xfrm>
+              <a:prstGeom prst="rect">
+                <a:avLst/>
+              </a:prstGeom>
+            </p:spPr>
+          </p:pic>
+        </mc:Fallback>
+      </mc:AlternateContent>
     </p:spTree>
     <p:extLst>
       <p:ext uri="{BB962C8B-B14F-4D97-AF65-F5344CB8AC3E}">

</xml_diff>